<commit_message>
début diagramme des modules
</commit_message>
<xml_diff>
--- a/Annexes/Presentation.pptx
+++ b/Annexes/Presentation.pptx
@@ -5,10 +5,10 @@
     <p:sldMasterId id="2147483648" r:id="rId1"/>
   </p:sldMasterIdLst>
   <p:notesMasterIdLst>
-    <p:notesMasterId r:id="rId11"/>
+    <p:notesMasterId r:id="rId22"/>
   </p:notesMasterIdLst>
   <p:handoutMasterIdLst>
-    <p:handoutMasterId r:id="rId12"/>
+    <p:handoutMasterId r:id="rId23"/>
   </p:handoutMasterIdLst>
   <p:sldIdLst>
     <p:sldId id="257" r:id="rId2"/>
@@ -16,10 +16,21 @@
     <p:sldId id="259" r:id="rId4"/>
     <p:sldId id="262" r:id="rId5"/>
     <p:sldId id="260" r:id="rId6"/>
-    <p:sldId id="263" r:id="rId7"/>
-    <p:sldId id="264" r:id="rId8"/>
-    <p:sldId id="265" r:id="rId9"/>
-    <p:sldId id="266" r:id="rId10"/>
+    <p:sldId id="267" r:id="rId7"/>
+    <p:sldId id="268" r:id="rId8"/>
+    <p:sldId id="269" r:id="rId9"/>
+    <p:sldId id="270" r:id="rId10"/>
+    <p:sldId id="271" r:id="rId11"/>
+    <p:sldId id="272" r:id="rId12"/>
+    <p:sldId id="273" r:id="rId13"/>
+    <p:sldId id="274" r:id="rId14"/>
+    <p:sldId id="275" r:id="rId15"/>
+    <p:sldId id="276" r:id="rId16"/>
+    <p:sldId id="277" r:id="rId17"/>
+    <p:sldId id="263" r:id="rId18"/>
+    <p:sldId id="264" r:id="rId19"/>
+    <p:sldId id="265" r:id="rId20"/>
+    <p:sldId id="266" r:id="rId21"/>
   </p:sldIdLst>
   <p:sldSz cx="9144000" cy="6858000" type="screen4x3"/>
   <p:notesSz cx="6858000" cy="9144000"/>
@@ -1123,15 +1134,7 @@
         <a:p>
           <a:r>
             <a:rPr lang="fr-FR" dirty="0" smtClean="0"/>
-            <a:t>Renvoi un tableau à  </a:t>
-          </a:r>
-          <a:r>
-            <a:rPr lang="fr-FR" dirty="0" smtClean="0"/>
-            <a:t>2d </a:t>
-          </a:r>
-          <a:r>
-            <a:rPr lang="fr-FR" dirty="0" smtClean="0"/>
-            <a:t>contenant : la forme, l’id du joueur et les cartes gagnantes</a:t>
+            <a:t>Renvoi un tableau à  2d contenant : la forme, l’id du joueur et les cartes gagnantes</a:t>
           </a:r>
           <a:endParaRPr lang="fr-FR" dirty="0"/>
         </a:p>
@@ -1167,6 +1170,13 @@
         </dgm:presLayoutVars>
       </dgm:prSet>
       <dgm:spPr/>
+      <dgm:t>
+        <a:bodyPr/>
+        <a:lstStyle/>
+        <a:p>
+          <a:endParaRPr lang="fr-FR"/>
+        </a:p>
+      </dgm:t>
     </dgm:pt>
     <dgm:pt modelId="{2240775B-58D4-4AD3-A5EA-9DAFAFD34B2A}" type="pres">
       <dgm:prSet presAssocID="{91405BE4-6B8E-49D1-9738-5C9209473010}" presName="node" presStyleLbl="node1" presStyleIdx="0" presStyleCnt="6" custScaleX="64234" custScaleY="64234" custLinFactNeighborX="4701" custLinFactNeighborY="23123">
@@ -1186,10 +1196,24 @@
     <dgm:pt modelId="{EBC68E2A-8E1B-4560-90C4-D775B2C7B7E9}" type="pres">
       <dgm:prSet presAssocID="{3AB53BB6-D294-49B1-B22B-BB60FB02B590}" presName="sibTrans" presStyleLbl="sibTrans2D1" presStyleIdx="0" presStyleCnt="5"/>
       <dgm:spPr/>
+      <dgm:t>
+        <a:bodyPr/>
+        <a:lstStyle/>
+        <a:p>
+          <a:endParaRPr lang="fr-FR"/>
+        </a:p>
+      </dgm:t>
     </dgm:pt>
     <dgm:pt modelId="{008A057A-406B-49A8-8C0A-480992874AAD}" type="pres">
       <dgm:prSet presAssocID="{3AB53BB6-D294-49B1-B22B-BB60FB02B590}" presName="connectorText" presStyleLbl="sibTrans2D1" presStyleIdx="0" presStyleCnt="5"/>
       <dgm:spPr/>
+      <dgm:t>
+        <a:bodyPr/>
+        <a:lstStyle/>
+        <a:p>
+          <a:endParaRPr lang="fr-FR"/>
+        </a:p>
+      </dgm:t>
     </dgm:pt>
     <dgm:pt modelId="{0A8ED0B5-9AA8-4D31-B28A-6D0B69E90C94}" type="pres">
       <dgm:prSet presAssocID="{22120C95-0A80-4418-9401-9D4A6B4E8D2A}" presName="node" presStyleLbl="node1" presStyleIdx="1" presStyleCnt="6" custScaleX="64234" custScaleY="64234" custLinFactNeighborX="-3146" custLinFactNeighborY="-35650">
@@ -1209,10 +1233,24 @@
     <dgm:pt modelId="{AD8FAEF5-20FC-489D-9ABF-100801E7D983}" type="pres">
       <dgm:prSet presAssocID="{F28B999C-2822-417B-9403-203CD3C87608}" presName="sibTrans" presStyleLbl="sibTrans2D1" presStyleIdx="1" presStyleCnt="5"/>
       <dgm:spPr/>
+      <dgm:t>
+        <a:bodyPr/>
+        <a:lstStyle/>
+        <a:p>
+          <a:endParaRPr lang="fr-FR"/>
+        </a:p>
+      </dgm:t>
     </dgm:pt>
     <dgm:pt modelId="{D0D6CC33-42D5-4586-93E0-ACD44F6F2FC7}" type="pres">
       <dgm:prSet presAssocID="{F28B999C-2822-417B-9403-203CD3C87608}" presName="connectorText" presStyleLbl="sibTrans2D1" presStyleIdx="1" presStyleCnt="5"/>
       <dgm:spPr/>
+      <dgm:t>
+        <a:bodyPr/>
+        <a:lstStyle/>
+        <a:p>
+          <a:endParaRPr lang="fr-FR"/>
+        </a:p>
+      </dgm:t>
     </dgm:pt>
     <dgm:pt modelId="{4DEE9B05-8A2D-4FB6-9B3B-07BD8248AF45}" type="pres">
       <dgm:prSet presAssocID="{823D2FC6-A985-47CE-8629-B8692AF1D400}" presName="node" presStyleLbl="node1" presStyleIdx="2" presStyleCnt="6" custScaleX="64234" custScaleY="64234" custLinFactNeighborX="-8643" custLinFactNeighborY="-386">
@@ -1232,10 +1270,24 @@
     <dgm:pt modelId="{A1CF2DC4-0EDA-464E-A0B1-1FE3C7318563}" type="pres">
       <dgm:prSet presAssocID="{ED51361D-C65C-4543-A17F-A3F07893F236}" presName="sibTrans" presStyleLbl="sibTrans2D1" presStyleIdx="2" presStyleCnt="5"/>
       <dgm:spPr/>
+      <dgm:t>
+        <a:bodyPr/>
+        <a:lstStyle/>
+        <a:p>
+          <a:endParaRPr lang="fr-FR"/>
+        </a:p>
+      </dgm:t>
     </dgm:pt>
     <dgm:pt modelId="{927C84C8-5330-4E4B-BEB9-66BF9ABEF826}" type="pres">
       <dgm:prSet presAssocID="{ED51361D-C65C-4543-A17F-A3F07893F236}" presName="connectorText" presStyleLbl="sibTrans2D1" presStyleIdx="2" presStyleCnt="5"/>
       <dgm:spPr/>
+      <dgm:t>
+        <a:bodyPr/>
+        <a:lstStyle/>
+        <a:p>
+          <a:endParaRPr lang="fr-FR"/>
+        </a:p>
+      </dgm:t>
     </dgm:pt>
     <dgm:pt modelId="{B943CCB0-6A4B-4551-8A7E-08530C356588}" type="pres">
       <dgm:prSet presAssocID="{1AF153CD-F744-488D-B2BE-4C7F057BDB8D}" presName="node" presStyleLbl="node1" presStyleIdx="3" presStyleCnt="6" custScaleX="64234" custScaleY="64234" custLinFactNeighborX="-8643" custLinFactNeighborY="1930">
@@ -1255,10 +1307,24 @@
     <dgm:pt modelId="{574B586F-FF74-4D51-98D6-07944F40D66F}" type="pres">
       <dgm:prSet presAssocID="{34732094-3D34-4F42-B47D-4C21B52CE3A1}" presName="sibTrans" presStyleLbl="sibTrans2D1" presStyleIdx="3" presStyleCnt="5"/>
       <dgm:spPr/>
+      <dgm:t>
+        <a:bodyPr/>
+        <a:lstStyle/>
+        <a:p>
+          <a:endParaRPr lang="fr-FR"/>
+        </a:p>
+      </dgm:t>
     </dgm:pt>
     <dgm:pt modelId="{7561804D-D581-46DC-9861-FB0A733C3E7A}" type="pres">
       <dgm:prSet presAssocID="{34732094-3D34-4F42-B47D-4C21B52CE3A1}" presName="connectorText" presStyleLbl="sibTrans2D1" presStyleIdx="3" presStyleCnt="5"/>
       <dgm:spPr/>
+      <dgm:t>
+        <a:bodyPr/>
+        <a:lstStyle/>
+        <a:p>
+          <a:endParaRPr lang="fr-FR"/>
+        </a:p>
+      </dgm:t>
     </dgm:pt>
     <dgm:pt modelId="{AF8F249C-EBC9-4E39-91B0-25402C689F35}" type="pres">
       <dgm:prSet presAssocID="{8AA651AA-A2CF-4E5F-808A-75D03C095613}" presName="node" presStyleLbl="node1" presStyleIdx="4" presStyleCnt="6" custScaleX="64234" custScaleY="64234" custLinFactNeighborX="6257" custLinFactNeighborY="29357">
@@ -1278,10 +1344,24 @@
     <dgm:pt modelId="{FFF2DD29-36D0-4E92-8A2E-E0DF54EA5131}" type="pres">
       <dgm:prSet presAssocID="{2DC2ACC3-2A85-44E9-BF98-39A5D9C57BEC}" presName="sibTrans" presStyleLbl="sibTrans2D1" presStyleIdx="4" presStyleCnt="5"/>
       <dgm:spPr/>
+      <dgm:t>
+        <a:bodyPr/>
+        <a:lstStyle/>
+        <a:p>
+          <a:endParaRPr lang="fr-FR"/>
+        </a:p>
+      </dgm:t>
     </dgm:pt>
     <dgm:pt modelId="{282C9D20-F9B6-4BEF-8BE7-C1690A1A8781}" type="pres">
       <dgm:prSet presAssocID="{2DC2ACC3-2A85-44E9-BF98-39A5D9C57BEC}" presName="connectorText" presStyleLbl="sibTrans2D1" presStyleIdx="4" presStyleCnt="5"/>
       <dgm:spPr/>
+      <dgm:t>
+        <a:bodyPr/>
+        <a:lstStyle/>
+        <a:p>
+          <a:endParaRPr lang="fr-FR"/>
+        </a:p>
+      </dgm:t>
     </dgm:pt>
     <dgm:pt modelId="{31F0E82C-CC31-4ADC-A890-6982E2AAB6E1}" type="pres">
       <dgm:prSet presAssocID="{EF3A69B6-4499-4052-8AFB-D630E64ABCFF}" presName="node" presStyleLbl="node1" presStyleIdx="5" presStyleCnt="6" custScaleX="64234" custScaleY="64234" custLinFactNeighborX="14105" custLinFactNeighborY="-1988">
@@ -2632,6 +2712,7 @@
           <a:p>
             <a:fld id="{46AA4BFE-EBE1-4E6B-A126-01D0F88E8835}" type="datetimeFigureOut">
               <a:rPr lang="fr-FR" smtClean="0"/>
+              <a:pPr/>
               <a:t>26/05/2008</a:t>
             </a:fld>
             <a:endParaRPr lang="fr-FR"/>
@@ -2698,6 +2779,7 @@
           <a:p>
             <a:fld id="{3BFD0129-8F31-49CD-9B0D-5A39E491ED5D}" type="slidenum">
               <a:rPr lang="fr-FR" smtClean="0"/>
+              <a:pPr/>
               <a:t>‹N°›</a:t>
             </a:fld>
             <a:endParaRPr lang="fr-FR"/>
@@ -2792,6 +2874,7 @@
           <a:p>
             <a:fld id="{93FB4327-E683-4624-9BA4-151DE4E6AF49}" type="datetimeFigureOut">
               <a:rPr lang="fr-FR" smtClean="0"/>
+              <a:pPr/>
               <a:t>26/05/2008</a:t>
             </a:fld>
             <a:endParaRPr lang="fr-FR"/>
@@ -2953,6 +3036,7 @@
           <a:p>
             <a:fld id="{B041A928-835D-4BB7-8794-2EB354469B8C}" type="slidenum">
               <a:rPr lang="fr-FR" smtClean="0"/>
+              <a:pPr/>
               <a:t>‹N°›</a:t>
             </a:fld>
             <a:endParaRPr lang="fr-FR"/>
@@ -3238,6 +3322,7 @@
           <a:p>
             <a:fld id="{5F72105D-0C78-4081-8220-A07C5635D240}" type="datetimeFigureOut">
               <a:rPr lang="fr-FR" smtClean="0"/>
+              <a:pPr/>
               <a:t>26/05/2008</a:t>
             </a:fld>
             <a:endParaRPr lang="fr-FR"/>
@@ -3280,6 +3365,7 @@
           <a:p>
             <a:fld id="{CC4B8F1A-E8CE-4B6D-BC7A-7F32324242DB}" type="slidenum">
               <a:rPr lang="fr-FR" smtClean="0"/>
+              <a:pPr/>
               <a:t>‹N°›</a:t>
             </a:fld>
             <a:endParaRPr lang="fr-FR"/>
@@ -3406,6 +3492,7 @@
           <a:p>
             <a:fld id="{5F72105D-0C78-4081-8220-A07C5635D240}" type="datetimeFigureOut">
               <a:rPr lang="fr-FR" smtClean="0"/>
+              <a:pPr/>
               <a:t>26/05/2008</a:t>
             </a:fld>
             <a:endParaRPr lang="fr-FR"/>
@@ -3448,6 +3535,7 @@
           <a:p>
             <a:fld id="{CC4B8F1A-E8CE-4B6D-BC7A-7F32324242DB}" type="slidenum">
               <a:rPr lang="fr-FR" smtClean="0"/>
+              <a:pPr/>
               <a:t>‹N°›</a:t>
             </a:fld>
             <a:endParaRPr lang="fr-FR"/>
@@ -3584,6 +3672,7 @@
           <a:p>
             <a:fld id="{5F72105D-0C78-4081-8220-A07C5635D240}" type="datetimeFigureOut">
               <a:rPr lang="fr-FR" smtClean="0"/>
+              <a:pPr/>
               <a:t>26/05/2008</a:t>
             </a:fld>
             <a:endParaRPr lang="fr-FR"/>
@@ -3626,6 +3715,7 @@
           <a:p>
             <a:fld id="{CC4B8F1A-E8CE-4B6D-BC7A-7F32324242DB}" type="slidenum">
               <a:rPr lang="fr-FR" smtClean="0"/>
+              <a:pPr/>
               <a:t>‹N°›</a:t>
             </a:fld>
             <a:endParaRPr lang="fr-FR"/>
@@ -3758,6 +3848,7 @@
           <a:p>
             <a:fld id="{5F72105D-0C78-4081-8220-A07C5635D240}" type="datetimeFigureOut">
               <a:rPr lang="fr-FR" smtClean="0"/>
+              <a:pPr/>
               <a:t>26/05/2008</a:t>
             </a:fld>
             <a:endParaRPr lang="fr-FR"/>
@@ -3800,6 +3891,7 @@
           <a:p>
             <a:fld id="{CC4B8F1A-E8CE-4B6D-BC7A-7F32324242DB}" type="slidenum">
               <a:rPr lang="fr-FR" smtClean="0"/>
+              <a:pPr/>
               <a:t>‹N°›</a:t>
             </a:fld>
             <a:endParaRPr lang="fr-FR"/>
@@ -4009,6 +4101,7 @@
           <a:p>
             <a:fld id="{5F72105D-0C78-4081-8220-A07C5635D240}" type="datetimeFigureOut">
               <a:rPr lang="fr-FR" smtClean="0"/>
+              <a:pPr/>
               <a:t>26/05/2008</a:t>
             </a:fld>
             <a:endParaRPr lang="fr-FR"/>
@@ -4051,6 +4144,7 @@
           <a:p>
             <a:fld id="{CC4B8F1A-E8CE-4B6D-BC7A-7F32324242DB}" type="slidenum">
               <a:rPr lang="fr-FR" smtClean="0"/>
+              <a:pPr/>
               <a:t>‹N°›</a:t>
             </a:fld>
             <a:endParaRPr lang="fr-FR"/>
@@ -4295,6 +4389,7 @@
           <a:p>
             <a:fld id="{5F72105D-0C78-4081-8220-A07C5635D240}" type="datetimeFigureOut">
               <a:rPr lang="fr-FR" smtClean="0"/>
+              <a:pPr/>
               <a:t>26/05/2008</a:t>
             </a:fld>
             <a:endParaRPr lang="fr-FR"/>
@@ -4337,6 +4432,7 @@
           <a:p>
             <a:fld id="{CC4B8F1A-E8CE-4B6D-BC7A-7F32324242DB}" type="slidenum">
               <a:rPr lang="fr-FR" smtClean="0"/>
+              <a:pPr/>
               <a:t>‹N°›</a:t>
             </a:fld>
             <a:endParaRPr lang="fr-FR"/>
@@ -4715,6 +4811,7 @@
           <a:p>
             <a:fld id="{5F72105D-0C78-4081-8220-A07C5635D240}" type="datetimeFigureOut">
               <a:rPr lang="fr-FR" smtClean="0"/>
+              <a:pPr/>
               <a:t>26/05/2008</a:t>
             </a:fld>
             <a:endParaRPr lang="fr-FR"/>
@@ -4757,6 +4854,7 @@
           <a:p>
             <a:fld id="{CC4B8F1A-E8CE-4B6D-BC7A-7F32324242DB}" type="slidenum">
               <a:rPr lang="fr-FR" smtClean="0"/>
+              <a:pPr/>
               <a:t>‹N°›</a:t>
             </a:fld>
             <a:endParaRPr lang="fr-FR"/>
@@ -4831,6 +4929,7 @@
           <a:p>
             <a:fld id="{5F72105D-0C78-4081-8220-A07C5635D240}" type="datetimeFigureOut">
               <a:rPr lang="fr-FR" smtClean="0"/>
+              <a:pPr/>
               <a:t>26/05/2008</a:t>
             </a:fld>
             <a:endParaRPr lang="fr-FR"/>
@@ -4873,6 +4972,7 @@
           <a:p>
             <a:fld id="{CC4B8F1A-E8CE-4B6D-BC7A-7F32324242DB}" type="slidenum">
               <a:rPr lang="fr-FR" smtClean="0"/>
+              <a:pPr/>
               <a:t>‹N°›</a:t>
             </a:fld>
             <a:endParaRPr lang="fr-FR"/>
@@ -4924,6 +5024,7 @@
           <a:p>
             <a:fld id="{5F72105D-0C78-4081-8220-A07C5635D240}" type="datetimeFigureOut">
               <a:rPr lang="fr-FR" smtClean="0"/>
+              <a:pPr/>
               <a:t>26/05/2008</a:t>
             </a:fld>
             <a:endParaRPr lang="fr-FR"/>
@@ -4966,6 +5067,7 @@
           <a:p>
             <a:fld id="{CC4B8F1A-E8CE-4B6D-BC7A-7F32324242DB}" type="slidenum">
               <a:rPr lang="fr-FR" smtClean="0"/>
+              <a:pPr/>
               <a:t>‹N°›</a:t>
             </a:fld>
             <a:endParaRPr lang="fr-FR"/>
@@ -5199,6 +5301,7 @@
           <a:p>
             <a:fld id="{5F72105D-0C78-4081-8220-A07C5635D240}" type="datetimeFigureOut">
               <a:rPr lang="fr-FR" smtClean="0"/>
+              <a:pPr/>
               <a:t>26/05/2008</a:t>
             </a:fld>
             <a:endParaRPr lang="fr-FR"/>
@@ -5241,6 +5344,7 @@
           <a:p>
             <a:fld id="{CC4B8F1A-E8CE-4B6D-BC7A-7F32324242DB}" type="slidenum">
               <a:rPr lang="fr-FR" smtClean="0"/>
+              <a:pPr/>
               <a:t>‹N°›</a:t>
             </a:fld>
             <a:endParaRPr lang="fr-FR"/>
@@ -5450,6 +5554,7 @@
           <a:p>
             <a:fld id="{5F72105D-0C78-4081-8220-A07C5635D240}" type="datetimeFigureOut">
               <a:rPr lang="fr-FR" smtClean="0"/>
+              <a:pPr/>
               <a:t>26/05/2008</a:t>
             </a:fld>
             <a:endParaRPr lang="fr-FR"/>
@@ -5492,6 +5597,7 @@
           <a:p>
             <a:fld id="{CC4B8F1A-E8CE-4B6D-BC7A-7F32324242DB}" type="slidenum">
               <a:rPr lang="fr-FR" smtClean="0"/>
+              <a:pPr/>
               <a:t>‹N°›</a:t>
             </a:fld>
             <a:endParaRPr lang="fr-FR"/>
@@ -5699,6 +5805,7 @@
           <a:p>
             <a:fld id="{5F72105D-0C78-4081-8220-A07C5635D240}" type="datetimeFigureOut">
               <a:rPr lang="fr-FR" smtClean="0"/>
+              <a:pPr/>
               <a:t>26/05/2008</a:t>
             </a:fld>
             <a:endParaRPr lang="fr-FR"/>
@@ -5777,6 +5884,7 @@
           <a:p>
             <a:fld id="{CC4B8F1A-E8CE-4B6D-BC7A-7F32324242DB}" type="slidenum">
               <a:rPr lang="fr-FR" smtClean="0"/>
+              <a:pPr/>
               <a:t>‹N°›</a:t>
             </a:fld>
             <a:endParaRPr lang="fr-FR"/>
@@ -6246,6 +6354,856 @@
 </p:sld>
 </file>
 
+<file path=ppt/slides/slide10.xml><?xml version="1.0" encoding="utf-8"?>
+<p:sld xmlns:a="http://schemas.openxmlformats.org/drawingml/2006/main" xmlns:r="http://schemas.openxmlformats.org/officeDocument/2006/relationships" xmlns:p="http://schemas.openxmlformats.org/presentationml/2006/main">
+  <p:cSld>
+    <p:spTree>
+      <p:nvGrpSpPr>
+        <p:cNvPr id="1" name=""/>
+        <p:cNvGrpSpPr/>
+        <p:nvPr/>
+      </p:nvGrpSpPr>
+      <p:grpSpPr>
+        <a:xfrm>
+          <a:off x="0" y="0"/>
+          <a:ext cx="0" cy="0"/>
+          <a:chOff x="0" y="0"/>
+          <a:chExt cx="0" cy="0"/>
+        </a:xfrm>
+      </p:grpSpPr>
+      <p:sp>
+        <p:nvSpPr>
+          <p:cNvPr id="2" name="Rectangle à coins arrondis 1"/>
+          <p:cNvSpPr/>
+          <p:nvPr/>
+        </p:nvSpPr>
+        <p:spPr>
+          <a:xfrm>
+            <a:off x="1000100" y="857232"/>
+            <a:ext cx="6929486" cy="4572032"/>
+          </a:xfrm>
+          <a:prstGeom prst="roundRect">
+            <a:avLst/>
+          </a:prstGeom>
+        </p:spPr>
+        <p:style>
+          <a:lnRef idx="1">
+            <a:schemeClr val="accent6"/>
+          </a:lnRef>
+          <a:fillRef idx="2">
+            <a:schemeClr val="accent6"/>
+          </a:fillRef>
+          <a:effectRef idx="1">
+            <a:schemeClr val="accent6"/>
+          </a:effectRef>
+          <a:fontRef idx="minor">
+            <a:schemeClr val="dk1"/>
+          </a:fontRef>
+        </p:style>
+        <p:txBody>
+          <a:bodyPr rtlCol="0" anchor="ctr"/>
+          <a:lstStyle/>
+          <a:p>
+            <a:pPr algn="ctr"/>
+            <a:endParaRPr lang="fr-FR"/>
+          </a:p>
+        </p:txBody>
+      </p:sp>
+    </p:spTree>
+  </p:cSld>
+  <p:clrMapOvr>
+    <a:masterClrMapping/>
+  </p:clrMapOvr>
+  <p:transition spd="slow">
+    <p:fade/>
+  </p:transition>
+</p:sld>
+</file>
+
+<file path=ppt/slides/slide11.xml><?xml version="1.0" encoding="utf-8"?>
+<p:sld xmlns:a="http://schemas.openxmlformats.org/drawingml/2006/main" xmlns:r="http://schemas.openxmlformats.org/officeDocument/2006/relationships" xmlns:p="http://schemas.openxmlformats.org/presentationml/2006/main">
+  <p:cSld>
+    <p:spTree>
+      <p:nvGrpSpPr>
+        <p:cNvPr id="1" name=""/>
+        <p:cNvGrpSpPr/>
+        <p:nvPr/>
+      </p:nvGrpSpPr>
+      <p:grpSpPr>
+        <a:xfrm>
+          <a:off x="0" y="0"/>
+          <a:ext cx="0" cy="0"/>
+          <a:chOff x="0" y="0"/>
+          <a:chExt cx="0" cy="0"/>
+        </a:xfrm>
+      </p:grpSpPr>
+      <p:sp>
+        <p:nvSpPr>
+          <p:cNvPr id="2" name="Rectangle à coins arrondis 1"/>
+          <p:cNvSpPr/>
+          <p:nvPr/>
+        </p:nvSpPr>
+        <p:spPr>
+          <a:xfrm>
+            <a:off x="1000100" y="857232"/>
+            <a:ext cx="6929486" cy="4572032"/>
+          </a:xfrm>
+          <a:prstGeom prst="roundRect">
+            <a:avLst/>
+          </a:prstGeom>
+        </p:spPr>
+        <p:style>
+          <a:lnRef idx="1">
+            <a:schemeClr val="accent6"/>
+          </a:lnRef>
+          <a:fillRef idx="2">
+            <a:schemeClr val="accent6"/>
+          </a:fillRef>
+          <a:effectRef idx="1">
+            <a:schemeClr val="accent6"/>
+          </a:effectRef>
+          <a:fontRef idx="minor">
+            <a:schemeClr val="dk1"/>
+          </a:fontRef>
+        </p:style>
+        <p:txBody>
+          <a:bodyPr rtlCol="0" anchor="ctr"/>
+          <a:lstStyle/>
+          <a:p>
+            <a:pPr algn="ctr"/>
+            <a:endParaRPr lang="fr-FR"/>
+          </a:p>
+        </p:txBody>
+      </p:sp>
+    </p:spTree>
+  </p:cSld>
+  <p:clrMapOvr>
+    <a:masterClrMapping/>
+  </p:clrMapOvr>
+  <p:transition spd="slow">
+    <p:fade/>
+  </p:transition>
+</p:sld>
+</file>
+
+<file path=ppt/slides/slide12.xml><?xml version="1.0" encoding="utf-8"?>
+<p:sld xmlns:a="http://schemas.openxmlformats.org/drawingml/2006/main" xmlns:r="http://schemas.openxmlformats.org/officeDocument/2006/relationships" xmlns:p="http://schemas.openxmlformats.org/presentationml/2006/main">
+  <p:cSld>
+    <p:spTree>
+      <p:nvGrpSpPr>
+        <p:cNvPr id="1" name=""/>
+        <p:cNvGrpSpPr/>
+        <p:nvPr/>
+      </p:nvGrpSpPr>
+      <p:grpSpPr>
+        <a:xfrm>
+          <a:off x="0" y="0"/>
+          <a:ext cx="0" cy="0"/>
+          <a:chOff x="0" y="0"/>
+          <a:chExt cx="0" cy="0"/>
+        </a:xfrm>
+      </p:grpSpPr>
+      <p:sp>
+        <p:nvSpPr>
+          <p:cNvPr id="2" name="Rectangle à coins arrondis 1"/>
+          <p:cNvSpPr/>
+          <p:nvPr/>
+        </p:nvSpPr>
+        <p:spPr>
+          <a:xfrm>
+            <a:off x="1000100" y="857232"/>
+            <a:ext cx="6929486" cy="4572032"/>
+          </a:xfrm>
+          <a:prstGeom prst="roundRect">
+            <a:avLst/>
+          </a:prstGeom>
+        </p:spPr>
+        <p:style>
+          <a:lnRef idx="1">
+            <a:schemeClr val="accent6"/>
+          </a:lnRef>
+          <a:fillRef idx="2">
+            <a:schemeClr val="accent6"/>
+          </a:fillRef>
+          <a:effectRef idx="1">
+            <a:schemeClr val="accent6"/>
+          </a:effectRef>
+          <a:fontRef idx="minor">
+            <a:schemeClr val="dk1"/>
+          </a:fontRef>
+        </p:style>
+        <p:txBody>
+          <a:bodyPr rtlCol="0" anchor="ctr"/>
+          <a:lstStyle/>
+          <a:p>
+            <a:pPr algn="ctr"/>
+            <a:endParaRPr lang="fr-FR"/>
+          </a:p>
+        </p:txBody>
+      </p:sp>
+    </p:spTree>
+  </p:cSld>
+  <p:clrMapOvr>
+    <a:masterClrMapping/>
+  </p:clrMapOvr>
+  <p:transition spd="slow">
+    <p:fade/>
+  </p:transition>
+</p:sld>
+</file>
+
+<file path=ppt/slides/slide13.xml><?xml version="1.0" encoding="utf-8"?>
+<p:sld xmlns:a="http://schemas.openxmlformats.org/drawingml/2006/main" xmlns:r="http://schemas.openxmlformats.org/officeDocument/2006/relationships" xmlns:p="http://schemas.openxmlformats.org/presentationml/2006/main">
+  <p:cSld>
+    <p:spTree>
+      <p:nvGrpSpPr>
+        <p:cNvPr id="1" name=""/>
+        <p:cNvGrpSpPr/>
+        <p:nvPr/>
+      </p:nvGrpSpPr>
+      <p:grpSpPr>
+        <a:xfrm>
+          <a:off x="0" y="0"/>
+          <a:ext cx="0" cy="0"/>
+          <a:chOff x="0" y="0"/>
+          <a:chExt cx="0" cy="0"/>
+        </a:xfrm>
+      </p:grpSpPr>
+      <p:sp>
+        <p:nvSpPr>
+          <p:cNvPr id="2" name="Rectangle à coins arrondis 1"/>
+          <p:cNvSpPr/>
+          <p:nvPr/>
+        </p:nvSpPr>
+        <p:spPr>
+          <a:xfrm>
+            <a:off x="1000100" y="857232"/>
+            <a:ext cx="6929486" cy="4572032"/>
+          </a:xfrm>
+          <a:prstGeom prst="roundRect">
+            <a:avLst/>
+          </a:prstGeom>
+        </p:spPr>
+        <p:style>
+          <a:lnRef idx="1">
+            <a:schemeClr val="accent6"/>
+          </a:lnRef>
+          <a:fillRef idx="2">
+            <a:schemeClr val="accent6"/>
+          </a:fillRef>
+          <a:effectRef idx="1">
+            <a:schemeClr val="accent6"/>
+          </a:effectRef>
+          <a:fontRef idx="minor">
+            <a:schemeClr val="dk1"/>
+          </a:fontRef>
+        </p:style>
+        <p:txBody>
+          <a:bodyPr rtlCol="0" anchor="ctr"/>
+          <a:lstStyle/>
+          <a:p>
+            <a:pPr algn="ctr"/>
+            <a:endParaRPr lang="fr-FR"/>
+          </a:p>
+        </p:txBody>
+      </p:sp>
+    </p:spTree>
+  </p:cSld>
+  <p:clrMapOvr>
+    <a:masterClrMapping/>
+  </p:clrMapOvr>
+  <p:transition spd="slow">
+    <p:fade/>
+  </p:transition>
+</p:sld>
+</file>
+
+<file path=ppt/slides/slide14.xml><?xml version="1.0" encoding="utf-8"?>
+<p:sld xmlns:a="http://schemas.openxmlformats.org/drawingml/2006/main" xmlns:r="http://schemas.openxmlformats.org/officeDocument/2006/relationships" xmlns:p="http://schemas.openxmlformats.org/presentationml/2006/main">
+  <p:cSld>
+    <p:spTree>
+      <p:nvGrpSpPr>
+        <p:cNvPr id="1" name=""/>
+        <p:cNvGrpSpPr/>
+        <p:nvPr/>
+      </p:nvGrpSpPr>
+      <p:grpSpPr>
+        <a:xfrm>
+          <a:off x="0" y="0"/>
+          <a:ext cx="0" cy="0"/>
+          <a:chOff x="0" y="0"/>
+          <a:chExt cx="0" cy="0"/>
+        </a:xfrm>
+      </p:grpSpPr>
+      <p:sp>
+        <p:nvSpPr>
+          <p:cNvPr id="2" name="Rectangle à coins arrondis 1"/>
+          <p:cNvSpPr/>
+          <p:nvPr/>
+        </p:nvSpPr>
+        <p:spPr>
+          <a:xfrm>
+            <a:off x="1000100" y="857232"/>
+            <a:ext cx="6929486" cy="4572032"/>
+          </a:xfrm>
+          <a:prstGeom prst="roundRect">
+            <a:avLst/>
+          </a:prstGeom>
+        </p:spPr>
+        <p:style>
+          <a:lnRef idx="1">
+            <a:schemeClr val="accent6"/>
+          </a:lnRef>
+          <a:fillRef idx="2">
+            <a:schemeClr val="accent6"/>
+          </a:fillRef>
+          <a:effectRef idx="1">
+            <a:schemeClr val="accent6"/>
+          </a:effectRef>
+          <a:fontRef idx="minor">
+            <a:schemeClr val="dk1"/>
+          </a:fontRef>
+        </p:style>
+        <p:txBody>
+          <a:bodyPr rtlCol="0" anchor="ctr"/>
+          <a:lstStyle/>
+          <a:p>
+            <a:pPr algn="ctr"/>
+            <a:endParaRPr lang="fr-FR"/>
+          </a:p>
+        </p:txBody>
+      </p:sp>
+    </p:spTree>
+  </p:cSld>
+  <p:clrMapOvr>
+    <a:masterClrMapping/>
+  </p:clrMapOvr>
+  <p:transition spd="slow">
+    <p:fade/>
+  </p:transition>
+</p:sld>
+</file>
+
+<file path=ppt/slides/slide15.xml><?xml version="1.0" encoding="utf-8"?>
+<p:sld xmlns:a="http://schemas.openxmlformats.org/drawingml/2006/main" xmlns:r="http://schemas.openxmlformats.org/officeDocument/2006/relationships" xmlns:p="http://schemas.openxmlformats.org/presentationml/2006/main">
+  <p:cSld>
+    <p:spTree>
+      <p:nvGrpSpPr>
+        <p:cNvPr id="1" name=""/>
+        <p:cNvGrpSpPr/>
+        <p:nvPr/>
+      </p:nvGrpSpPr>
+      <p:grpSpPr>
+        <a:xfrm>
+          <a:off x="0" y="0"/>
+          <a:ext cx="0" cy="0"/>
+          <a:chOff x="0" y="0"/>
+          <a:chExt cx="0" cy="0"/>
+        </a:xfrm>
+      </p:grpSpPr>
+      <p:sp>
+        <p:nvSpPr>
+          <p:cNvPr id="2" name="Rectangle à coins arrondis 1"/>
+          <p:cNvSpPr/>
+          <p:nvPr/>
+        </p:nvSpPr>
+        <p:spPr>
+          <a:xfrm>
+            <a:off x="1000100" y="857232"/>
+            <a:ext cx="6929486" cy="4572032"/>
+          </a:xfrm>
+          <a:prstGeom prst="roundRect">
+            <a:avLst/>
+          </a:prstGeom>
+        </p:spPr>
+        <p:style>
+          <a:lnRef idx="1">
+            <a:schemeClr val="accent6"/>
+          </a:lnRef>
+          <a:fillRef idx="2">
+            <a:schemeClr val="accent6"/>
+          </a:fillRef>
+          <a:effectRef idx="1">
+            <a:schemeClr val="accent6"/>
+          </a:effectRef>
+          <a:fontRef idx="minor">
+            <a:schemeClr val="dk1"/>
+          </a:fontRef>
+        </p:style>
+        <p:txBody>
+          <a:bodyPr rtlCol="0" anchor="ctr"/>
+          <a:lstStyle/>
+          <a:p>
+            <a:pPr algn="ctr"/>
+            <a:endParaRPr lang="fr-FR"/>
+          </a:p>
+        </p:txBody>
+      </p:sp>
+    </p:spTree>
+  </p:cSld>
+  <p:clrMapOvr>
+    <a:masterClrMapping/>
+  </p:clrMapOvr>
+  <p:transition spd="slow">
+    <p:fade/>
+  </p:transition>
+</p:sld>
+</file>
+
+<file path=ppt/slides/slide16.xml><?xml version="1.0" encoding="utf-8"?>
+<p:sld xmlns:a="http://schemas.openxmlformats.org/drawingml/2006/main" xmlns:r="http://schemas.openxmlformats.org/officeDocument/2006/relationships" xmlns:p="http://schemas.openxmlformats.org/presentationml/2006/main">
+  <p:cSld>
+    <p:spTree>
+      <p:nvGrpSpPr>
+        <p:cNvPr id="1" name=""/>
+        <p:cNvGrpSpPr/>
+        <p:nvPr/>
+      </p:nvGrpSpPr>
+      <p:grpSpPr>
+        <a:xfrm>
+          <a:off x="0" y="0"/>
+          <a:ext cx="0" cy="0"/>
+          <a:chOff x="0" y="0"/>
+          <a:chExt cx="0" cy="0"/>
+        </a:xfrm>
+      </p:grpSpPr>
+      <p:sp>
+        <p:nvSpPr>
+          <p:cNvPr id="2" name="Rectangle à coins arrondis 1"/>
+          <p:cNvSpPr/>
+          <p:nvPr/>
+        </p:nvSpPr>
+        <p:spPr>
+          <a:xfrm>
+            <a:off x="1000100" y="857232"/>
+            <a:ext cx="6929486" cy="4572032"/>
+          </a:xfrm>
+          <a:prstGeom prst="roundRect">
+            <a:avLst/>
+          </a:prstGeom>
+        </p:spPr>
+        <p:style>
+          <a:lnRef idx="1">
+            <a:schemeClr val="accent6"/>
+          </a:lnRef>
+          <a:fillRef idx="2">
+            <a:schemeClr val="accent6"/>
+          </a:fillRef>
+          <a:effectRef idx="1">
+            <a:schemeClr val="accent6"/>
+          </a:effectRef>
+          <a:fontRef idx="minor">
+            <a:schemeClr val="dk1"/>
+          </a:fontRef>
+        </p:style>
+        <p:txBody>
+          <a:bodyPr rtlCol="0" anchor="ctr"/>
+          <a:lstStyle/>
+          <a:p>
+            <a:pPr algn="ctr"/>
+            <a:endParaRPr lang="fr-FR"/>
+          </a:p>
+        </p:txBody>
+      </p:sp>
+    </p:spTree>
+  </p:cSld>
+  <p:clrMapOvr>
+    <a:masterClrMapping/>
+  </p:clrMapOvr>
+  <p:transition spd="slow">
+    <p:fade/>
+  </p:transition>
+</p:sld>
+</file>
+
+<file path=ppt/slides/slide17.xml><?xml version="1.0" encoding="utf-8"?>
+<p:sld xmlns:a="http://schemas.openxmlformats.org/drawingml/2006/main" xmlns:r="http://schemas.openxmlformats.org/officeDocument/2006/relationships" xmlns:p="http://schemas.openxmlformats.org/presentationml/2006/main">
+  <p:cSld>
+    <p:spTree>
+      <p:nvGrpSpPr>
+        <p:cNvPr id="1" name=""/>
+        <p:cNvGrpSpPr/>
+        <p:nvPr/>
+      </p:nvGrpSpPr>
+      <p:grpSpPr>
+        <a:xfrm>
+          <a:off x="0" y="0"/>
+          <a:ext cx="0" cy="0"/>
+          <a:chOff x="0" y="0"/>
+          <a:chExt cx="0" cy="0"/>
+        </a:xfrm>
+      </p:grpSpPr>
+      <p:sp>
+        <p:nvSpPr>
+          <p:cNvPr id="2" name="Titre 1"/>
+          <p:cNvSpPr>
+            <a:spLocks noGrp="1"/>
+          </p:cNvSpPr>
+          <p:nvPr>
+            <p:ph type="title"/>
+          </p:nvPr>
+        </p:nvSpPr>
+        <p:spPr/>
+        <p:txBody>
+          <a:bodyPr/>
+          <a:lstStyle/>
+          <a:p>
+            <a:r>
+              <a:rPr lang="fr-FR" dirty="0" smtClean="0"/>
+              <a:t>Un design sobre et soigné :</a:t>
+            </a:r>
+            <a:endParaRPr lang="fr-FR" dirty="0"/>
+          </a:p>
+        </p:txBody>
+      </p:sp>
+      <p:pic>
+        <p:nvPicPr>
+          <p:cNvPr id="4" name="Espace réservé du contenu 3" descr="captureLsp.png"/>
+          <p:cNvPicPr>
+            <a:picLocks noGrp="1" noChangeAspect="1"/>
+          </p:cNvPicPr>
+          <p:nvPr>
+            <p:ph idx="1"/>
+          </p:nvPr>
+        </p:nvPicPr>
+        <p:blipFill>
+          <a:blip r:embed="rId2"/>
+          <a:stretch>
+            <a:fillRect/>
+          </a:stretch>
+        </p:blipFill>
+        <p:spPr>
+          <a:xfrm>
+            <a:off x="1636086" y="1285860"/>
+            <a:ext cx="5871827" cy="4525963"/>
+          </a:xfrm>
+        </p:spPr>
+      </p:pic>
+      <p:sp>
+        <p:nvSpPr>
+          <p:cNvPr id="5" name="ZoneTexte 4"/>
+          <p:cNvSpPr txBox="1"/>
+          <p:nvPr/>
+        </p:nvSpPr>
+        <p:spPr>
+          <a:xfrm>
+            <a:off x="1857356" y="5934670"/>
+            <a:ext cx="5715040" cy="584775"/>
+          </a:xfrm>
+          <a:prstGeom prst="rect">
+            <a:avLst/>
+          </a:prstGeom>
+          <a:noFill/>
+        </p:spPr>
+        <p:txBody>
+          <a:bodyPr wrap="square" rtlCol="0">
+            <a:spAutoFit/>
+          </a:bodyPr>
+          <a:lstStyle/>
+          <a:p>
+            <a:pPr algn="just"/>
+            <a:r>
+              <a:rPr lang="fr-FR" sz="1600" dirty="0" smtClean="0">
+                <a:solidFill>
+                  <a:schemeClr val="bg1"/>
+                </a:solidFill>
+              </a:rPr>
+              <a:t>L’intégralité des images a été réalisés par nos soins, sauf pour les cartes qui ont été récupérées sur </a:t>
+            </a:r>
+            <a:r>
+              <a:rPr lang="fr-FR" sz="1600" dirty="0" err="1" smtClean="0">
+                <a:solidFill>
+                  <a:schemeClr val="bg1"/>
+                </a:solidFill>
+              </a:rPr>
+              <a:t>Wikimedia</a:t>
+            </a:r>
+            <a:r>
+              <a:rPr lang="fr-FR" sz="1600" dirty="0" smtClean="0">
+                <a:solidFill>
+                  <a:schemeClr val="bg1"/>
+                </a:solidFill>
+              </a:rPr>
+              <a:t> et modifiées.</a:t>
+            </a:r>
+            <a:endParaRPr lang="fr-FR" sz="1600" dirty="0">
+              <a:solidFill>
+                <a:schemeClr val="bg1"/>
+              </a:solidFill>
+            </a:endParaRPr>
+          </a:p>
+        </p:txBody>
+      </p:sp>
+    </p:spTree>
+  </p:cSld>
+  <p:clrMapOvr>
+    <a:masterClrMapping/>
+  </p:clrMapOvr>
+  <p:transition spd="slow">
+    <p:fade/>
+  </p:transition>
+  <p:timing>
+    <p:tnLst>
+      <p:par>
+        <p:cTn id="1" dur="indefinite" restart="never" nodeType="tmRoot"/>
+      </p:par>
+    </p:tnLst>
+  </p:timing>
+</p:sld>
+</file>
+
+<file path=ppt/slides/slide18.xml><?xml version="1.0" encoding="utf-8"?>
+<p:sld xmlns:a="http://schemas.openxmlformats.org/drawingml/2006/main" xmlns:r="http://schemas.openxmlformats.org/officeDocument/2006/relationships" xmlns:p="http://schemas.openxmlformats.org/presentationml/2006/main">
+  <p:cSld>
+    <p:spTree>
+      <p:nvGrpSpPr>
+        <p:cNvPr id="1" name=""/>
+        <p:cNvGrpSpPr/>
+        <p:nvPr/>
+      </p:nvGrpSpPr>
+      <p:grpSpPr>
+        <a:xfrm>
+          <a:off x="0" y="0"/>
+          <a:ext cx="0" cy="0"/>
+          <a:chOff x="0" y="0"/>
+          <a:chExt cx="0" cy="0"/>
+        </a:xfrm>
+      </p:grpSpPr>
+      <p:sp>
+        <p:nvSpPr>
+          <p:cNvPr id="2" name="Titre 1"/>
+          <p:cNvSpPr>
+            <a:spLocks noGrp="1"/>
+          </p:cNvSpPr>
+          <p:nvPr>
+            <p:ph type="title"/>
+          </p:nvPr>
+        </p:nvSpPr>
+        <p:spPr/>
+        <p:txBody>
+          <a:bodyPr>
+            <a:normAutofit fontScale="90000"/>
+          </a:bodyPr>
+          <a:lstStyle/>
+          <a:p>
+            <a:r>
+              <a:rPr lang="fr-FR" dirty="0" smtClean="0"/>
+              <a:t>Le fichier de configuration et l’interface dynamique</a:t>
+            </a:r>
+            <a:endParaRPr lang="fr-FR" dirty="0"/>
+          </a:p>
+        </p:txBody>
+      </p:sp>
+      <p:sp>
+        <p:nvSpPr>
+          <p:cNvPr id="3" name="Espace réservé du contenu 2"/>
+          <p:cNvSpPr>
+            <a:spLocks noGrp="1"/>
+          </p:cNvSpPr>
+          <p:nvPr>
+            <p:ph idx="1"/>
+          </p:nvPr>
+        </p:nvSpPr>
+        <p:spPr/>
+        <p:txBody>
+          <a:bodyPr/>
+          <a:lstStyle/>
+          <a:p>
+            <a:r>
+              <a:rPr lang="fr-FR" dirty="0" smtClean="0"/>
+              <a:t>Grâce au fichier de </a:t>
+            </a:r>
+            <a:r>
+              <a:rPr lang="fr-FR" dirty="0" err="1" smtClean="0"/>
+              <a:t>configuration,on</a:t>
+            </a:r>
+            <a:r>
+              <a:rPr lang="fr-FR" dirty="0" smtClean="0"/>
+              <a:t> peut facilement personnaliser l’interface :</a:t>
+            </a:r>
+          </a:p>
+          <a:p>
+            <a:pPr lvl="1"/>
+            <a:r>
+              <a:rPr lang="fr-FR" dirty="0" smtClean="0"/>
+              <a:t>En changeant la langue</a:t>
+            </a:r>
+          </a:p>
+          <a:p>
+            <a:pPr lvl="1"/>
+            <a:r>
+              <a:rPr lang="fr-FR" dirty="0" smtClean="0"/>
+              <a:t>Le nombre de joueur</a:t>
+            </a:r>
+          </a:p>
+          <a:p>
+            <a:pPr lvl="1"/>
+            <a:r>
+              <a:rPr lang="fr-FR" dirty="0" smtClean="0"/>
+              <a:t>L’argent de départ</a:t>
+            </a:r>
+            <a:endParaRPr lang="fr-FR" dirty="0"/>
+          </a:p>
+        </p:txBody>
+      </p:sp>
+    </p:spTree>
+  </p:cSld>
+  <p:clrMapOvr>
+    <a:masterClrMapping/>
+  </p:clrMapOvr>
+  <p:transition spd="slow">
+    <p:fade/>
+  </p:transition>
+  <p:timing>
+    <p:tnLst>
+      <p:par>
+        <p:cTn id="1" dur="indefinite" restart="never" nodeType="tmRoot"/>
+      </p:par>
+    </p:tnLst>
+  </p:timing>
+</p:sld>
+</file>
+
+<file path=ppt/slides/slide19.xml><?xml version="1.0" encoding="utf-8"?>
+<p:sld xmlns:a="http://schemas.openxmlformats.org/drawingml/2006/main" xmlns:r="http://schemas.openxmlformats.org/officeDocument/2006/relationships" xmlns:p="http://schemas.openxmlformats.org/presentationml/2006/main">
+  <p:cSld>
+    <p:spTree>
+      <p:nvGrpSpPr>
+        <p:cNvPr id="1" name=""/>
+        <p:cNvGrpSpPr/>
+        <p:nvPr/>
+      </p:nvGrpSpPr>
+      <p:grpSpPr>
+        <a:xfrm>
+          <a:off x="0" y="0"/>
+          <a:ext cx="0" cy="0"/>
+          <a:chOff x="0" y="0"/>
+          <a:chExt cx="0" cy="0"/>
+        </a:xfrm>
+      </p:grpSpPr>
+      <p:sp>
+        <p:nvSpPr>
+          <p:cNvPr id="10" name="Ellipse 9"/>
+          <p:cNvSpPr/>
+          <p:nvPr/>
+        </p:nvSpPr>
+        <p:spPr>
+          <a:xfrm>
+            <a:off x="642910" y="1785926"/>
+            <a:ext cx="7858180" cy="4643470"/>
+          </a:xfrm>
+          <a:prstGeom prst="ellipse">
+            <a:avLst/>
+          </a:prstGeom>
+        </p:spPr>
+        <p:style>
+          <a:lnRef idx="1">
+            <a:schemeClr val="accent6"/>
+          </a:lnRef>
+          <a:fillRef idx="3">
+            <a:schemeClr val="accent6"/>
+          </a:fillRef>
+          <a:effectRef idx="2">
+            <a:schemeClr val="accent6"/>
+          </a:effectRef>
+          <a:fontRef idx="minor">
+            <a:schemeClr val="lt1"/>
+          </a:fontRef>
+        </p:style>
+        <p:txBody>
+          <a:bodyPr rtlCol="0" anchor="ctr"/>
+          <a:lstStyle/>
+          <a:p>
+            <a:pPr algn="ctr"/>
+            <a:r>
+              <a:rPr lang="fr-FR" dirty="0" smtClean="0"/>
+              <a:t>Exécution pour chaque joueur</a:t>
+            </a:r>
+          </a:p>
+          <a:p>
+            <a:pPr algn="ctr"/>
+            <a:r>
+              <a:rPr lang="fr-FR" dirty="0" smtClean="0"/>
+              <a:t>Puis trie</a:t>
+            </a:r>
+          </a:p>
+          <a:p>
+            <a:pPr algn="ctr"/>
+            <a:r>
+              <a:rPr lang="fr-FR" dirty="0" smtClean="0"/>
+              <a:t>Et </a:t>
+            </a:r>
+            <a:r>
+              <a:rPr lang="fr-FR" dirty="0" err="1" smtClean="0"/>
+              <a:t>determination</a:t>
+            </a:r>
+            <a:r>
+              <a:rPr lang="fr-FR" dirty="0" smtClean="0"/>
+              <a:t> du vainqueur</a:t>
+            </a:r>
+            <a:endParaRPr lang="fr-FR" dirty="0"/>
+          </a:p>
+        </p:txBody>
+      </p:sp>
+      <p:sp>
+        <p:nvSpPr>
+          <p:cNvPr id="2" name="Titre 1"/>
+          <p:cNvSpPr>
+            <a:spLocks noGrp="1"/>
+          </p:cNvSpPr>
+          <p:nvPr>
+            <p:ph type="title"/>
+          </p:nvPr>
+        </p:nvSpPr>
+        <p:spPr/>
+        <p:txBody>
+          <a:bodyPr>
+            <a:normAutofit fontScale="90000"/>
+          </a:bodyPr>
+          <a:lstStyle/>
+          <a:p>
+            <a:r>
+              <a:rPr lang="fr-FR" dirty="0" smtClean="0"/>
+              <a:t>L’identification du vainqueur et ça main gagnante :</a:t>
+            </a:r>
+            <a:endParaRPr lang="fr-FR" dirty="0"/>
+          </a:p>
+        </p:txBody>
+      </p:sp>
+      <p:graphicFrame>
+        <p:nvGraphicFramePr>
+          <p:cNvPr id="5" name="Diagramme 4"/>
+          <p:cNvGraphicFramePr/>
+          <p:nvPr/>
+        </p:nvGraphicFramePr>
+        <p:xfrm>
+          <a:off x="500034" y="1785926"/>
+          <a:ext cx="8286808" cy="4857784"/>
+        </p:xfrm>
+        <a:graphic>
+          <a:graphicData uri="http://schemas.openxmlformats.org/drawingml/2006/diagram">
+            <dgm:relIds xmlns:dgm="http://schemas.openxmlformats.org/drawingml/2006/diagram" xmlns:r="http://schemas.openxmlformats.org/officeDocument/2006/relationships" r:dm="rId2" r:lo="rId3" r:qs="rId4" r:cs="rId5"/>
+          </a:graphicData>
+        </a:graphic>
+      </p:graphicFrame>
+    </p:spTree>
+  </p:cSld>
+  <p:clrMapOvr>
+    <a:masterClrMapping/>
+  </p:clrMapOvr>
+  <p:transition spd="slow">
+    <p:fade/>
+  </p:transition>
+  <p:timing>
+    <p:tnLst>
+      <p:par>
+        <p:cTn id="1" dur="indefinite" restart="never" nodeType="tmRoot"/>
+      </p:par>
+    </p:tnLst>
+  </p:timing>
+</p:sld>
+</file>
+
 <file path=ppt/slides/slide2.xml><?xml version="1.0" encoding="utf-8"?>
 <p:sld xmlns:a="http://schemas.openxmlformats.org/drawingml/2006/main" xmlns:r="http://schemas.openxmlformats.org/officeDocument/2006/relationships" xmlns:p="http://schemas.openxmlformats.org/presentationml/2006/main">
   <p:cSld>
@@ -6353,6 +7311,126 @@
             <a:r>
               <a:rPr lang="fr-FR" dirty="0" smtClean="0"/>
               <a:t>Cahier des charges et commentaires</a:t>
+            </a:r>
+            <a:endParaRPr lang="fr-FR" dirty="0"/>
+          </a:p>
+        </p:txBody>
+      </p:sp>
+    </p:spTree>
+  </p:cSld>
+  <p:clrMapOvr>
+    <a:masterClrMapping/>
+  </p:clrMapOvr>
+  <p:transition spd="slow">
+    <p:fade/>
+  </p:transition>
+  <p:timing>
+    <p:tnLst>
+      <p:par>
+        <p:cTn id="1" dur="indefinite" restart="never" nodeType="tmRoot"/>
+      </p:par>
+    </p:tnLst>
+  </p:timing>
+</p:sld>
+</file>
+
+<file path=ppt/slides/slide20.xml><?xml version="1.0" encoding="utf-8"?>
+<p:sld xmlns:a="http://schemas.openxmlformats.org/drawingml/2006/main" xmlns:r="http://schemas.openxmlformats.org/officeDocument/2006/relationships" xmlns:p="http://schemas.openxmlformats.org/presentationml/2006/main">
+  <p:cSld>
+    <p:spTree>
+      <p:nvGrpSpPr>
+        <p:cNvPr id="1" name=""/>
+        <p:cNvGrpSpPr/>
+        <p:nvPr/>
+      </p:nvGrpSpPr>
+      <p:grpSpPr>
+        <a:xfrm>
+          <a:off x="0" y="0"/>
+          <a:ext cx="0" cy="0"/>
+          <a:chOff x="0" y="0"/>
+          <a:chExt cx="0" cy="0"/>
+        </a:xfrm>
+      </p:grpSpPr>
+      <p:sp>
+        <p:nvSpPr>
+          <p:cNvPr id="2" name="Titre 1"/>
+          <p:cNvSpPr>
+            <a:spLocks noGrp="1"/>
+          </p:cNvSpPr>
+          <p:nvPr>
+            <p:ph type="title"/>
+          </p:nvPr>
+        </p:nvSpPr>
+        <p:spPr/>
+        <p:txBody>
+          <a:bodyPr/>
+          <a:lstStyle/>
+          <a:p>
+            <a:r>
+              <a:rPr lang="fr-FR" dirty="0" smtClean="0"/>
+              <a:t>Ce que l’on a appris :</a:t>
+            </a:r>
+            <a:endParaRPr lang="fr-FR" dirty="0"/>
+          </a:p>
+        </p:txBody>
+      </p:sp>
+      <p:sp>
+        <p:nvSpPr>
+          <p:cNvPr id="3" name="Espace réservé du contenu 2"/>
+          <p:cNvSpPr>
+            <a:spLocks noGrp="1"/>
+          </p:cNvSpPr>
+          <p:nvPr>
+            <p:ph idx="1"/>
+          </p:nvPr>
+        </p:nvSpPr>
+        <p:spPr/>
+        <p:txBody>
+          <a:bodyPr/>
+          <a:lstStyle/>
+          <a:p>
+            <a:r>
+              <a:rPr lang="fr-FR" dirty="0" smtClean="0"/>
+              <a:t>Utiliser </a:t>
+            </a:r>
+            <a:r>
+              <a:rPr lang="fr-FR" dirty="0" err="1" smtClean="0"/>
+              <a:t>Codeblocks</a:t>
+            </a:r>
+            <a:r>
+              <a:rPr lang="fr-FR" dirty="0" smtClean="0"/>
+              <a:t>, SVN, </a:t>
+            </a:r>
+            <a:r>
+              <a:rPr lang="fr-FR" dirty="0" err="1" smtClean="0"/>
+              <a:t>Valgrind</a:t>
+            </a:r>
+            <a:r>
+              <a:rPr lang="fr-FR" dirty="0" smtClean="0"/>
+              <a:t> et </a:t>
+            </a:r>
+            <a:r>
+              <a:rPr lang="fr-FR" dirty="0" err="1" smtClean="0"/>
+              <a:t>Doxygen</a:t>
+            </a:r>
+            <a:endParaRPr lang="fr-FR" dirty="0" smtClean="0"/>
+          </a:p>
+          <a:p>
+            <a:r>
+              <a:rPr lang="fr-FR" dirty="0" smtClean="0"/>
+              <a:t>Ecrire un cahier des charges et tout faire pour le respecter.</a:t>
+            </a:r>
+          </a:p>
+          <a:p>
+            <a:r>
+              <a:rPr lang="fr-FR" dirty="0" smtClean="0"/>
+              <a:t>Gérer le temps et le travail en équipe</a:t>
+            </a:r>
+          </a:p>
+          <a:p>
+            <a:r>
+              <a:rPr lang="fr-FR" dirty="0" smtClean="0"/>
+              <a:t>Programmer un affichage graphique en C</a:t>
             </a:r>
             <a:endParaRPr lang="fr-FR" dirty="0"/>
           </a:p>
@@ -6710,13 +7788,6 @@
               </a:rPr>
               <a:t>Langage</a:t>
             </a:r>
-            <a:endParaRPr lang="fr-FR" sz="1200" dirty="0" smtClean="0">
-              <a:solidFill>
-                <a:schemeClr val="tx1"/>
-              </a:solidFill>
-              <a:latin typeface="+mj-lt"/>
-              <a:cs typeface="Aharoni" pitchFamily="2" charset="-79"/>
-            </a:endParaRPr>
           </a:p>
         </p:txBody>
       </p:sp>
@@ -6824,13 +7895,6 @@
               </a:rPr>
               <a:t>Carte</a:t>
             </a:r>
-            <a:endParaRPr lang="fr-FR" sz="1200" dirty="0" smtClean="0">
-              <a:solidFill>
-                <a:schemeClr val="tx1"/>
-              </a:solidFill>
-              <a:latin typeface="+mj-lt"/>
-              <a:cs typeface="Aharoni" pitchFamily="2" charset="-79"/>
-            </a:endParaRPr>
           </a:p>
         </p:txBody>
       </p:sp>
@@ -6938,13 +8002,6 @@
               </a:rPr>
               <a:t>Jeu</a:t>
             </a:r>
-            <a:endParaRPr lang="fr-FR" sz="1200" dirty="0" smtClean="0">
-              <a:solidFill>
-                <a:schemeClr val="tx1"/>
-              </a:solidFill>
-              <a:latin typeface="+mj-lt"/>
-              <a:cs typeface="Aharoni" pitchFamily="2" charset="-79"/>
-            </a:endParaRPr>
           </a:p>
         </p:txBody>
       </p:sp>
@@ -7109,13 +8166,6 @@
               </a:rPr>
               <a:t>Table</a:t>
             </a:r>
-            <a:endParaRPr lang="fr-FR" sz="1200" dirty="0" smtClean="0">
-              <a:solidFill>
-                <a:schemeClr val="tx1"/>
-              </a:solidFill>
-              <a:latin typeface="+mj-lt"/>
-              <a:cs typeface="Aharoni" pitchFamily="2" charset="-79"/>
-            </a:endParaRPr>
           </a:p>
         </p:txBody>
       </p:sp>
@@ -7166,13 +8216,6 @@
               </a:rPr>
               <a:t>Joueur</a:t>
             </a:r>
-            <a:endParaRPr lang="fr-FR" sz="1200" dirty="0" smtClean="0">
-              <a:solidFill>
-                <a:schemeClr val="tx1"/>
-              </a:solidFill>
-              <a:latin typeface="+mj-lt"/>
-              <a:cs typeface="Aharoni" pitchFamily="2" charset="-79"/>
-            </a:endParaRPr>
           </a:p>
         </p:txBody>
       </p:sp>
@@ -7251,101 +8294,1073 @@
       </p:grpSpPr>
       <p:sp>
         <p:nvSpPr>
-          <p:cNvPr id="2" name="Titre 1"/>
-          <p:cNvSpPr>
-            <a:spLocks noGrp="1"/>
-          </p:cNvSpPr>
-          <p:nvPr>
-            <p:ph type="title"/>
-          </p:nvPr>
-        </p:nvSpPr>
-        <p:spPr/>
-        <p:txBody>
-          <a:bodyPr/>
-          <a:lstStyle/>
-          <a:p>
-            <a:r>
-              <a:rPr lang="fr-FR" dirty="0" smtClean="0"/>
-              <a:t>Un design sobre et soigné :</a:t>
-            </a:r>
-            <a:endParaRPr lang="fr-FR" dirty="0"/>
-          </a:p>
-        </p:txBody>
-      </p:sp>
-      <p:pic>
-        <p:nvPicPr>
-          <p:cNvPr id="4" name="Espace réservé du contenu 3" descr="captureLsp.png"/>
-          <p:cNvPicPr>
-            <a:picLocks noGrp="1" noChangeAspect="1"/>
-          </p:cNvPicPr>
-          <p:nvPr>
-            <p:ph idx="1"/>
-          </p:nvPr>
-        </p:nvPicPr>
-        <p:blipFill>
-          <a:blip r:embed="rId2"/>
-          <a:stretch>
-            <a:fillRect/>
-          </a:stretch>
-        </p:blipFill>
+          <p:cNvPr id="4" name="ZoneTexte 3"/>
+          <p:cNvSpPr txBox="1"/>
+          <p:nvPr/>
+        </p:nvSpPr>
         <p:spPr>
           <a:xfrm>
-            <a:off x="1636086" y="1285860"/>
-            <a:ext cx="5871827" cy="4525963"/>
-          </a:xfrm>
-        </p:spPr>
-      </p:pic>
-      <p:sp>
-        <p:nvSpPr>
-          <p:cNvPr id="5" name="ZoneTexte 4"/>
-          <p:cNvSpPr txBox="1"/>
-          <p:nvPr/>
-        </p:nvSpPr>
-        <p:spPr>
-          <a:xfrm>
-            <a:off x="1857356" y="5934670"/>
-            <a:ext cx="5715040" cy="584775"/>
+            <a:off x="357158" y="3145991"/>
+            <a:ext cx="2500329" cy="461665"/>
           </a:xfrm>
           <a:prstGeom prst="rect">
             <a:avLst/>
           </a:prstGeom>
-          <a:noFill/>
+          <a:ln/>
         </p:spPr>
+        <p:style>
+          <a:lnRef idx="1">
+            <a:schemeClr val="accent6"/>
+          </a:lnRef>
+          <a:fillRef idx="2">
+            <a:schemeClr val="accent6"/>
+          </a:fillRef>
+          <a:effectRef idx="1">
+            <a:schemeClr val="accent6"/>
+          </a:effectRef>
+          <a:fontRef idx="minor">
+            <a:schemeClr val="dk1"/>
+          </a:fontRef>
+        </p:style>
         <p:txBody>
           <a:bodyPr wrap="square" rtlCol="0">
             <a:spAutoFit/>
           </a:bodyPr>
           <a:lstStyle/>
           <a:p>
-            <a:pPr algn="just"/>
-            <a:r>
-              <a:rPr lang="fr-FR" sz="1600" dirty="0" smtClean="0">
+            <a:pPr algn="ctr"/>
+            <a:r>
+              <a:rPr lang="fr-FR" sz="2400" dirty="0" err="1" smtClean="0">
                 <a:solidFill>
-                  <a:schemeClr val="bg1"/>
+                  <a:schemeClr val="tx1"/>
                 </a:solidFill>
+                <a:cs typeface="Aharoni" pitchFamily="2" charset="-79"/>
+                <a:hlinkClick r:id="rId2" action="ppaction://hlinksldjump"/>
               </a:rPr>
-              <a:t>L’intégralité des images a été réalisés par nos soins, sauf pour les cartes qui ont été récupérées sur </a:t>
-            </a:r>
-            <a:r>
-              <a:rPr lang="fr-FR" sz="1600" dirty="0" err="1" smtClean="0">
+              <a:t>MainCarte</a:t>
+            </a:r>
+            <a:endParaRPr lang="fr-FR" sz="2400" dirty="0" smtClean="0">
+              <a:solidFill>
+                <a:schemeClr val="tx1"/>
+              </a:solidFill>
+              <a:cs typeface="Aharoni" pitchFamily="2" charset="-79"/>
+            </a:endParaRPr>
+          </a:p>
+        </p:txBody>
+      </p:sp>
+      <p:sp>
+        <p:nvSpPr>
+          <p:cNvPr id="6" name="ZoneTexte 5"/>
+          <p:cNvSpPr txBox="1"/>
+          <p:nvPr/>
+        </p:nvSpPr>
+        <p:spPr>
+          <a:xfrm>
+            <a:off x="428596" y="5309542"/>
+            <a:ext cx="2357454" cy="461665"/>
+          </a:xfrm>
+          <a:prstGeom prst="rect">
+            <a:avLst/>
+          </a:prstGeom>
+          <a:ln/>
+        </p:spPr>
+        <p:style>
+          <a:lnRef idx="1">
+            <a:schemeClr val="accent6"/>
+          </a:lnRef>
+          <a:fillRef idx="2">
+            <a:schemeClr val="accent6"/>
+          </a:fillRef>
+          <a:effectRef idx="1">
+            <a:schemeClr val="accent6"/>
+          </a:effectRef>
+          <a:fontRef idx="minor">
+            <a:schemeClr val="dk1"/>
+          </a:fontRef>
+        </p:style>
+        <p:txBody>
+          <a:bodyPr wrap="square" rtlCol="0">
+            <a:spAutoFit/>
+          </a:bodyPr>
+          <a:lstStyle/>
+          <a:p>
+            <a:pPr algn="ctr"/>
+            <a:r>
+              <a:rPr lang="fr-FR" sz="2400" dirty="0" err="1" smtClean="0">
                 <a:solidFill>
-                  <a:schemeClr val="bg1"/>
+                  <a:schemeClr val="tx1"/>
                 </a:solidFill>
+                <a:cs typeface="Aharoni" pitchFamily="2" charset="-79"/>
               </a:rPr>
-              <a:t>Wikimedia</a:t>
-            </a:r>
-            <a:r>
-              <a:rPr lang="fr-FR" sz="1600" dirty="0" smtClean="0">
+              <a:t>PileCarte</a:t>
+            </a:r>
+            <a:endParaRPr lang="fr-FR" sz="2400" dirty="0" smtClean="0">
+              <a:solidFill>
+                <a:schemeClr val="tx1"/>
+              </a:solidFill>
+              <a:cs typeface="Aharoni" pitchFamily="2" charset="-79"/>
+            </a:endParaRPr>
+          </a:p>
+        </p:txBody>
+      </p:sp>
+      <p:sp>
+        <p:nvSpPr>
+          <p:cNvPr id="7" name="ZoneTexte 6"/>
+          <p:cNvSpPr txBox="1"/>
+          <p:nvPr/>
+        </p:nvSpPr>
+        <p:spPr>
+          <a:xfrm>
+            <a:off x="6786578" y="3880782"/>
+            <a:ext cx="1714511" cy="461665"/>
+          </a:xfrm>
+          <a:prstGeom prst="rect">
+            <a:avLst/>
+          </a:prstGeom>
+          <a:ln/>
+        </p:spPr>
+        <p:style>
+          <a:lnRef idx="1">
+            <a:schemeClr val="accent6"/>
+          </a:lnRef>
+          <a:fillRef idx="2">
+            <a:schemeClr val="accent6"/>
+          </a:fillRef>
+          <a:effectRef idx="1">
+            <a:schemeClr val="accent6"/>
+          </a:effectRef>
+          <a:fontRef idx="minor">
+            <a:schemeClr val="dk1"/>
+          </a:fontRef>
+        </p:style>
+        <p:txBody>
+          <a:bodyPr wrap="square" rtlCol="0">
+            <a:spAutoFit/>
+          </a:bodyPr>
+          <a:lstStyle/>
+          <a:p>
+            <a:pPr algn="ctr"/>
+            <a:r>
+              <a:rPr lang="fr-FR" sz="2400" dirty="0" smtClean="0">
                 <a:solidFill>
-                  <a:schemeClr val="bg1"/>
+                  <a:schemeClr val="tx1"/>
                 </a:solidFill>
+                <a:cs typeface="Aharoni" pitchFamily="2" charset="-79"/>
               </a:rPr>
-              <a:t> et modifiées.</a:t>
-            </a:r>
-            <a:endParaRPr lang="fr-FR" sz="1600" dirty="0">
+              <a:t>Table</a:t>
+            </a:r>
+          </a:p>
+        </p:txBody>
+      </p:sp>
+      <p:sp>
+        <p:nvSpPr>
+          <p:cNvPr id="8" name="ZoneTexte 7"/>
+          <p:cNvSpPr txBox="1"/>
+          <p:nvPr/>
+        </p:nvSpPr>
+        <p:spPr>
+          <a:xfrm>
+            <a:off x="6786578" y="5095228"/>
+            <a:ext cx="1714512" cy="461665"/>
+          </a:xfrm>
+          <a:prstGeom prst="rect">
+            <a:avLst/>
+          </a:prstGeom>
+          <a:ln/>
+        </p:spPr>
+        <p:style>
+          <a:lnRef idx="1">
+            <a:schemeClr val="accent6"/>
+          </a:lnRef>
+          <a:fillRef idx="2">
+            <a:schemeClr val="accent6"/>
+          </a:fillRef>
+          <a:effectRef idx="1">
+            <a:schemeClr val="accent6"/>
+          </a:effectRef>
+          <a:fontRef idx="minor">
+            <a:schemeClr val="dk1"/>
+          </a:fontRef>
+        </p:style>
+        <p:txBody>
+          <a:bodyPr wrap="square" rtlCol="0">
+            <a:spAutoFit/>
+          </a:bodyPr>
+          <a:lstStyle/>
+          <a:p>
+            <a:pPr algn="ctr"/>
+            <a:r>
+              <a:rPr lang="fr-FR" sz="2400" dirty="0" smtClean="0">
+                <a:solidFill>
+                  <a:schemeClr val="tx1"/>
+                </a:solidFill>
+                <a:cs typeface="Aharoni" pitchFamily="2" charset="-79"/>
+              </a:rPr>
+              <a:t>Joueur</a:t>
+            </a:r>
+          </a:p>
+        </p:txBody>
+      </p:sp>
+      <p:sp>
+        <p:nvSpPr>
+          <p:cNvPr id="9" name="ZoneTexte 8"/>
+          <p:cNvSpPr txBox="1"/>
+          <p:nvPr/>
+        </p:nvSpPr>
+        <p:spPr>
+          <a:xfrm>
+            <a:off x="642910" y="4143380"/>
+            <a:ext cx="1928826" cy="461665"/>
+          </a:xfrm>
+          <a:prstGeom prst="rect">
+            <a:avLst/>
+          </a:prstGeom>
+          <a:ln/>
+        </p:spPr>
+        <p:style>
+          <a:lnRef idx="1">
+            <a:schemeClr val="accent6"/>
+          </a:lnRef>
+          <a:fillRef idx="2">
+            <a:schemeClr val="accent6"/>
+          </a:fillRef>
+          <a:effectRef idx="1">
+            <a:schemeClr val="accent6"/>
+          </a:effectRef>
+          <a:fontRef idx="minor">
+            <a:schemeClr val="dk1"/>
+          </a:fontRef>
+        </p:style>
+        <p:txBody>
+          <a:bodyPr wrap="square" rtlCol="0">
+            <a:spAutoFit/>
+          </a:bodyPr>
+          <a:lstStyle/>
+          <a:p>
+            <a:pPr algn="ctr"/>
+            <a:r>
+              <a:rPr lang="fr-FR" sz="2400" dirty="0" smtClean="0">
+                <a:solidFill>
+                  <a:schemeClr val="tx1"/>
+                </a:solidFill>
+                <a:cs typeface="Aharoni" pitchFamily="2" charset="-79"/>
+              </a:rPr>
+              <a:t>Carte</a:t>
+            </a:r>
+          </a:p>
+        </p:txBody>
+      </p:sp>
+      <p:sp>
+        <p:nvSpPr>
+          <p:cNvPr id="12" name="ZoneTexte 11"/>
+          <p:cNvSpPr txBox="1"/>
+          <p:nvPr/>
+        </p:nvSpPr>
+        <p:spPr>
+          <a:xfrm>
+            <a:off x="2143108" y="1500174"/>
+            <a:ext cx="4572032" cy="523220"/>
+          </a:xfrm>
+          <a:prstGeom prst="rect">
+            <a:avLst/>
+          </a:prstGeom>
+          <a:ln/>
+        </p:spPr>
+        <p:style>
+          <a:lnRef idx="1">
+            <a:schemeClr val="accent6"/>
+          </a:lnRef>
+          <a:fillRef idx="2">
+            <a:schemeClr val="accent6"/>
+          </a:fillRef>
+          <a:effectRef idx="1">
+            <a:schemeClr val="accent6"/>
+          </a:effectRef>
+          <a:fontRef idx="minor">
+            <a:schemeClr val="dk1"/>
+          </a:fontRef>
+        </p:style>
+        <p:txBody>
+          <a:bodyPr wrap="square" rtlCol="0">
+            <a:spAutoFit/>
+          </a:bodyPr>
+          <a:lstStyle/>
+          <a:p>
+            <a:pPr algn="ctr"/>
+            <a:r>
+              <a:rPr lang="fr-FR" sz="2800" dirty="0" err="1" smtClean="0">
+                <a:solidFill>
+                  <a:schemeClr val="tx1"/>
+                </a:solidFill>
+                <a:cs typeface="Aharoni" pitchFamily="2" charset="-79"/>
+                <a:hlinkClick r:id="rId3" action="ppaction://hlinksldjump"/>
+              </a:rPr>
+              <a:t>AfficheDynamique</a:t>
+            </a:r>
+            <a:endParaRPr lang="fr-FR" sz="2800" dirty="0" smtClean="0">
               <a:solidFill>
-                <a:schemeClr val="bg1"/>
+                <a:schemeClr val="tx1"/>
               </a:solidFill>
+              <a:cs typeface="Aharoni" pitchFamily="2" charset="-79"/>
+            </a:endParaRPr>
+          </a:p>
+        </p:txBody>
+      </p:sp>
+      <p:sp>
+        <p:nvSpPr>
+          <p:cNvPr id="10" name="ZoneTexte 9"/>
+          <p:cNvSpPr txBox="1"/>
+          <p:nvPr/>
+        </p:nvSpPr>
+        <p:spPr>
+          <a:xfrm>
+            <a:off x="3643306" y="3386080"/>
+            <a:ext cx="2000264" cy="830997"/>
+          </a:xfrm>
+          <a:prstGeom prst="rect">
+            <a:avLst/>
+          </a:prstGeom>
+          <a:ln/>
+        </p:spPr>
+        <p:style>
+          <a:lnRef idx="1">
+            <a:schemeClr val="accent6"/>
+          </a:lnRef>
+          <a:fillRef idx="2">
+            <a:schemeClr val="accent6"/>
+          </a:fillRef>
+          <a:effectRef idx="1">
+            <a:schemeClr val="accent6"/>
+          </a:effectRef>
+          <a:fontRef idx="minor">
+            <a:schemeClr val="dk1"/>
+          </a:fontRef>
+        </p:style>
+        <p:txBody>
+          <a:bodyPr wrap="square" rtlCol="0">
+            <a:spAutoFit/>
+          </a:bodyPr>
+          <a:lstStyle/>
+          <a:p>
+            <a:pPr algn="ctr"/>
+            <a:r>
+              <a:rPr lang="fr-FR" sz="4800" dirty="0" smtClean="0">
+                <a:solidFill>
+                  <a:schemeClr val="tx1"/>
+                </a:solidFill>
+                <a:cs typeface="Aharoni" pitchFamily="2" charset="-79"/>
+              </a:rPr>
+              <a:t>Jeu</a:t>
+            </a:r>
+          </a:p>
+        </p:txBody>
+      </p:sp>
+      <p:sp>
+        <p:nvSpPr>
+          <p:cNvPr id="26" name="ZoneTexte 25"/>
+          <p:cNvSpPr txBox="1"/>
+          <p:nvPr/>
+        </p:nvSpPr>
+        <p:spPr>
+          <a:xfrm>
+            <a:off x="3643307" y="5133629"/>
+            <a:ext cx="2428891" cy="461665"/>
+          </a:xfrm>
+          <a:prstGeom prst="rect">
+            <a:avLst/>
+          </a:prstGeom>
+          <a:ln/>
+        </p:spPr>
+        <p:style>
+          <a:lnRef idx="1">
+            <a:schemeClr val="accent6"/>
+          </a:lnRef>
+          <a:fillRef idx="2">
+            <a:schemeClr val="accent6"/>
+          </a:fillRef>
+          <a:effectRef idx="1">
+            <a:schemeClr val="accent6"/>
+          </a:effectRef>
+          <a:fontRef idx="minor">
+            <a:schemeClr val="dk1"/>
+          </a:fontRef>
+        </p:style>
+        <p:txBody>
+          <a:bodyPr wrap="square" rtlCol="0">
+            <a:spAutoFit/>
+          </a:bodyPr>
+          <a:lstStyle/>
+          <a:p>
+            <a:pPr algn="ctr"/>
+            <a:r>
+              <a:rPr lang="fr-FR" sz="2400" dirty="0" err="1" smtClean="0">
+                <a:solidFill>
+                  <a:schemeClr val="tx1"/>
+                </a:solidFill>
+                <a:cs typeface="Aharoni" pitchFamily="2" charset="-79"/>
+              </a:rPr>
+              <a:t>IArtificielle</a:t>
+            </a:r>
+            <a:endParaRPr lang="fr-FR" sz="2400" dirty="0" smtClean="0">
+              <a:solidFill>
+                <a:schemeClr val="tx1"/>
+              </a:solidFill>
+              <a:cs typeface="Aharoni" pitchFamily="2" charset="-79"/>
+            </a:endParaRPr>
+          </a:p>
+        </p:txBody>
+      </p:sp>
+      <p:sp>
+        <p:nvSpPr>
+          <p:cNvPr id="13" name="Rectangle 12"/>
+          <p:cNvSpPr/>
+          <p:nvPr/>
+        </p:nvSpPr>
+        <p:spPr>
+          <a:xfrm>
+            <a:off x="6572264" y="2237708"/>
+            <a:ext cx="2285984" cy="928694"/>
+          </a:xfrm>
+          <a:prstGeom prst="rect">
+            <a:avLst/>
+          </a:prstGeom>
+        </p:spPr>
+        <p:style>
+          <a:lnRef idx="1">
+            <a:schemeClr val="accent6"/>
+          </a:lnRef>
+          <a:fillRef idx="2">
+            <a:schemeClr val="accent6"/>
+          </a:fillRef>
+          <a:effectRef idx="1">
+            <a:schemeClr val="accent6"/>
+          </a:effectRef>
+          <a:fontRef idx="minor">
+            <a:schemeClr val="dk1"/>
+          </a:fontRef>
+        </p:style>
+        <p:txBody>
+          <a:bodyPr rtlCol="0" anchor="ctr"/>
+          <a:lstStyle/>
+          <a:p>
+            <a:pPr algn="ctr"/>
+            <a:r>
+              <a:rPr lang="fr-FR" sz="2400" dirty="0" err="1" smtClean="0">
+                <a:solidFill>
+                  <a:schemeClr val="tx1"/>
+                </a:solidFill>
+                <a:cs typeface="Aharoni" pitchFamily="2" charset="-79"/>
+              </a:rPr>
+              <a:t>AfficheSdl</a:t>
+            </a:r>
+            <a:endParaRPr lang="fr-FR" sz="2400" dirty="0" smtClean="0">
+              <a:solidFill>
+                <a:schemeClr val="tx1"/>
+              </a:solidFill>
+              <a:cs typeface="Aharoni" pitchFamily="2" charset="-79"/>
+            </a:endParaRPr>
+          </a:p>
+        </p:txBody>
+      </p:sp>
+      <p:sp>
+        <p:nvSpPr>
+          <p:cNvPr id="16" name="Rectangle 15"/>
+          <p:cNvSpPr/>
+          <p:nvPr/>
+        </p:nvSpPr>
+        <p:spPr>
+          <a:xfrm>
+            <a:off x="71406" y="2237708"/>
+            <a:ext cx="1857388" cy="642942"/>
+          </a:xfrm>
+          <a:prstGeom prst="rect">
+            <a:avLst/>
+          </a:prstGeom>
+        </p:spPr>
+        <p:style>
+          <a:lnRef idx="1">
+            <a:schemeClr val="accent6"/>
+          </a:lnRef>
+          <a:fillRef idx="2">
+            <a:schemeClr val="accent6"/>
+          </a:fillRef>
+          <a:effectRef idx="1">
+            <a:schemeClr val="accent6"/>
+          </a:effectRef>
+          <a:fontRef idx="minor">
+            <a:schemeClr val="dk1"/>
+          </a:fontRef>
+        </p:style>
+        <p:txBody>
+          <a:bodyPr rtlCol="0" anchor="ctr"/>
+          <a:lstStyle/>
+          <a:p>
+            <a:pPr algn="ctr"/>
+            <a:r>
+              <a:rPr lang="fr-FR" sz="2400" dirty="0" smtClean="0">
+                <a:solidFill>
+                  <a:schemeClr val="tx1"/>
+                </a:solidFill>
+                <a:cs typeface="Aharoni" pitchFamily="2" charset="-79"/>
+                <a:hlinkClick r:id="rId4"/>
+              </a:rPr>
+              <a:t>Langage</a:t>
+            </a:r>
+            <a:endParaRPr lang="fr-FR" sz="2400" dirty="0">
+              <a:solidFill>
+                <a:schemeClr val="tx1"/>
+              </a:solidFill>
+              <a:cs typeface="Aharoni" pitchFamily="2" charset="-79"/>
+            </a:endParaRPr>
+          </a:p>
+        </p:txBody>
+      </p:sp>
+      <p:cxnSp>
+        <p:nvCxnSpPr>
+          <p:cNvPr id="72" name="Connecteur en angle 71"/>
+          <p:cNvCxnSpPr>
+            <a:stCxn id="4" idx="2"/>
+            <a:endCxn id="9" idx="0"/>
+          </p:cNvCxnSpPr>
+          <p:nvPr/>
+        </p:nvCxnSpPr>
+        <p:spPr>
+          <a:xfrm rot="5400000">
+            <a:off x="1339461" y="3875518"/>
+            <a:ext cx="535724" cy="1588"/>
+          </a:xfrm>
+          <a:prstGeom prst="bentConnector3">
+            <a:avLst>
+              <a:gd name="adj1" fmla="val 50000"/>
+            </a:avLst>
+          </a:prstGeom>
+          <a:ln>
+            <a:tailEnd type="arrow"/>
+          </a:ln>
+        </p:spPr>
+        <p:style>
+          <a:lnRef idx="1">
+            <a:schemeClr val="accent1"/>
+          </a:lnRef>
+          <a:fillRef idx="0">
+            <a:schemeClr val="accent1"/>
+          </a:fillRef>
+          <a:effectRef idx="0">
+            <a:schemeClr val="accent1"/>
+          </a:effectRef>
+          <a:fontRef idx="minor">
+            <a:schemeClr val="tx1"/>
+          </a:fontRef>
+        </p:style>
+      </p:cxnSp>
+      <p:cxnSp>
+        <p:nvCxnSpPr>
+          <p:cNvPr id="74" name="Connecteur en angle 73"/>
+          <p:cNvCxnSpPr>
+            <a:stCxn id="6" idx="0"/>
+            <a:endCxn id="9" idx="2"/>
+          </p:cNvCxnSpPr>
+          <p:nvPr/>
+        </p:nvCxnSpPr>
+        <p:spPr>
+          <a:xfrm rot="5400000" flipH="1" flipV="1">
+            <a:off x="1255075" y="4957294"/>
+            <a:ext cx="704497" cy="1588"/>
+          </a:xfrm>
+          <a:prstGeom prst="bentConnector3">
+            <a:avLst>
+              <a:gd name="adj1" fmla="val 50000"/>
+            </a:avLst>
+          </a:prstGeom>
+          <a:ln>
+            <a:tailEnd type="arrow"/>
+          </a:ln>
+        </p:spPr>
+        <p:style>
+          <a:lnRef idx="1">
+            <a:schemeClr val="accent1"/>
+          </a:lnRef>
+          <a:fillRef idx="0">
+            <a:schemeClr val="accent1"/>
+          </a:fillRef>
+          <a:effectRef idx="0">
+            <a:schemeClr val="accent1"/>
+          </a:effectRef>
+          <a:fontRef idx="minor">
+            <a:schemeClr val="tx1"/>
+          </a:fontRef>
+        </p:style>
+      </p:cxnSp>
+      <p:cxnSp>
+        <p:nvCxnSpPr>
+          <p:cNvPr id="76" name="Connecteur en angle 75"/>
+          <p:cNvCxnSpPr>
+            <a:stCxn id="12" idx="2"/>
+            <a:endCxn id="10" idx="0"/>
+          </p:cNvCxnSpPr>
+          <p:nvPr/>
+        </p:nvCxnSpPr>
+        <p:spPr>
+          <a:xfrm rot="16200000" flipH="1">
+            <a:off x="3854938" y="2597580"/>
+            <a:ext cx="1362686" cy="214314"/>
+          </a:xfrm>
+          <a:prstGeom prst="bentConnector3">
+            <a:avLst>
+              <a:gd name="adj1" fmla="val 50000"/>
+            </a:avLst>
+          </a:prstGeom>
+          <a:ln>
+            <a:tailEnd type="arrow"/>
+          </a:ln>
+        </p:spPr>
+        <p:style>
+          <a:lnRef idx="1">
+            <a:schemeClr val="accent1"/>
+          </a:lnRef>
+          <a:fillRef idx="0">
+            <a:schemeClr val="accent1"/>
+          </a:fillRef>
+          <a:effectRef idx="0">
+            <a:schemeClr val="accent1"/>
+          </a:effectRef>
+          <a:fontRef idx="minor">
+            <a:schemeClr val="tx1"/>
+          </a:fontRef>
+        </p:style>
+      </p:cxnSp>
+      <p:cxnSp>
+        <p:nvCxnSpPr>
+          <p:cNvPr id="80" name="Forme 79"/>
+          <p:cNvCxnSpPr>
+            <a:stCxn id="12" idx="3"/>
+            <a:endCxn id="13" idx="0"/>
+          </p:cNvCxnSpPr>
+          <p:nvPr/>
+        </p:nvCxnSpPr>
+        <p:spPr>
+          <a:xfrm>
+            <a:off x="6715140" y="1761784"/>
+            <a:ext cx="1000116" cy="475924"/>
+          </a:xfrm>
+          <a:prstGeom prst="bentConnector2">
+            <a:avLst/>
+          </a:prstGeom>
+          <a:ln>
+            <a:tailEnd type="arrow"/>
+          </a:ln>
+        </p:spPr>
+        <p:style>
+          <a:lnRef idx="1">
+            <a:schemeClr val="accent1"/>
+          </a:lnRef>
+          <a:fillRef idx="0">
+            <a:schemeClr val="accent1"/>
+          </a:fillRef>
+          <a:effectRef idx="0">
+            <a:schemeClr val="accent1"/>
+          </a:effectRef>
+          <a:fontRef idx="minor">
+            <a:schemeClr val="tx1"/>
+          </a:fontRef>
+        </p:style>
+      </p:cxnSp>
+      <p:cxnSp>
+        <p:nvCxnSpPr>
+          <p:cNvPr id="86" name="Forme 85"/>
+          <p:cNvCxnSpPr>
+            <a:stCxn id="12" idx="1"/>
+            <a:endCxn id="16" idx="0"/>
+          </p:cNvCxnSpPr>
+          <p:nvPr/>
+        </p:nvCxnSpPr>
+        <p:spPr>
+          <a:xfrm rot="10800000" flipV="1">
+            <a:off x="1000100" y="1761784"/>
+            <a:ext cx="1143008" cy="475924"/>
+          </a:xfrm>
+          <a:prstGeom prst="bentConnector2">
+            <a:avLst/>
+          </a:prstGeom>
+          <a:ln>
+            <a:tailEnd type="arrow"/>
+          </a:ln>
+        </p:spPr>
+        <p:style>
+          <a:lnRef idx="1">
+            <a:schemeClr val="accent1"/>
+          </a:lnRef>
+          <a:fillRef idx="0">
+            <a:schemeClr val="accent1"/>
+          </a:fillRef>
+          <a:effectRef idx="0">
+            <a:schemeClr val="accent1"/>
+          </a:effectRef>
+          <a:fontRef idx="minor">
+            <a:schemeClr val="tx1"/>
+          </a:fontRef>
+        </p:style>
+      </p:cxnSp>
+      <p:cxnSp>
+        <p:nvCxnSpPr>
+          <p:cNvPr id="88" name="Connecteur en angle 87"/>
+          <p:cNvCxnSpPr>
+            <a:stCxn id="10" idx="2"/>
+            <a:endCxn id="26" idx="0"/>
+          </p:cNvCxnSpPr>
+          <p:nvPr/>
+        </p:nvCxnSpPr>
+        <p:spPr>
+          <a:xfrm rot="16200000" flipH="1">
+            <a:off x="4292319" y="4568195"/>
+            <a:ext cx="916552" cy="214315"/>
+          </a:xfrm>
+          <a:prstGeom prst="bentConnector3">
+            <a:avLst>
+              <a:gd name="adj1" fmla="val 50000"/>
+            </a:avLst>
+          </a:prstGeom>
+          <a:ln>
+            <a:tailEnd type="arrow"/>
+          </a:ln>
+        </p:spPr>
+        <p:style>
+          <a:lnRef idx="1">
+            <a:schemeClr val="accent1"/>
+          </a:lnRef>
+          <a:fillRef idx="0">
+            <a:schemeClr val="accent1"/>
+          </a:fillRef>
+          <a:effectRef idx="0">
+            <a:schemeClr val="accent1"/>
+          </a:effectRef>
+          <a:fontRef idx="minor">
+            <a:schemeClr val="tx1"/>
+          </a:fontRef>
+        </p:style>
+      </p:cxnSp>
+      <p:cxnSp>
+        <p:nvCxnSpPr>
+          <p:cNvPr id="90" name="Connecteur en angle 89"/>
+          <p:cNvCxnSpPr>
+            <a:stCxn id="10" idx="1"/>
+            <a:endCxn id="4" idx="3"/>
+          </p:cNvCxnSpPr>
+          <p:nvPr/>
+        </p:nvCxnSpPr>
+        <p:spPr>
+          <a:xfrm rot="10800000">
+            <a:off x="2857488" y="3376825"/>
+            <a:ext cx="785819" cy="424755"/>
+          </a:xfrm>
+          <a:prstGeom prst="bentConnector3">
+            <a:avLst>
+              <a:gd name="adj1" fmla="val 50000"/>
+            </a:avLst>
+          </a:prstGeom>
+          <a:ln>
+            <a:tailEnd type="arrow"/>
+          </a:ln>
+        </p:spPr>
+        <p:style>
+          <a:lnRef idx="1">
+            <a:schemeClr val="accent1"/>
+          </a:lnRef>
+          <a:fillRef idx="0">
+            <a:schemeClr val="accent1"/>
+          </a:fillRef>
+          <a:effectRef idx="0">
+            <a:schemeClr val="accent1"/>
+          </a:effectRef>
+          <a:fontRef idx="minor">
+            <a:schemeClr val="tx1"/>
+          </a:fontRef>
+        </p:style>
+      </p:cxnSp>
+      <p:cxnSp>
+        <p:nvCxnSpPr>
+          <p:cNvPr id="92" name="Connecteur en angle 91"/>
+          <p:cNvCxnSpPr>
+            <a:stCxn id="10" idx="3"/>
+            <a:endCxn id="7" idx="1"/>
+          </p:cNvCxnSpPr>
+          <p:nvPr/>
+        </p:nvCxnSpPr>
+        <p:spPr>
+          <a:xfrm>
+            <a:off x="5643570" y="3801579"/>
+            <a:ext cx="1143008" cy="310036"/>
+          </a:xfrm>
+          <a:prstGeom prst="bentConnector3">
+            <a:avLst>
+              <a:gd name="adj1" fmla="val 50000"/>
+            </a:avLst>
+          </a:prstGeom>
+          <a:ln>
+            <a:tailEnd type="arrow"/>
+          </a:ln>
+        </p:spPr>
+        <p:style>
+          <a:lnRef idx="1">
+            <a:schemeClr val="accent1"/>
+          </a:lnRef>
+          <a:fillRef idx="0">
+            <a:schemeClr val="accent1"/>
+          </a:fillRef>
+          <a:effectRef idx="0">
+            <a:schemeClr val="accent1"/>
+          </a:effectRef>
+          <a:fontRef idx="minor">
+            <a:schemeClr val="tx1"/>
+          </a:fontRef>
+        </p:style>
+      </p:cxnSp>
+      <p:cxnSp>
+        <p:nvCxnSpPr>
+          <p:cNvPr id="94" name="Connecteur en angle 93"/>
+          <p:cNvCxnSpPr>
+            <a:stCxn id="7" idx="2"/>
+            <a:endCxn id="8" idx="0"/>
+          </p:cNvCxnSpPr>
+          <p:nvPr/>
+        </p:nvCxnSpPr>
+        <p:spPr>
+          <a:xfrm rot="5400000">
+            <a:off x="7267444" y="4718837"/>
+            <a:ext cx="752781" cy="1588"/>
+          </a:xfrm>
+          <a:prstGeom prst="bentConnector3">
+            <a:avLst>
+              <a:gd name="adj1" fmla="val 50000"/>
+            </a:avLst>
+          </a:prstGeom>
+          <a:ln>
+            <a:tailEnd type="arrow"/>
+          </a:ln>
+        </p:spPr>
+        <p:style>
+          <a:lnRef idx="1">
+            <a:schemeClr val="accent1"/>
+          </a:lnRef>
+          <a:fillRef idx="0">
+            <a:schemeClr val="accent1"/>
+          </a:fillRef>
+          <a:effectRef idx="0">
+            <a:schemeClr val="accent1"/>
+          </a:effectRef>
+          <a:fontRef idx="minor">
+            <a:schemeClr val="tx1"/>
+          </a:fontRef>
+        </p:style>
+      </p:cxnSp>
+      <p:cxnSp>
+        <p:nvCxnSpPr>
+          <p:cNvPr id="99" name="Connecteur en angle 98"/>
+          <p:cNvCxnSpPr>
+            <a:stCxn id="6" idx="3"/>
+            <a:endCxn id="10" idx="1"/>
+          </p:cNvCxnSpPr>
+          <p:nvPr/>
+        </p:nvCxnSpPr>
+        <p:spPr>
+          <a:xfrm flipV="1">
+            <a:off x="2786050" y="3801579"/>
+            <a:ext cx="857256" cy="1738796"/>
+          </a:xfrm>
+          <a:prstGeom prst="bentConnector3">
+            <a:avLst>
+              <a:gd name="adj1" fmla="val 50000"/>
+            </a:avLst>
+          </a:prstGeom>
+          <a:ln>
+            <a:tailEnd type="arrow"/>
+          </a:ln>
+        </p:spPr>
+        <p:style>
+          <a:lnRef idx="1">
+            <a:schemeClr val="accent1"/>
+          </a:lnRef>
+          <a:fillRef idx="0">
+            <a:schemeClr val="accent1"/>
+          </a:fillRef>
+          <a:effectRef idx="0">
+            <a:schemeClr val="accent1"/>
+          </a:effectRef>
+          <a:fontRef idx="minor">
+            <a:schemeClr val="tx1"/>
+          </a:fontRef>
+        </p:style>
+      </p:cxnSp>
+      <p:sp>
+        <p:nvSpPr>
+          <p:cNvPr id="25" name="Titre 1"/>
+          <p:cNvSpPr txBox="1">
+            <a:spLocks/>
+          </p:cNvSpPr>
+          <p:nvPr/>
+        </p:nvSpPr>
+        <p:spPr>
+          <a:xfrm>
+            <a:off x="457200" y="71414"/>
+            <a:ext cx="8229600" cy="1143000"/>
+          </a:xfrm>
+          <a:prstGeom prst="rect">
+            <a:avLst/>
+          </a:prstGeom>
+        </p:spPr>
+        <p:txBody>
+          <a:bodyPr vert="horz" lIns="91440" tIns="45720" rIns="91440" bIns="45720" rtlCol="0" anchor="ctr">
+            <a:normAutofit/>
+            <a:scene3d>
+              <a:camera prst="orthographicFront"/>
+              <a:lightRig rig="glow" dir="tl">
+                <a:rot lat="0" lon="0" rev="5400000"/>
+              </a:lightRig>
+            </a:scene3d>
+            <a:sp3d extrusionH="57150" contourW="12700">
+              <a:bevelT w="38100" h="38100"/>
+              <a:contourClr>
+                <a:schemeClr val="accent6">
+                  <a:shade val="73000"/>
+                </a:schemeClr>
+              </a:contourClr>
+            </a:sp3d>
+          </a:bodyPr>
+          <a:lstStyle/>
+          <a:p>
+            <a:pPr marL="0" marR="0" lvl="0" indent="0" algn="ctr" defTabSz="914400" rtl="0" eaLnBrk="1" fontAlgn="auto" latinLnBrk="0" hangingPunct="1">
+              <a:lnSpc>
+                <a:spcPct val="100000"/>
+              </a:lnSpc>
+              <a:spcBef>
+                <a:spcPct val="0"/>
+              </a:spcBef>
+              <a:spcAft>
+                <a:spcPts val="0"/>
+              </a:spcAft>
+              <a:buClrTx/>
+              <a:buSzTx/>
+              <a:buFontTx/>
+              <a:buNone/>
+              <a:tabLst/>
+              <a:defRPr/>
+            </a:pPr>
+            <a:r>
+              <a:rPr kumimoji="0" lang="fr-FR" sz="4400" b="1" i="0" u="none" strike="noStrike" kern="1200" cap="none" spc="0" normalizeH="0" baseline="0" noProof="0" dirty="0" smtClean="0">
+                <a:ln w="11430"/>
+                <a:gradFill>
+                  <a:gsLst>
+                    <a:gs pos="0">
+                      <a:schemeClr val="accent6">
+                        <a:tint val="90000"/>
+                        <a:satMod val="120000"/>
+                      </a:schemeClr>
+                    </a:gs>
+                    <a:gs pos="25000">
+                      <a:schemeClr val="accent6">
+                        <a:tint val="93000"/>
+                        <a:satMod val="120000"/>
+                      </a:schemeClr>
+                    </a:gs>
+                    <a:gs pos="50000">
+                      <a:schemeClr val="accent6">
+                        <a:shade val="89000"/>
+                        <a:satMod val="110000"/>
+                      </a:schemeClr>
+                    </a:gs>
+                    <a:gs pos="75000">
+                      <a:schemeClr val="accent6">
+                        <a:tint val="93000"/>
+                        <a:satMod val="120000"/>
+                      </a:schemeClr>
+                    </a:gs>
+                    <a:gs pos="100000">
+                      <a:schemeClr val="accent6">
+                        <a:tint val="90000"/>
+                        <a:satMod val="120000"/>
+                      </a:schemeClr>
+                    </a:gs>
+                  </a:gsLst>
+                  <a:lin ang="5400000"/>
+                </a:gradFill>
+                <a:effectLst>
+                  <a:glow rad="101600">
+                    <a:schemeClr val="accent2">
+                      <a:satMod val="175000"/>
+                      <a:alpha val="40000"/>
+                    </a:schemeClr>
+                  </a:glow>
+                  <a:outerShdw blurRad="80000" dist="40000" dir="5040000" algn="tl">
+                    <a:srgbClr val="000000">
+                      <a:alpha val="30000"/>
+                    </a:srgbClr>
+                  </a:outerShdw>
+                  <a:reflection blurRad="6350" stA="55000" endA="300" endPos="45500" dir="5400000" sy="-100000" algn="bl" rotWithShape="0"/>
+                </a:effectLst>
+                <a:uLnTx/>
+                <a:uFillTx/>
+                <a:latin typeface="+mj-lt"/>
+                <a:ea typeface="+mj-ea"/>
+                <a:cs typeface="+mj-cs"/>
+              </a:rPr>
+              <a:t>Diagramme des modules :</a:t>
+            </a:r>
+            <a:endParaRPr kumimoji="0" lang="fr-FR" sz="4400" b="1" i="0" u="none" strike="noStrike" kern="1200" cap="none" spc="0" normalizeH="0" baseline="0" noProof="0" dirty="0">
+              <a:ln w="11430"/>
+              <a:gradFill>
+                <a:gsLst>
+                  <a:gs pos="0">
+                    <a:schemeClr val="accent6">
+                      <a:tint val="90000"/>
+                      <a:satMod val="120000"/>
+                    </a:schemeClr>
+                  </a:gs>
+                  <a:gs pos="25000">
+                    <a:schemeClr val="accent6">
+                      <a:tint val="93000"/>
+                      <a:satMod val="120000"/>
+                    </a:schemeClr>
+                  </a:gs>
+                  <a:gs pos="50000">
+                    <a:schemeClr val="accent6">
+                      <a:shade val="89000"/>
+                      <a:satMod val="110000"/>
+                    </a:schemeClr>
+                  </a:gs>
+                  <a:gs pos="75000">
+                    <a:schemeClr val="accent6">
+                      <a:tint val="93000"/>
+                      <a:satMod val="120000"/>
+                    </a:schemeClr>
+                  </a:gs>
+                  <a:gs pos="100000">
+                    <a:schemeClr val="accent6">
+                      <a:tint val="90000"/>
+                      <a:satMod val="120000"/>
+                    </a:schemeClr>
+                  </a:gs>
+                </a:gsLst>
+                <a:lin ang="5400000"/>
+              </a:gradFill>
+              <a:effectLst>
+                <a:glow rad="101600">
+                  <a:schemeClr val="accent2">
+                    <a:satMod val="175000"/>
+                    <a:alpha val="40000"/>
+                  </a:schemeClr>
+                </a:glow>
+                <a:outerShdw blurRad="80000" dist="40000" dir="5040000" algn="tl">
+                  <a:srgbClr val="000000">
+                    <a:alpha val="30000"/>
+                  </a:srgbClr>
+                </a:outerShdw>
+                <a:reflection blurRad="6350" stA="55000" endA="300" endPos="45500" dir="5400000" sy="-100000" algn="bl" rotWithShape="0"/>
+              </a:effectLst>
+              <a:uLnTx/>
+              <a:uFillTx/>
+              <a:latin typeface="+mj-lt"/>
+              <a:ea typeface="+mj-ea"/>
+              <a:cs typeface="+mj-cs"/>
             </a:endParaRPr>
           </a:p>
         </p:txBody>
@@ -7355,7 +9370,7 @@
   <p:clrMapOvr>
     <a:masterClrMapping/>
   </p:clrMapOvr>
-  <p:transition spd="slow">
+  <p:transition>
     <p:fade/>
   </p:transition>
   <p:timing>
@@ -7387,78 +9402,1017 @@
       </p:grpSpPr>
       <p:sp>
         <p:nvSpPr>
-          <p:cNvPr id="2" name="Titre 1"/>
-          <p:cNvSpPr>
-            <a:spLocks noGrp="1"/>
-          </p:cNvSpPr>
-          <p:nvPr>
-            <p:ph type="title"/>
-          </p:nvPr>
-        </p:nvSpPr>
-        <p:spPr/>
-        <p:txBody>
-          <a:bodyPr>
-            <a:normAutofit fontScale="90000"/>
-          </a:bodyPr>
+          <p:cNvPr id="2" name="Rectangle à coins arrondis 1"/>
+          <p:cNvSpPr/>
+          <p:nvPr/>
+        </p:nvSpPr>
+        <p:spPr>
+          <a:xfrm>
+            <a:off x="142844" y="285728"/>
+            <a:ext cx="8715436" cy="6357982"/>
+          </a:xfrm>
+          <a:prstGeom prst="roundRect">
+            <a:avLst/>
+          </a:prstGeom>
+        </p:spPr>
+        <p:style>
+          <a:lnRef idx="1">
+            <a:schemeClr val="accent6"/>
+          </a:lnRef>
+          <a:fillRef idx="2">
+            <a:schemeClr val="accent6"/>
+          </a:fillRef>
+          <a:effectRef idx="1">
+            <a:schemeClr val="accent6"/>
+          </a:effectRef>
+          <a:fontRef idx="minor">
+            <a:schemeClr val="dk1"/>
+          </a:fontRef>
+        </p:style>
+        <p:txBody>
+          <a:bodyPr rtlCol="0" anchor="ctr"/>
           <a:lstStyle/>
           <a:p>
-            <a:r>
-              <a:rPr lang="fr-FR" dirty="0" smtClean="0"/>
-              <a:t>Le fichier de configuration et l’interface dynamique</a:t>
-            </a:r>
-            <a:endParaRPr lang="fr-FR" dirty="0"/>
-          </a:p>
-        </p:txBody>
-      </p:sp>
-      <p:sp>
-        <p:nvSpPr>
-          <p:cNvPr id="3" name="Espace réservé du contenu 2"/>
-          <p:cNvSpPr>
-            <a:spLocks noGrp="1"/>
-          </p:cNvSpPr>
-          <p:nvPr>
-            <p:ph idx="1"/>
-          </p:nvPr>
-        </p:nvSpPr>
-        <p:spPr/>
-        <p:txBody>
-          <a:bodyPr/>
-          <a:lstStyle/>
-          <a:p>
-            <a:r>
-              <a:rPr lang="fr-FR" dirty="0" smtClean="0"/>
-              <a:t>Grâce au fichier de </a:t>
-            </a:r>
-            <a:r>
-              <a:rPr lang="fr-FR" dirty="0" err="1" smtClean="0"/>
-              <a:t>configuration,on</a:t>
-            </a:r>
-            <a:r>
-              <a:rPr lang="fr-FR" dirty="0" smtClean="0"/>
-              <a:t> peut facilement personnaliser l’interface :</a:t>
-            </a:r>
-          </a:p>
-          <a:p>
-            <a:pPr lvl="1"/>
-            <a:r>
-              <a:rPr lang="fr-FR" dirty="0" smtClean="0"/>
-              <a:t>En changeant la langue</a:t>
-            </a:r>
-          </a:p>
-          <a:p>
-            <a:pPr lvl="1"/>
-            <a:r>
-              <a:rPr lang="fr-FR" dirty="0" smtClean="0"/>
-              <a:t>Le nombre de joueur</a:t>
-            </a:r>
-          </a:p>
-          <a:p>
-            <a:pPr lvl="1"/>
-            <a:r>
-              <a:rPr lang="fr-FR" dirty="0" smtClean="0"/>
-              <a:t>L’argent de départ</a:t>
-            </a:r>
-            <a:endParaRPr lang="fr-FR" dirty="0"/>
+            <a:pPr algn="ctr"/>
+            <a:r>
+              <a:rPr lang="fr-FR" sz="4000" b="1" u="sng" dirty="0" smtClean="0">
+                <a:effectLst>
+                  <a:outerShdw blurRad="38100" dist="38100" dir="2700000" algn="tl">
+                    <a:srgbClr val="000000">
+                      <a:alpha val="43137"/>
+                    </a:srgbClr>
+                  </a:outerShdw>
+                </a:effectLst>
+              </a:rPr>
+              <a:t>Module </a:t>
+            </a:r>
+            <a:r>
+              <a:rPr lang="fr-FR" sz="4000" b="1" u="sng" dirty="0" err="1" smtClean="0">
+                <a:effectLst>
+                  <a:outerShdw blurRad="38100" dist="38100" dir="2700000" algn="tl">
+                    <a:srgbClr val="000000">
+                      <a:alpha val="43137"/>
+                    </a:srgbClr>
+                  </a:outerShdw>
+                </a:effectLst>
+              </a:rPr>
+              <a:t>AfficheDynamique.h</a:t>
+            </a:r>
+            <a:endParaRPr lang="fr-FR" sz="4000" b="1" u="sng" dirty="0" smtClean="0">
+              <a:effectLst>
+                <a:outerShdw blurRad="38100" dist="38100" dir="2700000" algn="tl">
+                  <a:srgbClr val="000000">
+                    <a:alpha val="43137"/>
+                  </a:srgbClr>
+                </a:outerShdw>
+              </a:effectLst>
+            </a:endParaRPr>
+          </a:p>
+          <a:p>
+            <a:pPr>
+              <a:buFont typeface="Wingdings" pitchFamily="2" charset="2"/>
+              <a:buChar char="q"/>
+            </a:pPr>
+            <a:endParaRPr lang="fr-FR" sz="1200" b="1" u="sng" dirty="0" smtClean="0">
+              <a:effectLst>
+                <a:outerShdw blurRad="38100" dist="38100" dir="2700000" algn="tl">
+                  <a:srgbClr val="000000">
+                    <a:alpha val="43137"/>
+                  </a:srgbClr>
+                </a:outerShdw>
+              </a:effectLst>
+            </a:endParaRPr>
+          </a:p>
+          <a:p>
+            <a:pPr>
+              <a:buFont typeface="Wingdings" pitchFamily="2" charset="2"/>
+              <a:buChar char="q"/>
+            </a:pPr>
+            <a:r>
+              <a:rPr lang="fr-FR" sz="1400" dirty="0" err="1" smtClean="0"/>
+              <a:t>void</a:t>
+            </a:r>
+            <a:r>
+              <a:rPr lang="fr-FR" sz="1400" dirty="0" smtClean="0"/>
+              <a:t> </a:t>
+            </a:r>
+            <a:r>
+              <a:rPr lang="fr-FR" sz="1400" dirty="0" err="1" smtClean="0"/>
+              <a:t>affAffichageVainqueur</a:t>
+            </a:r>
+            <a:r>
+              <a:rPr lang="fr-FR" sz="1400" dirty="0" smtClean="0"/>
+              <a:t>(</a:t>
+            </a:r>
+            <a:r>
+              <a:rPr lang="fr-FR" sz="1400" dirty="0" err="1" smtClean="0"/>
+              <a:t>SDL_Surface</a:t>
+            </a:r>
+            <a:r>
+              <a:rPr lang="fr-FR" sz="1400" dirty="0" smtClean="0"/>
+              <a:t>* </a:t>
+            </a:r>
+            <a:r>
+              <a:rPr lang="fr-FR" sz="1400" dirty="0" err="1" smtClean="0"/>
+              <a:t>affichage,Table</a:t>
+            </a:r>
+            <a:r>
+              <a:rPr lang="fr-FR" sz="1400" dirty="0" smtClean="0"/>
+              <a:t> &amp; </a:t>
+            </a:r>
+            <a:r>
+              <a:rPr lang="fr-FR" sz="1400" dirty="0" err="1" smtClean="0"/>
+              <a:t>t,const</a:t>
+            </a:r>
+            <a:r>
+              <a:rPr lang="fr-FR" sz="1400" dirty="0" smtClean="0"/>
+              <a:t> char langue[][50],</a:t>
+            </a:r>
+            <a:r>
+              <a:rPr lang="fr-FR" sz="1400" dirty="0" err="1" smtClean="0"/>
+              <a:t>bool</a:t>
+            </a:r>
+            <a:r>
+              <a:rPr lang="fr-FR" sz="1400" dirty="0" smtClean="0"/>
+              <a:t> </a:t>
+            </a:r>
+            <a:r>
+              <a:rPr lang="fr-FR" sz="1400" dirty="0" err="1" smtClean="0"/>
+              <a:t>afficheCarteGagnant</a:t>
+            </a:r>
+            <a:r>
+              <a:rPr lang="fr-FR" sz="1400" dirty="0" smtClean="0"/>
+              <a:t>);</a:t>
+            </a:r>
+          </a:p>
+          <a:p>
+            <a:pPr>
+              <a:buFont typeface="Wingdings" pitchFamily="2" charset="2"/>
+              <a:buChar char="q"/>
+            </a:pPr>
+            <a:r>
+              <a:rPr lang="fr-FR" sz="1400" dirty="0" err="1" smtClean="0"/>
+              <a:t>void</a:t>
+            </a:r>
+            <a:r>
+              <a:rPr lang="fr-FR" sz="1400" dirty="0" smtClean="0"/>
+              <a:t> </a:t>
+            </a:r>
+            <a:r>
+              <a:rPr lang="fr-FR" sz="1400" dirty="0" err="1" smtClean="0"/>
+              <a:t>calulVainqueurTapis</a:t>
+            </a:r>
+            <a:r>
+              <a:rPr lang="fr-FR" sz="1400" dirty="0" smtClean="0"/>
+              <a:t>(Table &amp; </a:t>
+            </a:r>
+            <a:r>
+              <a:rPr lang="fr-FR" sz="1400" dirty="0" err="1" smtClean="0"/>
+              <a:t>t,int</a:t>
+            </a:r>
+            <a:r>
+              <a:rPr lang="fr-FR" sz="1400" dirty="0" smtClean="0"/>
+              <a:t> </a:t>
+            </a:r>
+            <a:r>
+              <a:rPr lang="fr-FR" sz="1400" dirty="0" err="1" smtClean="0"/>
+              <a:t>tabResultat</a:t>
+            </a:r>
+            <a:r>
+              <a:rPr lang="fr-FR" sz="1400" dirty="0" smtClean="0"/>
+              <a:t>[][6][2]);</a:t>
+            </a:r>
+          </a:p>
+          <a:p>
+            <a:pPr>
+              <a:buFont typeface="Wingdings" pitchFamily="2" charset="2"/>
+              <a:buChar char="q"/>
+            </a:pPr>
+            <a:r>
+              <a:rPr lang="fr-FR" sz="1400" dirty="0" err="1" smtClean="0"/>
+              <a:t>SDL_Rect</a:t>
+            </a:r>
+            <a:r>
+              <a:rPr lang="fr-FR" sz="1400" dirty="0" smtClean="0"/>
+              <a:t> </a:t>
+            </a:r>
+            <a:r>
+              <a:rPr lang="fr-FR" sz="1400" dirty="0" err="1" smtClean="0"/>
+              <a:t>AffCentrer</a:t>
+            </a:r>
+            <a:r>
+              <a:rPr lang="fr-FR" sz="1400" dirty="0" smtClean="0"/>
+              <a:t>(</a:t>
+            </a:r>
+            <a:r>
+              <a:rPr lang="fr-FR" sz="1400" dirty="0" err="1" smtClean="0"/>
+              <a:t>SDL_Surface</a:t>
+            </a:r>
+            <a:r>
+              <a:rPr lang="fr-FR" sz="1400" dirty="0" smtClean="0"/>
+              <a:t>* source, </a:t>
+            </a:r>
+            <a:r>
+              <a:rPr lang="fr-FR" sz="1400" dirty="0" err="1" smtClean="0"/>
+              <a:t>SDL_Surface</a:t>
+            </a:r>
+            <a:r>
+              <a:rPr lang="fr-FR" sz="1400" dirty="0" smtClean="0"/>
+              <a:t>* destination, </a:t>
+            </a:r>
+            <a:r>
+              <a:rPr lang="fr-FR" sz="1400" dirty="0" err="1" smtClean="0"/>
+              <a:t>int</a:t>
+            </a:r>
+            <a:r>
+              <a:rPr lang="fr-FR" sz="1400" dirty="0" smtClean="0"/>
+              <a:t> option);</a:t>
+            </a:r>
+          </a:p>
+          <a:p>
+            <a:pPr>
+              <a:buFont typeface="Wingdings" pitchFamily="2" charset="2"/>
+              <a:buChar char="q"/>
+            </a:pPr>
+            <a:r>
+              <a:rPr lang="fr-FR" sz="1400" dirty="0" err="1" smtClean="0"/>
+              <a:t>void</a:t>
+            </a:r>
+            <a:r>
+              <a:rPr lang="fr-FR" sz="1400" dirty="0" smtClean="0"/>
+              <a:t> </a:t>
+            </a:r>
+            <a:r>
+              <a:rPr lang="fr-FR" sz="1400" dirty="0" err="1" smtClean="0"/>
+              <a:t>AffStartUp</a:t>
+            </a:r>
+            <a:r>
+              <a:rPr lang="fr-FR" sz="1400" dirty="0" smtClean="0"/>
+              <a:t>(</a:t>
+            </a:r>
+            <a:r>
+              <a:rPr lang="fr-FR" sz="1400" dirty="0" err="1" smtClean="0"/>
+              <a:t>SDL_Surface</a:t>
+            </a:r>
+            <a:r>
+              <a:rPr lang="fr-FR" sz="1400" dirty="0" smtClean="0"/>
+              <a:t>* </a:t>
+            </a:r>
+            <a:r>
+              <a:rPr lang="fr-FR" sz="1400" dirty="0" err="1" smtClean="0"/>
+              <a:t>affichage,SDL_Surface</a:t>
+            </a:r>
+            <a:r>
+              <a:rPr lang="fr-FR" sz="1400" dirty="0" smtClean="0"/>
+              <a:t>* tapis);</a:t>
+            </a:r>
+          </a:p>
+          <a:p>
+            <a:pPr>
+              <a:buFont typeface="Wingdings" pitchFamily="2" charset="2"/>
+              <a:buChar char="q"/>
+            </a:pPr>
+            <a:r>
+              <a:rPr lang="fr-FR" sz="1400" dirty="0" err="1" smtClean="0"/>
+              <a:t>void</a:t>
+            </a:r>
+            <a:r>
+              <a:rPr lang="fr-FR" sz="1400" dirty="0" smtClean="0"/>
+              <a:t> </a:t>
+            </a:r>
+            <a:r>
+              <a:rPr lang="fr-FR" sz="1400" dirty="0" err="1" smtClean="0"/>
+              <a:t>AffAffichePot</a:t>
+            </a:r>
+            <a:r>
+              <a:rPr lang="fr-FR" sz="1400" dirty="0" smtClean="0"/>
+              <a:t>(</a:t>
+            </a:r>
+            <a:r>
+              <a:rPr lang="fr-FR" sz="1400" dirty="0" err="1" smtClean="0"/>
+              <a:t>SDL_Surface</a:t>
+            </a:r>
+            <a:r>
+              <a:rPr lang="fr-FR" sz="1400" dirty="0" smtClean="0"/>
+              <a:t>* </a:t>
+            </a:r>
+            <a:r>
+              <a:rPr lang="fr-FR" sz="1400" dirty="0" err="1" smtClean="0"/>
+              <a:t>affichage,const</a:t>
+            </a:r>
+            <a:r>
+              <a:rPr lang="fr-FR" sz="1400" dirty="0" smtClean="0"/>
+              <a:t> Table &amp; </a:t>
+            </a:r>
+            <a:r>
+              <a:rPr lang="fr-FR" sz="1400" dirty="0" err="1" smtClean="0"/>
+              <a:t>t,const</a:t>
+            </a:r>
+            <a:r>
+              <a:rPr lang="fr-FR" sz="1400" dirty="0" smtClean="0"/>
+              <a:t> char langue[][50]);</a:t>
+            </a:r>
+          </a:p>
+          <a:p>
+            <a:pPr>
+              <a:buFont typeface="Wingdings" pitchFamily="2" charset="2"/>
+              <a:buChar char="q"/>
+            </a:pPr>
+            <a:r>
+              <a:rPr lang="fr-FR" sz="1400" dirty="0" err="1" smtClean="0"/>
+              <a:t>int</a:t>
+            </a:r>
+            <a:r>
+              <a:rPr lang="fr-FR" sz="1400" dirty="0" smtClean="0"/>
+              <a:t> </a:t>
+            </a:r>
+            <a:r>
+              <a:rPr lang="fr-FR" sz="1400" dirty="0" err="1" smtClean="0"/>
+              <a:t>AffMenu</a:t>
+            </a:r>
+            <a:r>
+              <a:rPr lang="fr-FR" sz="1400" dirty="0" smtClean="0"/>
+              <a:t>(</a:t>
+            </a:r>
+            <a:r>
+              <a:rPr lang="fr-FR" sz="1400" dirty="0" err="1" smtClean="0"/>
+              <a:t>SDL_Surface</a:t>
+            </a:r>
+            <a:r>
+              <a:rPr lang="fr-FR" sz="1400" dirty="0" smtClean="0"/>
+              <a:t>* </a:t>
+            </a:r>
+            <a:r>
+              <a:rPr lang="fr-FR" sz="1400" dirty="0" err="1" smtClean="0"/>
+              <a:t>affichage,const</a:t>
+            </a:r>
+            <a:r>
+              <a:rPr lang="fr-FR" sz="1400" dirty="0" smtClean="0"/>
+              <a:t> char langue[][50]);</a:t>
+            </a:r>
+          </a:p>
+          <a:p>
+            <a:pPr>
+              <a:buFont typeface="Wingdings" pitchFamily="2" charset="2"/>
+              <a:buChar char="q"/>
+            </a:pPr>
+            <a:r>
+              <a:rPr lang="fr-FR" sz="1400" dirty="0" err="1" smtClean="0"/>
+              <a:t>void</a:t>
+            </a:r>
+            <a:r>
+              <a:rPr lang="fr-FR" sz="1400" dirty="0" smtClean="0"/>
+              <a:t> </a:t>
+            </a:r>
+            <a:r>
+              <a:rPr lang="fr-FR" sz="1400" dirty="0" err="1" smtClean="0"/>
+              <a:t>AffAfficheJoueur</a:t>
+            </a:r>
+            <a:r>
+              <a:rPr lang="fr-FR" sz="1400" dirty="0" smtClean="0"/>
+              <a:t>(</a:t>
+            </a:r>
+            <a:r>
+              <a:rPr lang="fr-FR" sz="1400" dirty="0" err="1" smtClean="0"/>
+              <a:t>SDL_Surface</a:t>
+            </a:r>
+            <a:r>
+              <a:rPr lang="fr-FR" sz="1400" dirty="0" smtClean="0"/>
+              <a:t>* </a:t>
+            </a:r>
+            <a:r>
+              <a:rPr lang="fr-FR" sz="1400" dirty="0" err="1" smtClean="0"/>
+              <a:t>affichage,const</a:t>
+            </a:r>
+            <a:r>
+              <a:rPr lang="fr-FR" sz="1400" dirty="0" smtClean="0"/>
+              <a:t> Joueur &amp; </a:t>
+            </a:r>
+            <a:r>
+              <a:rPr lang="fr-FR" sz="1400" dirty="0" err="1" smtClean="0"/>
+              <a:t>j,const</a:t>
+            </a:r>
+            <a:r>
+              <a:rPr lang="fr-FR" sz="1400" dirty="0" smtClean="0"/>
+              <a:t> Table &amp; </a:t>
+            </a:r>
+            <a:r>
+              <a:rPr lang="fr-FR" sz="1400" dirty="0" err="1" smtClean="0"/>
+              <a:t>table,int</a:t>
+            </a:r>
+            <a:r>
+              <a:rPr lang="fr-FR" sz="1400" dirty="0" smtClean="0"/>
+              <a:t> </a:t>
+            </a:r>
+            <a:r>
+              <a:rPr lang="fr-FR" sz="1400" dirty="0" err="1" smtClean="0"/>
+              <a:t>joueurJouant,const</a:t>
+            </a:r>
+            <a:r>
+              <a:rPr lang="fr-FR" sz="1400" dirty="0" smtClean="0"/>
+              <a:t> char langue[][50]);</a:t>
+            </a:r>
+          </a:p>
+          <a:p>
+            <a:pPr>
+              <a:buFont typeface="Wingdings" pitchFamily="2" charset="2"/>
+              <a:buChar char="q"/>
+            </a:pPr>
+            <a:r>
+              <a:rPr lang="fr-FR" sz="1400" dirty="0" err="1" smtClean="0"/>
+              <a:t>void</a:t>
+            </a:r>
+            <a:r>
+              <a:rPr lang="fr-FR" sz="1400" dirty="0" smtClean="0"/>
+              <a:t> </a:t>
+            </a:r>
+            <a:r>
+              <a:rPr lang="fr-FR" sz="1400" dirty="0" err="1" smtClean="0"/>
+              <a:t>AffAffichageInfosJoueurs</a:t>
+            </a:r>
+            <a:r>
+              <a:rPr lang="fr-FR" sz="1400" dirty="0" smtClean="0"/>
+              <a:t>(</a:t>
+            </a:r>
+            <a:r>
+              <a:rPr lang="fr-FR" sz="1400" dirty="0" err="1" smtClean="0"/>
+              <a:t>SDL_Surface</a:t>
+            </a:r>
+            <a:r>
+              <a:rPr lang="fr-FR" sz="1400" dirty="0" smtClean="0"/>
+              <a:t>* </a:t>
+            </a:r>
+            <a:r>
+              <a:rPr lang="fr-FR" sz="1400" dirty="0" err="1" smtClean="0"/>
+              <a:t>affichage,const</a:t>
+            </a:r>
+            <a:r>
+              <a:rPr lang="fr-FR" sz="1400" dirty="0" smtClean="0"/>
+              <a:t> Table &amp; </a:t>
+            </a:r>
+            <a:r>
+              <a:rPr lang="fr-FR" sz="1400" dirty="0" err="1" smtClean="0"/>
+              <a:t>t,int</a:t>
+            </a:r>
+            <a:r>
+              <a:rPr lang="fr-FR" sz="1400" dirty="0" smtClean="0"/>
+              <a:t> </a:t>
+            </a:r>
+            <a:r>
+              <a:rPr lang="fr-FR" sz="1400" dirty="0" err="1" smtClean="0"/>
+              <a:t>joueurJouant,const</a:t>
+            </a:r>
+            <a:r>
+              <a:rPr lang="fr-FR" sz="1400" dirty="0" smtClean="0"/>
+              <a:t> char langue[][50]);</a:t>
+            </a:r>
+          </a:p>
+          <a:p>
+            <a:pPr>
+              <a:buFont typeface="Wingdings" pitchFamily="2" charset="2"/>
+              <a:buChar char="q"/>
+            </a:pPr>
+            <a:r>
+              <a:rPr lang="fr-FR" sz="1400" dirty="0" err="1" smtClean="0"/>
+              <a:t>void</a:t>
+            </a:r>
+            <a:r>
+              <a:rPr lang="fr-FR" sz="1400" dirty="0" smtClean="0"/>
+              <a:t> </a:t>
+            </a:r>
+            <a:r>
+              <a:rPr lang="fr-FR" sz="1400" dirty="0" err="1" smtClean="0"/>
+              <a:t>AffCartesJoueursJeu</a:t>
+            </a:r>
+            <a:r>
+              <a:rPr lang="fr-FR" sz="1400" dirty="0" smtClean="0"/>
+              <a:t>(</a:t>
+            </a:r>
+            <a:r>
+              <a:rPr lang="fr-FR" sz="1400" dirty="0" err="1" smtClean="0"/>
+              <a:t>SDL_Surface</a:t>
+            </a:r>
+            <a:r>
+              <a:rPr lang="fr-FR" sz="1400" dirty="0" smtClean="0"/>
+              <a:t>* </a:t>
+            </a:r>
+            <a:r>
+              <a:rPr lang="fr-FR" sz="1400" dirty="0" err="1" smtClean="0"/>
+              <a:t>affichage,const</a:t>
+            </a:r>
+            <a:r>
+              <a:rPr lang="fr-FR" sz="1400" dirty="0" smtClean="0"/>
+              <a:t> Table &amp; t);</a:t>
+            </a:r>
+          </a:p>
+          <a:p>
+            <a:pPr>
+              <a:buFont typeface="Wingdings" pitchFamily="2" charset="2"/>
+              <a:buChar char="q"/>
+            </a:pPr>
+            <a:r>
+              <a:rPr lang="fr-FR" sz="1400" dirty="0" err="1" smtClean="0"/>
+              <a:t>void</a:t>
+            </a:r>
+            <a:r>
+              <a:rPr lang="fr-FR" sz="1400" dirty="0" smtClean="0"/>
+              <a:t> </a:t>
+            </a:r>
+            <a:r>
+              <a:rPr lang="fr-FR" sz="1400" dirty="0" err="1" smtClean="0"/>
+              <a:t>AffCartesJoueursJeu</a:t>
+            </a:r>
+            <a:r>
+              <a:rPr lang="fr-FR" sz="1400" dirty="0" smtClean="0"/>
+              <a:t>(</a:t>
+            </a:r>
+            <a:r>
+              <a:rPr lang="fr-FR" sz="1400" dirty="0" err="1" smtClean="0"/>
+              <a:t>SDL_Surface</a:t>
+            </a:r>
+            <a:r>
+              <a:rPr lang="fr-FR" sz="1400" dirty="0" smtClean="0"/>
+              <a:t>* </a:t>
+            </a:r>
+            <a:r>
+              <a:rPr lang="fr-FR" sz="1400" dirty="0" err="1" smtClean="0"/>
+              <a:t>affichage,const</a:t>
+            </a:r>
+            <a:r>
+              <a:rPr lang="fr-FR" sz="1400" dirty="0" smtClean="0"/>
+              <a:t> Table &amp; </a:t>
+            </a:r>
+            <a:r>
+              <a:rPr lang="fr-FR" sz="1400" dirty="0" err="1" smtClean="0"/>
+              <a:t>t,bool</a:t>
+            </a:r>
+            <a:r>
+              <a:rPr lang="fr-FR" sz="1400" dirty="0" smtClean="0"/>
+              <a:t> cache);</a:t>
+            </a:r>
+          </a:p>
+          <a:p>
+            <a:pPr>
+              <a:buFont typeface="Wingdings" pitchFamily="2" charset="2"/>
+              <a:buChar char="q"/>
+            </a:pPr>
+            <a:r>
+              <a:rPr lang="fr-FR" sz="1400" dirty="0" err="1" smtClean="0"/>
+              <a:t>void</a:t>
+            </a:r>
+            <a:r>
+              <a:rPr lang="fr-FR" sz="1400" dirty="0" smtClean="0"/>
+              <a:t> </a:t>
+            </a:r>
+            <a:r>
+              <a:rPr lang="fr-FR" sz="1400" dirty="0" err="1" smtClean="0"/>
+              <a:t>AffCarteDecouvertes</a:t>
+            </a:r>
+            <a:r>
+              <a:rPr lang="fr-FR" sz="1400" dirty="0" smtClean="0"/>
+              <a:t>(</a:t>
+            </a:r>
+            <a:r>
+              <a:rPr lang="fr-FR" sz="1400" dirty="0" err="1" smtClean="0"/>
+              <a:t>const</a:t>
+            </a:r>
+            <a:r>
+              <a:rPr lang="fr-FR" sz="1400" dirty="0" smtClean="0"/>
+              <a:t> Table &amp; </a:t>
+            </a:r>
+            <a:r>
+              <a:rPr lang="fr-FR" sz="1400" dirty="0" err="1" smtClean="0"/>
+              <a:t>t,SDL_Surface</a:t>
+            </a:r>
+            <a:r>
+              <a:rPr lang="fr-FR" sz="1400" dirty="0" smtClean="0"/>
+              <a:t>* affichage);</a:t>
+            </a:r>
+          </a:p>
+          <a:p>
+            <a:pPr>
+              <a:buFont typeface="Wingdings" pitchFamily="2" charset="2"/>
+              <a:buChar char="q"/>
+            </a:pPr>
+            <a:r>
+              <a:rPr lang="fr-FR" sz="1400" dirty="0" err="1" smtClean="0"/>
+              <a:t>void</a:t>
+            </a:r>
+            <a:r>
+              <a:rPr lang="fr-FR" sz="1400" dirty="0" smtClean="0"/>
+              <a:t> </a:t>
+            </a:r>
+            <a:r>
+              <a:rPr lang="fr-FR" sz="1400" dirty="0" err="1" smtClean="0"/>
+              <a:t>AffCarteDecouvertes</a:t>
+            </a:r>
+            <a:r>
+              <a:rPr lang="fr-FR" sz="1400" dirty="0" smtClean="0"/>
+              <a:t>(</a:t>
+            </a:r>
+            <a:r>
+              <a:rPr lang="fr-FR" sz="1400" dirty="0" err="1" smtClean="0"/>
+              <a:t>const</a:t>
+            </a:r>
+            <a:r>
+              <a:rPr lang="fr-FR" sz="1400" dirty="0" smtClean="0"/>
+              <a:t> Table &amp; </a:t>
+            </a:r>
+            <a:r>
+              <a:rPr lang="fr-FR" sz="1400" dirty="0" err="1" smtClean="0"/>
+              <a:t>t,SDL_Surface</a:t>
+            </a:r>
+            <a:r>
+              <a:rPr lang="fr-FR" sz="1400" dirty="0" smtClean="0"/>
+              <a:t>* </a:t>
+            </a:r>
+            <a:r>
+              <a:rPr lang="fr-FR" sz="1400" dirty="0" err="1" smtClean="0"/>
+              <a:t>affichage,bool</a:t>
+            </a:r>
+            <a:r>
+              <a:rPr lang="fr-FR" sz="1400" dirty="0" smtClean="0"/>
+              <a:t> </a:t>
+            </a:r>
+            <a:r>
+              <a:rPr lang="fr-FR" sz="1400" dirty="0" err="1" smtClean="0"/>
+              <a:t>evidence,int</a:t>
+            </a:r>
+            <a:r>
+              <a:rPr lang="fr-FR" sz="1400" dirty="0" smtClean="0"/>
+              <a:t> </a:t>
+            </a:r>
+            <a:r>
+              <a:rPr lang="fr-FR" sz="1400" dirty="0" err="1" smtClean="0"/>
+              <a:t>tabResultat</a:t>
+            </a:r>
+            <a:r>
+              <a:rPr lang="fr-FR" sz="1400" dirty="0" smtClean="0"/>
+              <a:t>[6][2]);</a:t>
+            </a:r>
+          </a:p>
+          <a:p>
+            <a:pPr>
+              <a:buFont typeface="Wingdings" pitchFamily="2" charset="2"/>
+              <a:buChar char="q"/>
+            </a:pPr>
+            <a:r>
+              <a:rPr lang="fr-FR" sz="1400" dirty="0" err="1" smtClean="0"/>
+              <a:t>void</a:t>
+            </a:r>
+            <a:r>
+              <a:rPr lang="fr-FR" sz="1400" dirty="0" smtClean="0"/>
+              <a:t> </a:t>
+            </a:r>
+            <a:r>
+              <a:rPr lang="fr-FR" sz="1400" dirty="0" err="1" smtClean="0"/>
+              <a:t>AffCartesJoueursJeuFinale</a:t>
+            </a:r>
+            <a:r>
+              <a:rPr lang="fr-FR" sz="1400" dirty="0" smtClean="0"/>
+              <a:t>(</a:t>
+            </a:r>
+            <a:r>
+              <a:rPr lang="fr-FR" sz="1400" dirty="0" err="1" smtClean="0"/>
+              <a:t>SDL_Surface</a:t>
+            </a:r>
+            <a:r>
+              <a:rPr lang="fr-FR" sz="1400" dirty="0" smtClean="0"/>
+              <a:t>* </a:t>
+            </a:r>
+            <a:r>
+              <a:rPr lang="fr-FR" sz="1400" dirty="0" err="1" smtClean="0"/>
+              <a:t>affichage,const</a:t>
+            </a:r>
+            <a:r>
+              <a:rPr lang="fr-FR" sz="1400" dirty="0" smtClean="0"/>
+              <a:t> Table &amp; </a:t>
+            </a:r>
+            <a:r>
+              <a:rPr lang="fr-FR" sz="1400" dirty="0" err="1" smtClean="0"/>
+              <a:t>t,int</a:t>
+            </a:r>
+            <a:r>
+              <a:rPr lang="fr-FR" sz="1400" dirty="0" smtClean="0"/>
+              <a:t> </a:t>
+            </a:r>
+            <a:r>
+              <a:rPr lang="fr-FR" sz="1400" dirty="0" err="1" smtClean="0"/>
+              <a:t>tabResultat</a:t>
+            </a:r>
+            <a:r>
+              <a:rPr lang="fr-FR" sz="1400" dirty="0" smtClean="0"/>
+              <a:t>[6][2],</a:t>
+            </a:r>
+            <a:r>
+              <a:rPr lang="fr-FR" sz="1400" dirty="0" err="1" smtClean="0"/>
+              <a:t>int</a:t>
+            </a:r>
+            <a:r>
+              <a:rPr lang="fr-FR" sz="1400" dirty="0" smtClean="0"/>
+              <a:t> i);</a:t>
+            </a:r>
+          </a:p>
+          <a:p>
+            <a:pPr>
+              <a:buFont typeface="Wingdings" pitchFamily="2" charset="2"/>
+              <a:buChar char="q"/>
+            </a:pPr>
+            <a:r>
+              <a:rPr lang="fr-FR" sz="1400" dirty="0" err="1" smtClean="0"/>
+              <a:t>void</a:t>
+            </a:r>
+            <a:r>
+              <a:rPr lang="fr-FR" sz="1400" dirty="0" smtClean="0"/>
+              <a:t> </a:t>
+            </a:r>
+            <a:r>
+              <a:rPr lang="fr-FR" sz="1400" dirty="0" err="1" smtClean="0"/>
+              <a:t>AffInfosJoueur</a:t>
+            </a:r>
+            <a:r>
+              <a:rPr lang="fr-FR" sz="1400" dirty="0" smtClean="0"/>
+              <a:t>(</a:t>
+            </a:r>
+            <a:r>
+              <a:rPr lang="fr-FR" sz="1400" dirty="0" err="1" smtClean="0"/>
+              <a:t>SDL_Surface</a:t>
+            </a:r>
+            <a:r>
+              <a:rPr lang="fr-FR" sz="1400" dirty="0" smtClean="0"/>
+              <a:t>* </a:t>
+            </a:r>
+            <a:r>
+              <a:rPr lang="fr-FR" sz="1400" dirty="0" err="1" smtClean="0"/>
+              <a:t>affichage,const</a:t>
+            </a:r>
+            <a:r>
+              <a:rPr lang="fr-FR" sz="1400" dirty="0" smtClean="0"/>
+              <a:t> Joueur &amp;</a:t>
+            </a:r>
+            <a:r>
+              <a:rPr lang="fr-FR" sz="1400" dirty="0" err="1" smtClean="0"/>
+              <a:t>j,const</a:t>
+            </a:r>
+            <a:r>
+              <a:rPr lang="fr-FR" sz="1400" dirty="0" smtClean="0"/>
+              <a:t> Table &amp; </a:t>
+            </a:r>
+            <a:r>
+              <a:rPr lang="fr-FR" sz="1400" dirty="0" err="1" smtClean="0"/>
+              <a:t>table,const</a:t>
+            </a:r>
+            <a:r>
+              <a:rPr lang="fr-FR" sz="1400" dirty="0" smtClean="0"/>
+              <a:t> char langue[][50]);</a:t>
+            </a:r>
+          </a:p>
+          <a:p>
+            <a:pPr>
+              <a:buFont typeface="Wingdings" pitchFamily="2" charset="2"/>
+              <a:buChar char="q"/>
+            </a:pPr>
+            <a:r>
+              <a:rPr lang="fr-FR" sz="1400" dirty="0" err="1" smtClean="0"/>
+              <a:t>void</a:t>
+            </a:r>
+            <a:r>
+              <a:rPr lang="fr-FR" sz="1400" dirty="0" smtClean="0"/>
+              <a:t> </a:t>
+            </a:r>
+            <a:r>
+              <a:rPr lang="fr-FR" sz="1400" dirty="0" err="1" smtClean="0"/>
+              <a:t>AffAfficheBoutonRelance</a:t>
+            </a:r>
+            <a:r>
+              <a:rPr lang="fr-FR" sz="1400" dirty="0" smtClean="0"/>
+              <a:t>(</a:t>
+            </a:r>
+            <a:r>
+              <a:rPr lang="fr-FR" sz="1400" dirty="0" err="1" smtClean="0"/>
+              <a:t>SDL_Surface</a:t>
+            </a:r>
+            <a:r>
+              <a:rPr lang="fr-FR" sz="1400" dirty="0" smtClean="0"/>
+              <a:t>* </a:t>
+            </a:r>
+            <a:r>
+              <a:rPr lang="fr-FR" sz="1400" dirty="0" err="1" smtClean="0"/>
+              <a:t>affichage,int</a:t>
+            </a:r>
+            <a:r>
+              <a:rPr lang="fr-FR" sz="1400" dirty="0" smtClean="0"/>
+              <a:t> </a:t>
+            </a:r>
+            <a:r>
+              <a:rPr lang="fr-FR" sz="1400" dirty="0" err="1" smtClean="0"/>
+              <a:t>relance,bool</a:t>
+            </a:r>
+            <a:r>
+              <a:rPr lang="fr-FR" sz="1400" dirty="0" smtClean="0"/>
+              <a:t> </a:t>
+            </a:r>
+            <a:r>
+              <a:rPr lang="fr-FR" sz="1400" dirty="0" err="1" smtClean="0"/>
+              <a:t>dessus,const</a:t>
+            </a:r>
+            <a:r>
+              <a:rPr lang="fr-FR" sz="1400" dirty="0" smtClean="0"/>
+              <a:t> char langue[][50]);</a:t>
+            </a:r>
+          </a:p>
+          <a:p>
+            <a:pPr>
+              <a:buFont typeface="Wingdings" pitchFamily="2" charset="2"/>
+              <a:buChar char="q"/>
+            </a:pPr>
+            <a:r>
+              <a:rPr lang="fr-FR" sz="1400" dirty="0" err="1" smtClean="0"/>
+              <a:t>int</a:t>
+            </a:r>
+            <a:r>
+              <a:rPr lang="fr-FR" sz="1400" dirty="0" smtClean="0"/>
+              <a:t> </a:t>
+            </a:r>
+            <a:r>
+              <a:rPr lang="fr-FR" sz="1400" dirty="0" err="1" smtClean="0"/>
+              <a:t>scanActionJoueur</a:t>
+            </a:r>
+            <a:r>
+              <a:rPr lang="fr-FR" sz="1400" dirty="0" smtClean="0"/>
+              <a:t>(</a:t>
+            </a:r>
+            <a:r>
+              <a:rPr lang="fr-FR" sz="1400" dirty="0" err="1" smtClean="0"/>
+              <a:t>SDL_Surface</a:t>
+            </a:r>
+            <a:r>
+              <a:rPr lang="fr-FR" sz="1400" dirty="0" smtClean="0"/>
+              <a:t>* </a:t>
+            </a:r>
+            <a:r>
+              <a:rPr lang="fr-FR" sz="1400" dirty="0" err="1" smtClean="0"/>
+              <a:t>affichage,int</a:t>
+            </a:r>
+            <a:r>
+              <a:rPr lang="fr-FR" sz="1400" dirty="0" smtClean="0"/>
+              <a:t> &amp; </a:t>
+            </a:r>
+            <a:r>
+              <a:rPr lang="fr-FR" sz="1400" dirty="0" err="1" smtClean="0"/>
+              <a:t>relance,Statut</a:t>
+            </a:r>
+            <a:r>
+              <a:rPr lang="fr-FR" sz="1400" dirty="0" smtClean="0"/>
+              <a:t> &amp; </a:t>
+            </a:r>
+            <a:r>
+              <a:rPr lang="fr-FR" sz="1400" dirty="0" err="1" smtClean="0"/>
+              <a:t>s,int</a:t>
+            </a:r>
+            <a:r>
+              <a:rPr lang="fr-FR" sz="1400" dirty="0" smtClean="0"/>
+              <a:t> &amp; </a:t>
+            </a:r>
+            <a:r>
+              <a:rPr lang="fr-FR" sz="1400" dirty="0" err="1" smtClean="0"/>
+              <a:t>montant,const</a:t>
+            </a:r>
+            <a:r>
+              <a:rPr lang="fr-FR" sz="1400" dirty="0" smtClean="0"/>
+              <a:t> Joueur &amp; </a:t>
+            </a:r>
+            <a:r>
+              <a:rPr lang="fr-FR" sz="1400" dirty="0" err="1" smtClean="0"/>
+              <a:t>j,const</a:t>
+            </a:r>
+            <a:r>
+              <a:rPr lang="fr-FR" sz="1400" dirty="0" smtClean="0"/>
+              <a:t> Table &amp; </a:t>
+            </a:r>
+            <a:r>
+              <a:rPr lang="fr-FR" sz="1400" dirty="0" err="1" smtClean="0"/>
+              <a:t>t,const</a:t>
+            </a:r>
+            <a:r>
+              <a:rPr lang="fr-FR" sz="1400" dirty="0" smtClean="0"/>
+              <a:t> char langue[][50]);</a:t>
+            </a:r>
+          </a:p>
+          <a:p>
+            <a:pPr>
+              <a:buFont typeface="Wingdings" pitchFamily="2" charset="2"/>
+              <a:buChar char="q"/>
+            </a:pPr>
+            <a:r>
+              <a:rPr lang="fr-FR" sz="1400" dirty="0" err="1" smtClean="0"/>
+              <a:t>void</a:t>
+            </a:r>
+            <a:r>
+              <a:rPr lang="fr-FR" sz="1400" dirty="0" smtClean="0"/>
+              <a:t> </a:t>
+            </a:r>
+            <a:r>
+              <a:rPr lang="fr-FR" sz="1400" dirty="0" err="1" smtClean="0"/>
+              <a:t>miseDansPot</a:t>
+            </a:r>
+            <a:r>
+              <a:rPr lang="fr-FR" sz="1400" dirty="0" smtClean="0"/>
+              <a:t>(Table &amp; t);</a:t>
+            </a:r>
+          </a:p>
+          <a:p>
+            <a:pPr>
+              <a:buFont typeface="Wingdings" pitchFamily="2" charset="2"/>
+              <a:buChar char="q"/>
+            </a:pPr>
+            <a:r>
+              <a:rPr lang="fr-FR" sz="1400" dirty="0" err="1" smtClean="0"/>
+              <a:t>void</a:t>
+            </a:r>
+            <a:r>
+              <a:rPr lang="fr-FR" sz="1400" dirty="0" smtClean="0"/>
+              <a:t> </a:t>
+            </a:r>
+            <a:r>
+              <a:rPr lang="fr-FR" sz="1400" dirty="0" err="1" smtClean="0"/>
+              <a:t>calculGainTapisJoueur</a:t>
+            </a:r>
+            <a:r>
+              <a:rPr lang="fr-FR" sz="1400" dirty="0" smtClean="0"/>
+              <a:t>(Table &amp; t);</a:t>
+            </a:r>
+          </a:p>
+          <a:p>
+            <a:pPr>
+              <a:buFont typeface="Wingdings" pitchFamily="2" charset="2"/>
+              <a:buChar char="q"/>
+            </a:pPr>
+            <a:r>
+              <a:rPr lang="fr-FR" sz="1400" dirty="0" err="1" smtClean="0"/>
+              <a:t>int</a:t>
+            </a:r>
+            <a:r>
+              <a:rPr lang="fr-FR" sz="1400" dirty="0" smtClean="0"/>
+              <a:t> </a:t>
+            </a:r>
+            <a:r>
+              <a:rPr lang="fr-FR" sz="1400" dirty="0" err="1" smtClean="0"/>
+              <a:t>lancePartie</a:t>
+            </a:r>
+            <a:r>
+              <a:rPr lang="fr-FR" sz="1400" dirty="0" smtClean="0"/>
+              <a:t>(</a:t>
+            </a:r>
+            <a:r>
+              <a:rPr lang="fr-FR" sz="1400" dirty="0" err="1" smtClean="0"/>
+              <a:t>SDL_Surface</a:t>
+            </a:r>
+            <a:r>
+              <a:rPr lang="fr-FR" sz="1400" dirty="0" smtClean="0"/>
+              <a:t>* </a:t>
+            </a:r>
+            <a:r>
+              <a:rPr lang="fr-FR" sz="1400" dirty="0" err="1" smtClean="0"/>
+              <a:t>affichage,SDL_Surface</a:t>
+            </a:r>
+            <a:r>
+              <a:rPr lang="fr-FR" sz="1400" dirty="0" smtClean="0"/>
+              <a:t>* </a:t>
+            </a:r>
+            <a:r>
+              <a:rPr lang="fr-FR" sz="1400" dirty="0" err="1" smtClean="0"/>
+              <a:t>tapis,const</a:t>
+            </a:r>
+            <a:r>
+              <a:rPr lang="fr-FR" sz="1400" dirty="0" smtClean="0"/>
+              <a:t> char langue[][50],</a:t>
+            </a:r>
+            <a:r>
+              <a:rPr lang="fr-FR" sz="1400" dirty="0" err="1" smtClean="0"/>
+              <a:t>int</a:t>
+            </a:r>
+            <a:r>
+              <a:rPr lang="fr-FR" sz="1400" dirty="0" smtClean="0"/>
+              <a:t> </a:t>
+            </a:r>
+            <a:r>
+              <a:rPr lang="fr-FR" sz="1400" dirty="0" err="1" smtClean="0"/>
+              <a:t>NOMBRE_JOUEUR_PC,int</a:t>
+            </a:r>
+            <a:r>
+              <a:rPr lang="fr-FR" sz="1400" dirty="0" smtClean="0"/>
+              <a:t> </a:t>
+            </a:r>
+            <a:r>
+              <a:rPr lang="fr-FR" sz="1400" dirty="0" err="1" smtClean="0"/>
+              <a:t>argentDepart</a:t>
+            </a:r>
+            <a:r>
+              <a:rPr lang="fr-FR" sz="1400" dirty="0" smtClean="0"/>
+              <a:t>);</a:t>
+            </a:r>
+            <a:endParaRPr lang="fr-FR" sz="1400" dirty="0"/>
           </a:p>
         </p:txBody>
       </p:sp>
@@ -7499,16 +10453,16 @@
       </p:grpSpPr>
       <p:sp>
         <p:nvSpPr>
-          <p:cNvPr id="10" name="Ellipse 9"/>
+          <p:cNvPr id="2" name="Rectangle à coins arrondis 1"/>
           <p:cNvSpPr/>
           <p:nvPr/>
         </p:nvSpPr>
         <p:spPr>
           <a:xfrm>
-            <a:off x="642910" y="1785926"/>
-            <a:ext cx="7858180" cy="4643470"/>
+            <a:off x="1000100" y="857232"/>
+            <a:ext cx="6929486" cy="4572032"/>
           </a:xfrm>
-          <a:prstGeom prst="ellipse">
+          <a:prstGeom prst="roundRect">
             <a:avLst/>
           </a:prstGeom>
         </p:spPr>
@@ -7516,14 +10470,14 @@
           <a:lnRef idx="1">
             <a:schemeClr val="accent6"/>
           </a:lnRef>
-          <a:fillRef idx="3">
+          <a:fillRef idx="2">
             <a:schemeClr val="accent6"/>
           </a:fillRef>
-          <a:effectRef idx="2">
+          <a:effectRef idx="1">
             <a:schemeClr val="accent6"/>
           </a:effectRef>
           <a:fontRef idx="minor">
-            <a:schemeClr val="lt1"/>
+            <a:schemeClr val="dk1"/>
           </a:fontRef>
         </p:style>
         <p:txBody>
@@ -7531,77 +10485,10 @@
           <a:lstStyle/>
           <a:p>
             <a:pPr algn="ctr"/>
-            <a:r>
-              <a:rPr lang="fr-FR" dirty="0" smtClean="0"/>
-              <a:t>Exécution pour chaque joueur</a:t>
-            </a:r>
-          </a:p>
-          <a:p>
-            <a:pPr algn="ctr"/>
-            <a:r>
-              <a:rPr lang="fr-FR" dirty="0" smtClean="0"/>
-              <a:t>Puis trie</a:t>
-            </a:r>
-          </a:p>
-          <a:p>
-            <a:pPr algn="ctr"/>
-            <a:r>
-              <a:rPr lang="fr-FR" dirty="0" smtClean="0"/>
-              <a:t>Et </a:t>
-            </a:r>
-            <a:r>
-              <a:rPr lang="fr-FR" dirty="0" err="1" smtClean="0"/>
-              <a:t>determination</a:t>
-            </a:r>
-            <a:r>
-              <a:rPr lang="fr-FR" dirty="0" smtClean="0"/>
-              <a:t> du vainqueur</a:t>
-            </a:r>
-            <a:endParaRPr lang="fr-FR" dirty="0"/>
-          </a:p>
-        </p:txBody>
-      </p:sp>
-      <p:sp>
-        <p:nvSpPr>
-          <p:cNvPr id="2" name="Titre 1"/>
-          <p:cNvSpPr>
-            <a:spLocks noGrp="1"/>
-          </p:cNvSpPr>
-          <p:nvPr>
-            <p:ph type="title"/>
-          </p:nvPr>
-        </p:nvSpPr>
-        <p:spPr/>
-        <p:txBody>
-          <a:bodyPr>
-            <a:normAutofit fontScale="90000"/>
-          </a:bodyPr>
-          <a:lstStyle/>
-          <a:p>
-            <a:r>
-              <a:rPr lang="fr-FR" dirty="0" smtClean="0"/>
-              <a:t>L’identification du vainqueur et ça main gagnante :</a:t>
-            </a:r>
-            <a:endParaRPr lang="fr-FR" dirty="0"/>
-          </a:p>
-        </p:txBody>
-      </p:sp>
-      <p:graphicFrame>
-        <p:nvGraphicFramePr>
-          <p:cNvPr id="5" name="Diagramme 4"/>
-          <p:cNvGraphicFramePr/>
-          <p:nvPr/>
-        </p:nvGraphicFramePr>
-        <p:xfrm>
-          <a:off x="500034" y="1785926"/>
-          <a:ext cx="8286808" cy="4857784"/>
-        </p:xfrm>
-        <a:graphic>
-          <a:graphicData uri="http://schemas.openxmlformats.org/drawingml/2006/diagram">
-            <dgm:relIds xmlns:dgm="http://schemas.openxmlformats.org/drawingml/2006/diagram" xmlns:r="http://schemas.openxmlformats.org/officeDocument/2006/relationships" r:dm="rId2" r:lo="rId3" r:qs="rId4" r:cs="rId5"/>
-          </a:graphicData>
-        </a:graphic>
-      </p:graphicFrame>
+            <a:endParaRPr lang="fr-FR"/>
+          </a:p>
+        </p:txBody>
+      </p:sp>
     </p:spTree>
   </p:cSld>
   <p:clrMapOvr>
@@ -7610,6 +10497,13 @@
   <p:transition spd="slow">
     <p:fade/>
   </p:transition>
+  <p:timing>
+    <p:tnLst>
+      <p:par>
+        <p:cTn id="1" dur="indefinite" restart="never" nodeType="tmRoot"/>
+      </p:par>
+    </p:tnLst>
+  </p:timing>
 </p:sld>
 </file>
 
@@ -7632,86 +10526,39 @@
       </p:grpSpPr>
       <p:sp>
         <p:nvSpPr>
-          <p:cNvPr id="2" name="Titre 1"/>
-          <p:cNvSpPr>
-            <a:spLocks noGrp="1"/>
-          </p:cNvSpPr>
-          <p:nvPr>
-            <p:ph type="title"/>
-          </p:nvPr>
-        </p:nvSpPr>
-        <p:spPr/>
-        <p:txBody>
-          <a:bodyPr/>
+          <p:cNvPr id="2" name="Rectangle à coins arrondis 1"/>
+          <p:cNvSpPr/>
+          <p:nvPr/>
+        </p:nvSpPr>
+        <p:spPr>
+          <a:xfrm>
+            <a:off x="1000100" y="857232"/>
+            <a:ext cx="6929486" cy="4572032"/>
+          </a:xfrm>
+          <a:prstGeom prst="roundRect">
+            <a:avLst/>
+          </a:prstGeom>
+        </p:spPr>
+        <p:style>
+          <a:lnRef idx="1">
+            <a:schemeClr val="accent6"/>
+          </a:lnRef>
+          <a:fillRef idx="2">
+            <a:schemeClr val="accent6"/>
+          </a:fillRef>
+          <a:effectRef idx="1">
+            <a:schemeClr val="accent6"/>
+          </a:effectRef>
+          <a:fontRef idx="minor">
+            <a:schemeClr val="dk1"/>
+          </a:fontRef>
+        </p:style>
+        <p:txBody>
+          <a:bodyPr rtlCol="0" anchor="ctr"/>
           <a:lstStyle/>
           <a:p>
-            <a:r>
-              <a:rPr lang="fr-FR" dirty="0" smtClean="0"/>
-              <a:t>Ce que l’on a appris :</a:t>
-            </a:r>
-            <a:endParaRPr lang="fr-FR" dirty="0"/>
-          </a:p>
-        </p:txBody>
-      </p:sp>
-      <p:sp>
-        <p:nvSpPr>
-          <p:cNvPr id="3" name="Espace réservé du contenu 2"/>
-          <p:cNvSpPr>
-            <a:spLocks noGrp="1"/>
-          </p:cNvSpPr>
-          <p:nvPr>
-            <p:ph idx="1"/>
-          </p:nvPr>
-        </p:nvSpPr>
-        <p:spPr/>
-        <p:txBody>
-          <a:bodyPr/>
-          <a:lstStyle/>
-          <a:p>
-            <a:r>
-              <a:rPr lang="fr-FR" dirty="0" smtClean="0"/>
-              <a:t>Utiliser </a:t>
-            </a:r>
-            <a:r>
-              <a:rPr lang="fr-FR" dirty="0" err="1" smtClean="0"/>
-              <a:t>Codeblocks</a:t>
-            </a:r>
-            <a:r>
-              <a:rPr lang="fr-FR" dirty="0" smtClean="0"/>
-              <a:t>, SVN, </a:t>
-            </a:r>
-            <a:r>
-              <a:rPr lang="fr-FR" dirty="0" err="1" smtClean="0"/>
-              <a:t>Valgrind</a:t>
-            </a:r>
-            <a:r>
-              <a:rPr lang="fr-FR" dirty="0" smtClean="0"/>
-              <a:t> et </a:t>
-            </a:r>
-            <a:r>
-              <a:rPr lang="fr-FR" dirty="0" err="1" smtClean="0"/>
-              <a:t>Doxygen</a:t>
-            </a:r>
-            <a:endParaRPr lang="fr-FR" dirty="0" smtClean="0"/>
-          </a:p>
-          <a:p>
-            <a:r>
-              <a:rPr lang="fr-FR" dirty="0" smtClean="0"/>
-              <a:t>Ecrire un cahier des charges et tout faire pour le respecter.</a:t>
-            </a:r>
-          </a:p>
-          <a:p>
-            <a:r>
-              <a:rPr lang="fr-FR" dirty="0" smtClean="0"/>
-              <a:t>Gérer le temps et le travail en équipe</a:t>
-            </a:r>
-          </a:p>
-          <a:p>
-            <a:r>
-              <a:rPr lang="fr-FR" dirty="0" smtClean="0"/>
-              <a:t>Programmer un affichage graphique en C</a:t>
-            </a:r>
-            <a:endParaRPr lang="fr-FR" dirty="0"/>
+            <a:pPr algn="ctr"/>
+            <a:endParaRPr lang="fr-FR"/>
           </a:p>
         </p:txBody>
       </p:sp>

</xml_diff>

<commit_message>
ajout cahier des charges+actualisation de presentation
</commit_message>
<xml_diff>
--- a/Annexes/Presentation.pptx
+++ b/Annexes/Presentation.pptx
@@ -5,10 +5,10 @@
     <p:sldMasterId id="2147483648" r:id="rId1"/>
   </p:sldMasterIdLst>
   <p:notesMasterIdLst>
-    <p:notesMasterId r:id="rId22"/>
+    <p:notesMasterId r:id="rId23"/>
   </p:notesMasterIdLst>
   <p:handoutMasterIdLst>
-    <p:handoutMasterId r:id="rId23"/>
+    <p:handoutMasterId r:id="rId24"/>
   </p:handoutMasterIdLst>
   <p:sldIdLst>
     <p:sldId id="257" r:id="rId2"/>
@@ -28,9 +28,10 @@
     <p:sldId id="288" r:id="rId16"/>
     <p:sldId id="289" r:id="rId17"/>
     <p:sldId id="263" r:id="rId18"/>
-    <p:sldId id="264" r:id="rId19"/>
-    <p:sldId id="265" r:id="rId20"/>
-    <p:sldId id="266" r:id="rId21"/>
+    <p:sldId id="290" r:id="rId19"/>
+    <p:sldId id="264" r:id="rId20"/>
+    <p:sldId id="265" r:id="rId21"/>
+    <p:sldId id="266" r:id="rId22"/>
   </p:sldIdLst>
   <p:sldSz cx="9144000" cy="6858000" type="screen4x3"/>
   <p:notesSz cx="6858000" cy="9144000"/>
@@ -2713,7 +2714,7 @@
             <a:fld id="{46AA4BFE-EBE1-4E6B-A126-01D0F88E8835}" type="datetimeFigureOut">
               <a:rPr lang="fr-FR" smtClean="0"/>
               <a:pPr/>
-              <a:t>26/05/2008</a:t>
+              <a:t>27/05/2008</a:t>
             </a:fld>
             <a:endParaRPr lang="fr-FR"/>
           </a:p>
@@ -2875,7 +2876,7 @@
             <a:fld id="{93FB4327-E683-4624-9BA4-151DE4E6AF49}" type="datetimeFigureOut">
               <a:rPr lang="fr-FR" smtClean="0"/>
               <a:pPr/>
-              <a:t>26/05/2008</a:t>
+              <a:t>27/05/2008</a:t>
             </a:fld>
             <a:endParaRPr lang="fr-FR"/>
           </a:p>
@@ -3323,7 +3324,7 @@
             <a:fld id="{5F72105D-0C78-4081-8220-A07C5635D240}" type="datetimeFigureOut">
               <a:rPr lang="fr-FR" smtClean="0"/>
               <a:pPr/>
-              <a:t>26/05/2008</a:t>
+              <a:t>27/05/2008</a:t>
             </a:fld>
             <a:endParaRPr lang="fr-FR"/>
           </a:p>
@@ -3493,7 +3494,7 @@
             <a:fld id="{5F72105D-0C78-4081-8220-A07C5635D240}" type="datetimeFigureOut">
               <a:rPr lang="fr-FR" smtClean="0"/>
               <a:pPr/>
-              <a:t>26/05/2008</a:t>
+              <a:t>27/05/2008</a:t>
             </a:fld>
             <a:endParaRPr lang="fr-FR"/>
           </a:p>
@@ -3673,7 +3674,7 @@
             <a:fld id="{5F72105D-0C78-4081-8220-A07C5635D240}" type="datetimeFigureOut">
               <a:rPr lang="fr-FR" smtClean="0"/>
               <a:pPr/>
-              <a:t>26/05/2008</a:t>
+              <a:t>27/05/2008</a:t>
             </a:fld>
             <a:endParaRPr lang="fr-FR"/>
           </a:p>
@@ -3849,7 +3850,7 @@
             <a:fld id="{5F72105D-0C78-4081-8220-A07C5635D240}" type="datetimeFigureOut">
               <a:rPr lang="fr-FR" smtClean="0"/>
               <a:pPr/>
-              <a:t>26/05/2008</a:t>
+              <a:t>27/05/2008</a:t>
             </a:fld>
             <a:endParaRPr lang="fr-FR"/>
           </a:p>
@@ -4102,7 +4103,7 @@
             <a:fld id="{5F72105D-0C78-4081-8220-A07C5635D240}" type="datetimeFigureOut">
               <a:rPr lang="fr-FR" smtClean="0"/>
               <a:pPr/>
-              <a:t>26/05/2008</a:t>
+              <a:t>27/05/2008</a:t>
             </a:fld>
             <a:endParaRPr lang="fr-FR"/>
           </a:p>
@@ -4390,7 +4391,7 @@
             <a:fld id="{5F72105D-0C78-4081-8220-A07C5635D240}" type="datetimeFigureOut">
               <a:rPr lang="fr-FR" smtClean="0"/>
               <a:pPr/>
-              <a:t>26/05/2008</a:t>
+              <a:t>27/05/2008</a:t>
             </a:fld>
             <a:endParaRPr lang="fr-FR"/>
           </a:p>
@@ -4812,7 +4813,7 @@
             <a:fld id="{5F72105D-0C78-4081-8220-A07C5635D240}" type="datetimeFigureOut">
               <a:rPr lang="fr-FR" smtClean="0"/>
               <a:pPr/>
-              <a:t>26/05/2008</a:t>
+              <a:t>27/05/2008</a:t>
             </a:fld>
             <a:endParaRPr lang="fr-FR"/>
           </a:p>
@@ -4930,7 +4931,7 @@
             <a:fld id="{5F72105D-0C78-4081-8220-A07C5635D240}" type="datetimeFigureOut">
               <a:rPr lang="fr-FR" smtClean="0"/>
               <a:pPr/>
-              <a:t>26/05/2008</a:t>
+              <a:t>27/05/2008</a:t>
             </a:fld>
             <a:endParaRPr lang="fr-FR"/>
           </a:p>
@@ -5025,7 +5026,7 @@
             <a:fld id="{5F72105D-0C78-4081-8220-A07C5635D240}" type="datetimeFigureOut">
               <a:rPr lang="fr-FR" smtClean="0"/>
               <a:pPr/>
-              <a:t>26/05/2008</a:t>
+              <a:t>27/05/2008</a:t>
             </a:fld>
             <a:endParaRPr lang="fr-FR"/>
           </a:p>
@@ -5302,7 +5303,7 @@
             <a:fld id="{5F72105D-0C78-4081-8220-A07C5635D240}" type="datetimeFigureOut">
               <a:rPr lang="fr-FR" smtClean="0"/>
               <a:pPr/>
-              <a:t>26/05/2008</a:t>
+              <a:t>27/05/2008</a:t>
             </a:fld>
             <a:endParaRPr lang="fr-FR"/>
           </a:p>
@@ -5555,7 +5556,7 @@
             <a:fld id="{5F72105D-0C78-4081-8220-A07C5635D240}" type="datetimeFigureOut">
               <a:rPr lang="fr-FR" smtClean="0"/>
               <a:pPr/>
-              <a:t>26/05/2008</a:t>
+              <a:t>27/05/2008</a:t>
             </a:fld>
             <a:endParaRPr lang="fr-FR"/>
           </a:p>
@@ -5806,7 +5807,7 @@
             <a:fld id="{5F72105D-0C78-4081-8220-A07C5635D240}" type="datetimeFigureOut">
               <a:rPr lang="fr-FR" smtClean="0"/>
               <a:pPr/>
-              <a:t>26/05/2008</a:t>
+              <a:t>27/05/2008</a:t>
             </a:fld>
             <a:endParaRPr lang="fr-FR"/>
           </a:p>
@@ -12855,71 +12856,40 @@
         </p:nvSpPr>
         <p:spPr/>
         <p:txBody>
-          <a:bodyPr>
-            <a:normAutofit fontScale="90000"/>
-          </a:bodyPr>
+          <a:bodyPr/>
           <a:lstStyle/>
           <a:p>
             <a:r>
               <a:rPr lang="fr-FR" dirty="0" smtClean="0"/>
-              <a:t>Le fichier de configuration et l’interface dynamique</a:t>
+              <a:t>Une partie… en Anglais :</a:t>
             </a:r>
             <a:endParaRPr lang="fr-FR" dirty="0"/>
           </a:p>
         </p:txBody>
       </p:sp>
-      <p:sp>
-        <p:nvSpPr>
-          <p:cNvPr id="3" name="Espace réservé du contenu 2"/>
-          <p:cNvSpPr>
-            <a:spLocks noGrp="1"/>
-          </p:cNvSpPr>
+      <p:pic>
+        <p:nvPicPr>
+          <p:cNvPr id="4" name="Espace réservé du contenu 3" descr="english.png"/>
+          <p:cNvPicPr>
+            <a:picLocks noGrp="1" noChangeAspect="1"/>
+          </p:cNvPicPr>
           <p:nvPr>
             <p:ph idx="1"/>
           </p:nvPr>
-        </p:nvSpPr>
-        <p:spPr/>
-        <p:txBody>
-          <a:bodyPr/>
-          <a:lstStyle/>
-          <a:p>
-            <a:r>
-              <a:rPr lang="fr-FR" dirty="0" smtClean="0"/>
-              <a:t>Grâce au fichier de </a:t>
-            </a:r>
-            <a:r>
-              <a:rPr lang="fr-FR" dirty="0" err="1" smtClean="0"/>
-              <a:t>configuration,on</a:t>
-            </a:r>
-            <a:r>
-              <a:rPr lang="fr-FR" dirty="0" smtClean="0"/>
-              <a:t> peut facilement personnaliser l’interface :</a:t>
-            </a:r>
-          </a:p>
-          <a:p>
-            <a:pPr lvl="1"/>
-            <a:r>
-              <a:rPr lang="fr-FR" dirty="0" smtClean="0"/>
-              <a:t>En changeant la langue</a:t>
-            </a:r>
-          </a:p>
-          <a:p>
-            <a:pPr lvl="1"/>
-            <a:r>
-              <a:rPr lang="fr-FR" dirty="0" smtClean="0"/>
-              <a:t>Le nombre de joueur</a:t>
-            </a:r>
-          </a:p>
-          <a:p>
-            <a:pPr lvl="1"/>
-            <a:r>
-              <a:rPr lang="fr-FR" dirty="0" smtClean="0"/>
-              <a:t>L’argent de départ</a:t>
-            </a:r>
-            <a:endParaRPr lang="fr-FR" dirty="0"/>
-          </a:p>
-        </p:txBody>
-      </p:sp>
+        </p:nvPicPr>
+        <p:blipFill>
+          <a:blip r:embed="rId2"/>
+          <a:stretch>
+            <a:fillRect/>
+          </a:stretch>
+        </p:blipFill>
+        <p:spPr>
+          <a:xfrm>
+            <a:off x="1636086" y="1600200"/>
+            <a:ext cx="5871827" cy="4525963"/>
+          </a:xfrm>
+        </p:spPr>
+      </p:pic>
     </p:spTree>
   </p:cSld>
   <p:clrMapOvr>
@@ -12928,13 +12898,6 @@
   <p:transition spd="slow">
     <p:fade/>
   </p:transition>
-  <p:timing>
-    <p:tnLst>
-      <p:par>
-        <p:cTn id="1" dur="indefinite" restart="never" nodeType="tmRoot"/>
-      </p:par>
-    </p:tnLst>
-  </p:timing>
 </p:sld>
 </file>
 
@@ -12957,70 +12920,6 @@
       </p:grpSpPr>
       <p:sp>
         <p:nvSpPr>
-          <p:cNvPr id="10" name="Ellipse 9"/>
-          <p:cNvSpPr/>
-          <p:nvPr/>
-        </p:nvSpPr>
-        <p:spPr>
-          <a:xfrm>
-            <a:off x="642910" y="1785926"/>
-            <a:ext cx="7858180" cy="4643470"/>
-          </a:xfrm>
-          <a:prstGeom prst="ellipse">
-            <a:avLst/>
-          </a:prstGeom>
-        </p:spPr>
-        <p:style>
-          <a:lnRef idx="1">
-            <a:schemeClr val="accent6"/>
-          </a:lnRef>
-          <a:fillRef idx="3">
-            <a:schemeClr val="accent6"/>
-          </a:fillRef>
-          <a:effectRef idx="2">
-            <a:schemeClr val="accent6"/>
-          </a:effectRef>
-          <a:fontRef idx="minor">
-            <a:schemeClr val="lt1"/>
-          </a:fontRef>
-        </p:style>
-        <p:txBody>
-          <a:bodyPr rtlCol="0" anchor="ctr"/>
-          <a:lstStyle/>
-          <a:p>
-            <a:pPr algn="ctr"/>
-            <a:r>
-              <a:rPr lang="fr-FR" dirty="0" smtClean="0"/>
-              <a:t>Exécution pour chaque joueur</a:t>
-            </a:r>
-          </a:p>
-          <a:p>
-            <a:pPr algn="ctr"/>
-            <a:r>
-              <a:rPr lang="fr-FR" dirty="0" smtClean="0"/>
-              <a:t>Puis trie</a:t>
-            </a:r>
-          </a:p>
-          <a:p>
-            <a:pPr algn="ctr"/>
-            <a:r>
-              <a:rPr lang="fr-FR" dirty="0" smtClean="0"/>
-              <a:t>Et </a:t>
-            </a:r>
-            <a:r>
-              <a:rPr lang="fr-FR" dirty="0" err="1" smtClean="0"/>
-              <a:t>determination</a:t>
-            </a:r>
-            <a:r>
-              <a:rPr lang="fr-FR" dirty="0" smtClean="0"/>
-              <a:t> du vainqueur</a:t>
-            </a:r>
-            <a:endParaRPr lang="fr-FR" dirty="0"/>
-          </a:p>
-        </p:txBody>
-      </p:sp>
-      <p:sp>
-        <p:nvSpPr>
           <p:cNvPr id="2" name="Titre 1"/>
           <p:cNvSpPr>
             <a:spLocks noGrp="1"/>
@@ -13038,28 +12937,64 @@
           <a:p>
             <a:r>
               <a:rPr lang="fr-FR" dirty="0" smtClean="0"/>
-              <a:t>L’identification du vainqueur et ça main gagnante :</a:t>
+              <a:t>Le fichier de configuration et l’interface dynamique</a:t>
             </a:r>
             <a:endParaRPr lang="fr-FR" dirty="0"/>
           </a:p>
         </p:txBody>
       </p:sp>
-      <p:graphicFrame>
-        <p:nvGraphicFramePr>
-          <p:cNvPr id="5" name="Diagramme 4"/>
-          <p:cNvGraphicFramePr/>
-          <p:nvPr/>
-        </p:nvGraphicFramePr>
-        <p:xfrm>
-          <a:off x="500034" y="1785926"/>
-          <a:ext cx="8286808" cy="4857784"/>
-        </p:xfrm>
-        <a:graphic>
-          <a:graphicData uri="http://schemas.openxmlformats.org/drawingml/2006/diagram">
-            <dgm:relIds xmlns:dgm="http://schemas.openxmlformats.org/drawingml/2006/diagram" xmlns:r="http://schemas.openxmlformats.org/officeDocument/2006/relationships" r:dm="rId2" r:lo="rId3" r:qs="rId4" r:cs="rId5"/>
-          </a:graphicData>
-        </a:graphic>
-      </p:graphicFrame>
+      <p:sp>
+        <p:nvSpPr>
+          <p:cNvPr id="3" name="Espace réservé du contenu 2"/>
+          <p:cNvSpPr>
+            <a:spLocks noGrp="1"/>
+          </p:cNvSpPr>
+          <p:nvPr>
+            <p:ph idx="1"/>
+          </p:nvPr>
+        </p:nvSpPr>
+        <p:spPr/>
+        <p:txBody>
+          <a:bodyPr/>
+          <a:lstStyle/>
+          <a:p>
+            <a:r>
+              <a:rPr lang="fr-FR" dirty="0" smtClean="0"/>
+              <a:t>Grâce au fichier de </a:t>
+            </a:r>
+            <a:r>
+              <a:rPr lang="fr-FR" dirty="0" err="1" smtClean="0"/>
+              <a:t>configuration,on</a:t>
+            </a:r>
+            <a:r>
+              <a:rPr lang="fr-FR" dirty="0" smtClean="0"/>
+              <a:t> peut facilement personnaliser l’interface :</a:t>
+            </a:r>
+          </a:p>
+          <a:p>
+            <a:pPr lvl="1"/>
+            <a:r>
+              <a:rPr lang="fr-FR" dirty="0" smtClean="0"/>
+              <a:t>En changeant la langue</a:t>
+            </a:r>
+          </a:p>
+          <a:p>
+            <a:pPr lvl="1"/>
+            <a:r>
+              <a:rPr lang="fr-FR" dirty="0" smtClean="0"/>
+              <a:t>Le nombre de joueur</a:t>
+            </a:r>
+          </a:p>
+          <a:p>
+            <a:pPr lvl="1"/>
+            <a:r>
+              <a:rPr lang="fr-FR" dirty="0" smtClean="0"/>
+              <a:t>L’argent de départ</a:t>
+            </a:r>
+            <a:endParaRPr lang="fr-FR" dirty="0"/>
+          </a:p>
+        </p:txBody>
+      </p:sp>
     </p:spTree>
   </p:cSld>
   <p:clrMapOvr>
@@ -13209,6 +13144,146 @@
 </file>
 
 <file path=ppt/slides/slide20.xml><?xml version="1.0" encoding="utf-8"?>
+<p:sld xmlns:a="http://schemas.openxmlformats.org/drawingml/2006/main" xmlns:r="http://schemas.openxmlformats.org/officeDocument/2006/relationships" xmlns:p="http://schemas.openxmlformats.org/presentationml/2006/main">
+  <p:cSld>
+    <p:spTree>
+      <p:nvGrpSpPr>
+        <p:cNvPr id="1" name=""/>
+        <p:cNvGrpSpPr/>
+        <p:nvPr/>
+      </p:nvGrpSpPr>
+      <p:grpSpPr>
+        <a:xfrm>
+          <a:off x="0" y="0"/>
+          <a:ext cx="0" cy="0"/>
+          <a:chOff x="0" y="0"/>
+          <a:chExt cx="0" cy="0"/>
+        </a:xfrm>
+      </p:grpSpPr>
+      <p:sp>
+        <p:nvSpPr>
+          <p:cNvPr id="10" name="Ellipse 9"/>
+          <p:cNvSpPr/>
+          <p:nvPr/>
+        </p:nvSpPr>
+        <p:spPr>
+          <a:xfrm>
+            <a:off x="642910" y="1785926"/>
+            <a:ext cx="7858180" cy="4643470"/>
+          </a:xfrm>
+          <a:prstGeom prst="ellipse">
+            <a:avLst/>
+          </a:prstGeom>
+        </p:spPr>
+        <p:style>
+          <a:lnRef idx="1">
+            <a:schemeClr val="accent6"/>
+          </a:lnRef>
+          <a:fillRef idx="3">
+            <a:schemeClr val="accent6"/>
+          </a:fillRef>
+          <a:effectRef idx="2">
+            <a:schemeClr val="accent6"/>
+          </a:effectRef>
+          <a:fontRef idx="minor">
+            <a:schemeClr val="lt1"/>
+          </a:fontRef>
+        </p:style>
+        <p:txBody>
+          <a:bodyPr rtlCol="0" anchor="ctr"/>
+          <a:lstStyle/>
+          <a:p>
+            <a:pPr algn="ctr"/>
+            <a:r>
+              <a:rPr lang="fr-FR" dirty="0" smtClean="0"/>
+              <a:t>Exécution pour chaque joueur</a:t>
+            </a:r>
+          </a:p>
+          <a:p>
+            <a:pPr algn="ctr"/>
+            <a:r>
+              <a:rPr lang="fr-FR" dirty="0" smtClean="0"/>
+              <a:t>Puis trie</a:t>
+            </a:r>
+          </a:p>
+          <a:p>
+            <a:pPr algn="ctr"/>
+            <a:r>
+              <a:rPr lang="fr-FR" dirty="0" smtClean="0"/>
+              <a:t>Et </a:t>
+            </a:r>
+            <a:r>
+              <a:rPr lang="fr-FR" dirty="0" err="1" smtClean="0"/>
+              <a:t>determination</a:t>
+            </a:r>
+            <a:r>
+              <a:rPr lang="fr-FR" dirty="0" smtClean="0"/>
+              <a:t> du vainqueur</a:t>
+            </a:r>
+            <a:endParaRPr lang="fr-FR" dirty="0"/>
+          </a:p>
+        </p:txBody>
+      </p:sp>
+      <p:sp>
+        <p:nvSpPr>
+          <p:cNvPr id="2" name="Titre 1"/>
+          <p:cNvSpPr>
+            <a:spLocks noGrp="1"/>
+          </p:cNvSpPr>
+          <p:nvPr>
+            <p:ph type="title"/>
+          </p:nvPr>
+        </p:nvSpPr>
+        <p:spPr/>
+        <p:txBody>
+          <a:bodyPr>
+            <a:normAutofit fontScale="90000"/>
+          </a:bodyPr>
+          <a:lstStyle/>
+          <a:p>
+            <a:r>
+              <a:rPr lang="fr-FR" dirty="0" smtClean="0"/>
+              <a:t>L’identification du vainqueur et ça main gagnante :</a:t>
+            </a:r>
+            <a:endParaRPr lang="fr-FR" dirty="0"/>
+          </a:p>
+        </p:txBody>
+      </p:sp>
+      <p:graphicFrame>
+        <p:nvGraphicFramePr>
+          <p:cNvPr id="5" name="Diagramme 4"/>
+          <p:cNvGraphicFramePr/>
+          <p:nvPr/>
+        </p:nvGraphicFramePr>
+        <p:xfrm>
+          <a:off x="500034" y="1785926"/>
+          <a:ext cx="8286808" cy="4857784"/>
+        </p:xfrm>
+        <a:graphic>
+          <a:graphicData uri="http://schemas.openxmlformats.org/drawingml/2006/diagram">
+            <dgm:relIds xmlns:dgm="http://schemas.openxmlformats.org/drawingml/2006/diagram" xmlns:r="http://schemas.openxmlformats.org/officeDocument/2006/relationships" r:dm="rId2" r:lo="rId3" r:qs="rId4" r:cs="rId5"/>
+          </a:graphicData>
+        </a:graphic>
+      </p:graphicFrame>
+    </p:spTree>
+  </p:cSld>
+  <p:clrMapOvr>
+    <a:masterClrMapping/>
+  </p:clrMapOvr>
+  <p:transition spd="slow">
+    <p:fade/>
+  </p:transition>
+  <p:timing>
+    <p:tnLst>
+      <p:par>
+        <p:cTn id="1" dur="indefinite" restart="never" nodeType="tmRoot"/>
+      </p:par>
+    </p:tnLst>
+  </p:timing>
+</p:sld>
+</file>
+
+<file path=ppt/slides/slide21.xml><?xml version="1.0" encoding="utf-8"?>
 <p:sld xmlns:a="http://schemas.openxmlformats.org/drawingml/2006/main" xmlns:r="http://schemas.openxmlformats.org/officeDocument/2006/relationships" xmlns:p="http://schemas.openxmlformats.org/presentationml/2006/main">
   <p:cSld>
     <p:spTree>
@@ -13477,7 +13552,9 @@
         </p:nvSpPr>
         <p:spPr/>
         <p:txBody>
-          <a:bodyPr/>
+          <a:bodyPr>
+            <a:normAutofit/>
+          </a:bodyPr>
           <a:lstStyle/>
           <a:p>
             <a:r>
@@ -13495,11 +13572,144 @@
             <a:r>
               <a:rPr lang="fr-FR" dirty="0" smtClean="0"/>
               <a:t>La préparation à une implémentation réseau</a:t>
+            </a:r>
+          </a:p>
+          <a:p>
+            <a:r>
+              <a:rPr lang="fr-FR" dirty="0" smtClean="0"/>
+              <a:t>Interface ergonomique</a:t>
+            </a:r>
+            <a:endParaRPr lang="fr-FR" dirty="0" smtClean="0"/>
+          </a:p>
+          <a:p>
+            <a:r>
+              <a:rPr lang="fr-FR" dirty="0" smtClean="0"/>
+              <a:t>Jeu disponible en Anglais et Français</a:t>
+            </a:r>
+          </a:p>
+          <a:p>
+            <a:r>
+              <a:rPr lang="fr-FR" dirty="0" smtClean="0"/>
+              <a:t>Contrôles </a:t>
+            </a:r>
+            <a:r>
+              <a:rPr lang="fr-FR" dirty="0" smtClean="0"/>
+              <a:t>intuitifs</a:t>
+            </a:r>
+            <a:endParaRPr lang="fr-FR" dirty="0" smtClean="0"/>
+          </a:p>
+          <a:p>
+            <a:r>
+              <a:rPr lang="fr-FR" dirty="0" smtClean="0"/>
+              <a:t>A</a:t>
+            </a:r>
+            <a:r>
+              <a:rPr lang="fr-FR" dirty="0" smtClean="0"/>
+              <a:t>pplication multiplateformes</a:t>
             </a:r>
             <a:endParaRPr lang="fr-FR" dirty="0"/>
           </a:p>
         </p:txBody>
       </p:sp>
+      <p:pic>
+        <p:nvPicPr>
+          <p:cNvPr id="1026" name="Picture 2"/>
+          <p:cNvPicPr>
+            <a:picLocks noChangeAspect="1" noChangeArrowheads="1"/>
+          </p:cNvPicPr>
+          <p:nvPr/>
+        </p:nvPicPr>
+        <p:blipFill>
+          <a:blip r:embed="rId2"/>
+          <a:srcRect/>
+          <a:stretch>
+            <a:fillRect/>
+          </a:stretch>
+        </p:blipFill>
+        <p:spPr bwMode="auto">
+          <a:xfrm>
+            <a:off x="5833312" y="5072074"/>
+            <a:ext cx="810390" cy="579741"/>
+          </a:xfrm>
+          <a:prstGeom prst="rect">
+            <a:avLst/>
+          </a:prstGeom>
+          <a:noFill/>
+          <a:ln w="9525">
+            <a:noFill/>
+            <a:miter lim="800000"/>
+            <a:headEnd/>
+            <a:tailEnd/>
+          </a:ln>
+          <a:effectLst/>
+        </p:spPr>
+      </p:pic>
+      <p:pic>
+        <p:nvPicPr>
+          <p:cNvPr id="1028" name="Picture 4"/>
+          <p:cNvPicPr>
+            <a:picLocks noChangeAspect="1" noChangeArrowheads="1"/>
+          </p:cNvPicPr>
+          <p:nvPr/>
+        </p:nvPicPr>
+        <p:blipFill>
+          <a:blip r:embed="rId3"/>
+          <a:srcRect/>
+          <a:stretch>
+            <a:fillRect/>
+          </a:stretch>
+        </p:blipFill>
+        <p:spPr bwMode="auto">
+          <a:xfrm>
+            <a:off x="7522939" y="5072074"/>
+            <a:ext cx="549523" cy="571504"/>
+          </a:xfrm>
+          <a:prstGeom prst="rect">
+            <a:avLst/>
+          </a:prstGeom>
+          <a:noFill/>
+          <a:ln w="9525">
+            <a:noFill/>
+            <a:miter lim="800000"/>
+            <a:headEnd/>
+            <a:tailEnd/>
+          </a:ln>
+          <a:effectLst/>
+        </p:spPr>
+      </p:pic>
+      <p:pic>
+        <p:nvPicPr>
+          <p:cNvPr id="1030" name="Picture 6"/>
+          <p:cNvPicPr>
+            <a:picLocks noChangeAspect="1" noChangeArrowheads="1"/>
+          </p:cNvPicPr>
+          <p:nvPr/>
+        </p:nvPicPr>
+        <p:blipFill>
+          <a:blip r:embed="rId4"/>
+          <a:srcRect/>
+          <a:stretch>
+            <a:fillRect/>
+          </a:stretch>
+        </p:blipFill>
+        <p:spPr bwMode="auto">
+          <a:xfrm>
+            <a:off x="6786578" y="5072074"/>
+            <a:ext cx="571504" cy="571504"/>
+          </a:xfrm>
+          <a:prstGeom prst="rect">
+            <a:avLst/>
+          </a:prstGeom>
+          <a:noFill/>
+          <a:ln w="9525">
+            <a:noFill/>
+            <a:miter lim="800000"/>
+            <a:headEnd/>
+            <a:tailEnd/>
+          </a:ln>
+          <a:effectLst/>
+        </p:spPr>
+      </p:pic>
     </p:spTree>
   </p:cSld>
   <p:clrMapOvr>
@@ -13974,7 +14184,7 @@
         </p:nvSpPr>
         <p:spPr>
           <a:xfrm>
-            <a:off x="6786578" y="2143116"/>
+            <a:off x="6786578" y="2151869"/>
             <a:ext cx="1714512" cy="276999"/>
           </a:xfrm>
           <a:prstGeom prst="rect">
@@ -14194,42 +14404,6 @@
             <a:avLst>
               <a:gd name="adj1" fmla="val 50000"/>
             </a:avLst>
-          </a:prstGeom>
-          <a:ln>
-            <a:tailEnd type="arrow"/>
-          </a:ln>
-        </p:spPr>
-        <p:style>
-          <a:lnRef idx="2">
-            <a:schemeClr val="accent6"/>
-          </a:lnRef>
-          <a:fillRef idx="0">
-            <a:schemeClr val="accent6"/>
-          </a:fillRef>
-          <a:effectRef idx="1">
-            <a:schemeClr val="accent6"/>
-          </a:effectRef>
-          <a:fontRef idx="minor">
-            <a:schemeClr val="tx1"/>
-          </a:fontRef>
-        </p:style>
-      </p:cxnSp>
-      <p:cxnSp>
-        <p:nvCxnSpPr>
-          <p:cNvPr id="34" name="Connecteur en angle 27"/>
-          <p:cNvCxnSpPr>
-            <a:stCxn id="15" idx="3"/>
-            <a:endCxn id="24" idx="0"/>
-          </p:cNvCxnSpPr>
-          <p:nvPr/>
-        </p:nvCxnSpPr>
-        <p:spPr>
-          <a:xfrm>
-            <a:off x="5572132" y="1638674"/>
-            <a:ext cx="2071702" cy="504442"/>
-          </a:xfrm>
-          <a:prstGeom prst="bentConnector2">
-            <a:avLst/>
           </a:prstGeom>
           <a:ln>
             <a:tailEnd type="arrow"/>
@@ -14458,6 +14632,42 @@
             <a:avLst>
               <a:gd name="adj1" fmla="val 50000"/>
             </a:avLst>
+          </a:prstGeom>
+          <a:ln>
+            <a:tailEnd type="arrow"/>
+          </a:ln>
+        </p:spPr>
+        <p:style>
+          <a:lnRef idx="2">
+            <a:schemeClr val="accent6"/>
+          </a:lnRef>
+          <a:fillRef idx="0">
+            <a:schemeClr val="accent6"/>
+          </a:fillRef>
+          <a:effectRef idx="1">
+            <a:schemeClr val="accent6"/>
+          </a:effectRef>
+          <a:fontRef idx="minor">
+            <a:schemeClr val="tx1"/>
+          </a:fontRef>
+        </p:style>
+      </p:cxnSp>
+      <p:cxnSp>
+        <p:nvCxnSpPr>
+          <p:cNvPr id="29" name="Forme 28"/>
+          <p:cNvCxnSpPr>
+            <a:stCxn id="15" idx="3"/>
+            <a:endCxn id="24" idx="0"/>
+          </p:cNvCxnSpPr>
+          <p:nvPr/>
+        </p:nvCxnSpPr>
+        <p:spPr>
+          <a:xfrm>
+            <a:off x="5572132" y="1638674"/>
+            <a:ext cx="2071702" cy="513195"/>
+          </a:xfrm>
+          <a:prstGeom prst="bentConnector2">
+            <a:avLst/>
           </a:prstGeom>
           <a:ln>
             <a:tailEnd type="arrow"/>

</xml_diff>

<commit_message>
la derniere pour aujourd'hui
</commit_message>
<xml_diff>
--- a/Annexes/Presentation.pptx
+++ b/Annexes/Presentation.pptx
@@ -5,10 +5,10 @@
     <p:sldMasterId id="2147483648" r:id="rId1"/>
   </p:sldMasterIdLst>
   <p:notesMasterIdLst>
-    <p:notesMasterId r:id="rId23"/>
+    <p:notesMasterId r:id="rId24"/>
   </p:notesMasterIdLst>
   <p:handoutMasterIdLst>
-    <p:handoutMasterId r:id="rId24"/>
+    <p:handoutMasterId r:id="rId25"/>
   </p:handoutMasterIdLst>
   <p:sldIdLst>
     <p:sldId id="257" r:id="rId2"/>
@@ -28,10 +28,11 @@
     <p:sldId id="288" r:id="rId16"/>
     <p:sldId id="289" r:id="rId17"/>
     <p:sldId id="263" r:id="rId18"/>
-    <p:sldId id="290" r:id="rId19"/>
-    <p:sldId id="264" r:id="rId20"/>
-    <p:sldId id="265" r:id="rId21"/>
-    <p:sldId id="266" r:id="rId22"/>
+    <p:sldId id="291" r:id="rId19"/>
+    <p:sldId id="290" r:id="rId20"/>
+    <p:sldId id="264" r:id="rId21"/>
+    <p:sldId id="265" r:id="rId22"/>
+    <p:sldId id="266" r:id="rId23"/>
   </p:sldIdLst>
   <p:sldSz cx="9144000" cy="6858000" type="screen4x3"/>
   <p:notesSz cx="6858000" cy="9144000"/>
@@ -12846,7 +12847,7 @@
       </p:grpSpPr>
       <p:sp>
         <p:nvSpPr>
-          <p:cNvPr id="2" name="Titre 1"/>
+          <p:cNvPr id="4" name="Titre 3"/>
           <p:cNvSpPr>
             <a:spLocks noGrp="1"/>
           </p:cNvSpPr>
@@ -12861,35 +12862,90 @@
           <a:p>
             <a:r>
               <a:rPr lang="fr-FR" dirty="0" smtClean="0"/>
-              <a:t>Une partie… en Anglais :</a:t>
+              <a:t>Manuel du jeu :</a:t>
             </a:r>
             <a:endParaRPr lang="fr-FR" dirty="0"/>
           </a:p>
         </p:txBody>
       </p:sp>
-      <p:pic>
-        <p:nvPicPr>
-          <p:cNvPr id="4" name="Espace réservé du contenu 3" descr="english.png"/>
-          <p:cNvPicPr>
-            <a:picLocks noGrp="1" noChangeAspect="1"/>
-          </p:cNvPicPr>
+      <p:sp>
+        <p:nvSpPr>
+          <p:cNvPr id="5" name="Espace réservé du contenu 4"/>
+          <p:cNvSpPr>
+            <a:spLocks noGrp="1"/>
+          </p:cNvSpPr>
           <p:nvPr>
             <p:ph idx="1"/>
           </p:nvPr>
-        </p:nvPicPr>
-        <p:blipFill>
-          <a:blip r:embed="rId2"/>
-          <a:stretch>
-            <a:fillRect/>
-          </a:stretch>
-        </p:blipFill>
-        <p:spPr>
-          <a:xfrm>
-            <a:off x="1636086" y="1600200"/>
-            <a:ext cx="5871827" cy="4525963"/>
-          </a:xfrm>
-        </p:spPr>
-      </p:pic>
+        </p:nvSpPr>
+        <p:spPr/>
+        <p:txBody>
+          <a:bodyPr/>
+          <a:lstStyle/>
+          <a:p>
+            <a:pPr algn="just">
+              <a:buNone/>
+            </a:pPr>
+            <a:r>
+              <a:rPr lang="fr-FR" dirty="0" smtClean="0"/>
+              <a:t>		</a:t>
+            </a:r>
+            <a:r>
+              <a:rPr lang="fr-FR" u="sng" dirty="0" smtClean="0"/>
+              <a:t>En cours de partie, il est possible d’accéder directement à un endroit en cliquant tout simplement sur :</a:t>
+            </a:r>
+          </a:p>
+          <a:p>
+            <a:r>
+              <a:rPr lang="fr-FR" dirty="0" smtClean="0"/>
+              <a:t>‘m’ </a:t>
+            </a:r>
+            <a:r>
+              <a:rPr lang="fr-FR" dirty="0" smtClean="0"/>
+              <a:t>pour le menu</a:t>
+            </a:r>
+          </a:p>
+          <a:p>
+            <a:r>
+              <a:rPr lang="nl-NL" dirty="0" smtClean="0"/>
+              <a:t>‘</a:t>
+            </a:r>
+            <a:r>
+              <a:rPr lang="nl-NL" dirty="0" err="1" smtClean="0"/>
+              <a:t>echap</a:t>
+            </a:r>
+            <a:r>
+              <a:rPr lang="nl-NL" dirty="0" smtClean="0"/>
+              <a:t>’ </a:t>
+            </a:r>
+            <a:r>
+              <a:rPr lang="nl-NL" dirty="0" err="1" smtClean="0"/>
+              <a:t>pour</a:t>
+            </a:r>
+            <a:r>
+              <a:rPr lang="nl-NL" dirty="0" smtClean="0"/>
+              <a:t> </a:t>
+            </a:r>
+            <a:r>
+              <a:rPr lang="nl-NL" dirty="0" err="1" smtClean="0"/>
+              <a:t>quitter</a:t>
+            </a:r>
+            <a:r>
+              <a:rPr lang="nl-NL" dirty="0" smtClean="0"/>
+              <a:t> </a:t>
+            </a:r>
+            <a:r>
+              <a:rPr lang="nl-NL" dirty="0" err="1" smtClean="0"/>
+              <a:t>le</a:t>
+            </a:r>
+            <a:r>
+              <a:rPr lang="nl-NL" dirty="0" smtClean="0"/>
+              <a:t> jeu</a:t>
+            </a:r>
+            <a:endParaRPr lang="nl-NL" dirty="0" smtClean="0"/>
+          </a:p>
+        </p:txBody>
+      </p:sp>
     </p:spTree>
   </p:cSld>
   <p:clrMapOvr>
@@ -12930,71 +12986,40 @@
         </p:nvSpPr>
         <p:spPr/>
         <p:txBody>
-          <a:bodyPr>
-            <a:normAutofit fontScale="90000"/>
-          </a:bodyPr>
+          <a:bodyPr/>
           <a:lstStyle/>
           <a:p>
             <a:r>
               <a:rPr lang="fr-FR" dirty="0" smtClean="0"/>
-              <a:t>Le fichier de configuration et l’interface dynamique</a:t>
+              <a:t>Une partie… en Anglais :</a:t>
             </a:r>
             <a:endParaRPr lang="fr-FR" dirty="0"/>
           </a:p>
         </p:txBody>
       </p:sp>
-      <p:sp>
-        <p:nvSpPr>
-          <p:cNvPr id="3" name="Espace réservé du contenu 2"/>
-          <p:cNvSpPr>
-            <a:spLocks noGrp="1"/>
-          </p:cNvSpPr>
+      <p:pic>
+        <p:nvPicPr>
+          <p:cNvPr id="4" name="Espace réservé du contenu 3" descr="english.png"/>
+          <p:cNvPicPr>
+            <a:picLocks noGrp="1" noChangeAspect="1"/>
+          </p:cNvPicPr>
           <p:nvPr>
             <p:ph idx="1"/>
           </p:nvPr>
-        </p:nvSpPr>
-        <p:spPr/>
-        <p:txBody>
-          <a:bodyPr/>
-          <a:lstStyle/>
-          <a:p>
-            <a:r>
-              <a:rPr lang="fr-FR" dirty="0" smtClean="0"/>
-              <a:t>Grâce au fichier de </a:t>
-            </a:r>
-            <a:r>
-              <a:rPr lang="fr-FR" dirty="0" err="1" smtClean="0"/>
-              <a:t>configuration,on</a:t>
-            </a:r>
-            <a:r>
-              <a:rPr lang="fr-FR" dirty="0" smtClean="0"/>
-              <a:t> peut facilement personnaliser l’interface :</a:t>
-            </a:r>
-          </a:p>
-          <a:p>
-            <a:pPr lvl="1"/>
-            <a:r>
-              <a:rPr lang="fr-FR" dirty="0" smtClean="0"/>
-              <a:t>En changeant la langue</a:t>
-            </a:r>
-          </a:p>
-          <a:p>
-            <a:pPr lvl="1"/>
-            <a:r>
-              <a:rPr lang="fr-FR" dirty="0" smtClean="0"/>
-              <a:t>Le nombre de joueur</a:t>
-            </a:r>
-          </a:p>
-          <a:p>
-            <a:pPr lvl="1"/>
-            <a:r>
-              <a:rPr lang="fr-FR" dirty="0" smtClean="0"/>
-              <a:t>L’argent de départ</a:t>
-            </a:r>
-            <a:endParaRPr lang="fr-FR" dirty="0"/>
-          </a:p>
-        </p:txBody>
-      </p:sp>
+        </p:nvPicPr>
+        <p:blipFill>
+          <a:blip r:embed="rId2"/>
+          <a:stretch>
+            <a:fillRect/>
+          </a:stretch>
+        </p:blipFill>
+        <p:spPr>
+          <a:xfrm>
+            <a:off x="1636086" y="1600200"/>
+            <a:ext cx="5871827" cy="4525963"/>
+          </a:xfrm>
+        </p:spPr>
+      </p:pic>
     </p:spTree>
   </p:cSld>
   <p:clrMapOvr>
@@ -13003,13 +13028,6 @@
   <p:transition spd="slow">
     <p:fade/>
   </p:transition>
-  <p:timing>
-    <p:tnLst>
-      <p:par>
-        <p:cTn id="1" dur="indefinite" restart="never" nodeType="tmRoot"/>
-      </p:par>
-    </p:tnLst>
-  </p:timing>
 </p:sld>
 </file>
 
@@ -13144,6 +13162,118 @@
 </file>
 
 <file path=ppt/slides/slide20.xml><?xml version="1.0" encoding="utf-8"?>
+<p:sld xmlns:a="http://schemas.openxmlformats.org/drawingml/2006/main" xmlns:r="http://schemas.openxmlformats.org/officeDocument/2006/relationships" xmlns:p="http://schemas.openxmlformats.org/presentationml/2006/main">
+  <p:cSld>
+    <p:spTree>
+      <p:nvGrpSpPr>
+        <p:cNvPr id="1" name=""/>
+        <p:cNvGrpSpPr/>
+        <p:nvPr/>
+      </p:nvGrpSpPr>
+      <p:grpSpPr>
+        <a:xfrm>
+          <a:off x="0" y="0"/>
+          <a:ext cx="0" cy="0"/>
+          <a:chOff x="0" y="0"/>
+          <a:chExt cx="0" cy="0"/>
+        </a:xfrm>
+      </p:grpSpPr>
+      <p:sp>
+        <p:nvSpPr>
+          <p:cNvPr id="2" name="Titre 1"/>
+          <p:cNvSpPr>
+            <a:spLocks noGrp="1"/>
+          </p:cNvSpPr>
+          <p:nvPr>
+            <p:ph type="title"/>
+          </p:nvPr>
+        </p:nvSpPr>
+        <p:spPr/>
+        <p:txBody>
+          <a:bodyPr>
+            <a:normAutofit fontScale="90000"/>
+          </a:bodyPr>
+          <a:lstStyle/>
+          <a:p>
+            <a:r>
+              <a:rPr lang="fr-FR" dirty="0" smtClean="0"/>
+              <a:t>Le fichier de configuration et l’interface dynamique</a:t>
+            </a:r>
+            <a:endParaRPr lang="fr-FR" dirty="0"/>
+          </a:p>
+        </p:txBody>
+      </p:sp>
+      <p:sp>
+        <p:nvSpPr>
+          <p:cNvPr id="3" name="Espace réservé du contenu 2"/>
+          <p:cNvSpPr>
+            <a:spLocks noGrp="1"/>
+          </p:cNvSpPr>
+          <p:nvPr>
+            <p:ph idx="1"/>
+          </p:nvPr>
+        </p:nvSpPr>
+        <p:spPr/>
+        <p:txBody>
+          <a:bodyPr/>
+          <a:lstStyle/>
+          <a:p>
+            <a:r>
+              <a:rPr lang="fr-FR" dirty="0" smtClean="0"/>
+              <a:t>Grâce au fichier de </a:t>
+            </a:r>
+            <a:r>
+              <a:rPr lang="fr-FR" dirty="0" err="1" smtClean="0"/>
+              <a:t>configuration,on</a:t>
+            </a:r>
+            <a:r>
+              <a:rPr lang="fr-FR" dirty="0" smtClean="0"/>
+              <a:t> peut facilement personnaliser l’interface :</a:t>
+            </a:r>
+          </a:p>
+          <a:p>
+            <a:pPr lvl="1"/>
+            <a:r>
+              <a:rPr lang="fr-FR" dirty="0" smtClean="0"/>
+              <a:t>En changeant la langue</a:t>
+            </a:r>
+          </a:p>
+          <a:p>
+            <a:pPr lvl="1"/>
+            <a:r>
+              <a:rPr lang="fr-FR" dirty="0" smtClean="0"/>
+              <a:t>Le nombre de joueur</a:t>
+            </a:r>
+          </a:p>
+          <a:p>
+            <a:pPr lvl="1"/>
+            <a:r>
+              <a:rPr lang="fr-FR" dirty="0" smtClean="0"/>
+              <a:t>L’argent de départ</a:t>
+            </a:r>
+            <a:endParaRPr lang="fr-FR" dirty="0"/>
+          </a:p>
+        </p:txBody>
+      </p:sp>
+    </p:spTree>
+  </p:cSld>
+  <p:clrMapOvr>
+    <a:masterClrMapping/>
+  </p:clrMapOvr>
+  <p:transition spd="slow">
+    <p:fade/>
+  </p:transition>
+  <p:timing>
+    <p:tnLst>
+      <p:par>
+        <p:cTn id="1" dur="indefinite" restart="never" nodeType="tmRoot"/>
+      </p:par>
+    </p:tnLst>
+  </p:timing>
+</p:sld>
+</file>
+
+<file path=ppt/slides/slide21.xml><?xml version="1.0" encoding="utf-8"?>
 <p:sld xmlns:a="http://schemas.openxmlformats.org/drawingml/2006/main" xmlns:r="http://schemas.openxmlformats.org/officeDocument/2006/relationships" xmlns:p="http://schemas.openxmlformats.org/presentationml/2006/main">
   <p:cSld>
     <p:spTree>
@@ -13283,7 +13413,7 @@
 </p:sld>
 </file>
 
-<file path=ppt/slides/slide21.xml><?xml version="1.0" encoding="utf-8"?>
+<file path=ppt/slides/slide22.xml><?xml version="1.0" encoding="utf-8"?>
 <p:sld xmlns:a="http://schemas.openxmlformats.org/drawingml/2006/main" xmlns:r="http://schemas.openxmlformats.org/officeDocument/2006/relationships" xmlns:p="http://schemas.openxmlformats.org/presentationml/2006/main">
   <p:cSld>
     <p:spTree>
@@ -13379,7 +13509,25 @@
           <a:p>
             <a:r>
               <a:rPr lang="fr-FR" dirty="0" smtClean="0"/>
-              <a:t>Programmer un affichage graphique en C</a:t>
+              <a:t>Programmer un affichage graphique en </a:t>
+            </a:r>
+            <a:r>
+              <a:rPr lang="fr-FR" dirty="0" smtClean="0"/>
+              <a:t>C</a:t>
+            </a:r>
+          </a:p>
+          <a:p>
+            <a:r>
+              <a:rPr lang="fr-FR" dirty="0" smtClean="0"/>
+              <a:t>Utilisation </a:t>
+            </a:r>
+            <a:r>
+              <a:rPr lang="fr-FR" dirty="0" smtClean="0"/>
+              <a:t>du </a:t>
+            </a:r>
+            <a:r>
+              <a:rPr lang="fr-FR" dirty="0" err="1" smtClean="0"/>
+              <a:t>deboggeur</a:t>
             </a:r>
             <a:endParaRPr lang="fr-FR" dirty="0"/>
           </a:p>
@@ -13579,7 +13727,6 @@
               <a:rPr lang="fr-FR" dirty="0" smtClean="0"/>
               <a:t>Interface ergonomique</a:t>
             </a:r>
-            <a:endParaRPr lang="fr-FR" dirty="0" smtClean="0"/>
           </a:p>
           <a:p>
             <a:r>
@@ -13590,22 +13737,13 @@
           <a:p>
             <a:r>
               <a:rPr lang="fr-FR" dirty="0" smtClean="0"/>
-              <a:t>Contrôles </a:t>
-            </a:r>
-            <a:r>
-              <a:rPr lang="fr-FR" dirty="0" smtClean="0"/>
-              <a:t>intuitifs</a:t>
-            </a:r>
-            <a:endParaRPr lang="fr-FR" dirty="0" smtClean="0"/>
-          </a:p>
-          <a:p>
-            <a:r>
-              <a:rPr lang="fr-FR" dirty="0" smtClean="0"/>
-              <a:t>A</a:t>
-            </a:r>
-            <a:r>
-              <a:rPr lang="fr-FR" dirty="0" smtClean="0"/>
-              <a:t>pplication multiplateformes</a:t>
+              <a:t>Contrôles intuitifs</a:t>
+            </a:r>
+          </a:p>
+          <a:p>
+            <a:r>
+              <a:rPr lang="fr-FR" dirty="0" smtClean="0"/>
+              <a:t>Application multiplateformes</a:t>
             </a:r>
             <a:endParaRPr lang="fr-FR" dirty="0"/>
           </a:p>

</xml_diff>

<commit_message>
Ajout mélange des cartes
</commit_message>
<xml_diff>
--- a/Annexes/Presentation.pptx
+++ b/Annexes/Presentation.pptx
@@ -5,10 +5,10 @@
     <p:sldMasterId id="2147483648" r:id="rId1"/>
   </p:sldMasterIdLst>
   <p:notesMasterIdLst>
-    <p:notesMasterId r:id="rId24"/>
+    <p:notesMasterId r:id="rId25"/>
   </p:notesMasterIdLst>
   <p:handoutMasterIdLst>
-    <p:handoutMasterId r:id="rId25"/>
+    <p:handoutMasterId r:id="rId26"/>
   </p:handoutMasterIdLst>
   <p:sldIdLst>
     <p:sldId id="257" r:id="rId2"/>
@@ -27,12 +27,13 @@
     <p:sldId id="287" r:id="rId15"/>
     <p:sldId id="288" r:id="rId16"/>
     <p:sldId id="289" r:id="rId17"/>
-    <p:sldId id="263" r:id="rId18"/>
-    <p:sldId id="291" r:id="rId19"/>
-    <p:sldId id="290" r:id="rId20"/>
-    <p:sldId id="264" r:id="rId21"/>
-    <p:sldId id="265" r:id="rId22"/>
-    <p:sldId id="266" r:id="rId23"/>
+    <p:sldId id="292" r:id="rId18"/>
+    <p:sldId id="263" r:id="rId19"/>
+    <p:sldId id="291" r:id="rId20"/>
+    <p:sldId id="290" r:id="rId21"/>
+    <p:sldId id="264" r:id="rId22"/>
+    <p:sldId id="265" r:id="rId23"/>
+    <p:sldId id="266" r:id="rId24"/>
   </p:sldIdLst>
   <p:sldSz cx="9144000" cy="6858000" type="screen4x3"/>
   <p:notesSz cx="6858000" cy="9144000"/>
@@ -135,6 +136,753 @@
 </file>
 
 <file path=ppt/diagrams/colors1.xml><?xml version="1.0" encoding="utf-8"?>
+<dgm:colorsDef xmlns:dgm="http://schemas.openxmlformats.org/drawingml/2006/diagram" xmlns:a="http://schemas.openxmlformats.org/drawingml/2006/main" uniqueId="urn:microsoft.com/office/officeart/2005/8/colors/accent1_2">
+  <dgm:title val=""/>
+  <dgm:desc val=""/>
+  <dgm:catLst>
+    <dgm:cat type="accent1" pri="11200"/>
+  </dgm:catLst>
+  <dgm:styleLbl name="node0">
+    <dgm:fillClrLst meth="repeat">
+      <a:schemeClr val="accent1"/>
+    </dgm:fillClrLst>
+    <dgm:linClrLst meth="repeat">
+      <a:schemeClr val="lt1"/>
+    </dgm:linClrLst>
+    <dgm:effectClrLst/>
+    <dgm:txLinClrLst/>
+    <dgm:txFillClrLst/>
+    <dgm:txEffectClrLst/>
+  </dgm:styleLbl>
+  <dgm:styleLbl name="alignNode1">
+    <dgm:fillClrLst meth="repeat">
+      <a:schemeClr val="accent1"/>
+    </dgm:fillClrLst>
+    <dgm:linClrLst meth="repeat">
+      <a:schemeClr val="accent1"/>
+    </dgm:linClrLst>
+    <dgm:effectClrLst/>
+    <dgm:txLinClrLst/>
+    <dgm:txFillClrLst/>
+    <dgm:txEffectClrLst/>
+  </dgm:styleLbl>
+  <dgm:styleLbl name="node1">
+    <dgm:fillClrLst meth="repeat">
+      <a:schemeClr val="accent1"/>
+    </dgm:fillClrLst>
+    <dgm:linClrLst meth="repeat">
+      <a:schemeClr val="lt1"/>
+    </dgm:linClrLst>
+    <dgm:effectClrLst/>
+    <dgm:txLinClrLst/>
+    <dgm:txFillClrLst/>
+    <dgm:txEffectClrLst/>
+  </dgm:styleLbl>
+  <dgm:styleLbl name="lnNode1">
+    <dgm:fillClrLst meth="repeat">
+      <a:schemeClr val="accent1"/>
+    </dgm:fillClrLst>
+    <dgm:linClrLst meth="repeat">
+      <a:schemeClr val="lt1"/>
+    </dgm:linClrLst>
+    <dgm:effectClrLst/>
+    <dgm:txLinClrLst/>
+    <dgm:txFillClrLst/>
+    <dgm:txEffectClrLst/>
+  </dgm:styleLbl>
+  <dgm:styleLbl name="vennNode1">
+    <dgm:fillClrLst meth="repeat">
+      <a:schemeClr val="accent1">
+        <a:alpha val="50000"/>
+      </a:schemeClr>
+    </dgm:fillClrLst>
+    <dgm:linClrLst meth="repeat">
+      <a:schemeClr val="lt1"/>
+    </dgm:linClrLst>
+    <dgm:effectClrLst/>
+    <dgm:txLinClrLst/>
+    <dgm:txFillClrLst/>
+    <dgm:txEffectClrLst/>
+  </dgm:styleLbl>
+  <dgm:styleLbl name="node2">
+    <dgm:fillClrLst meth="repeat">
+      <a:schemeClr val="accent1"/>
+    </dgm:fillClrLst>
+    <dgm:linClrLst meth="repeat">
+      <a:schemeClr val="lt1"/>
+    </dgm:linClrLst>
+    <dgm:effectClrLst/>
+    <dgm:txLinClrLst/>
+    <dgm:txFillClrLst/>
+    <dgm:txEffectClrLst/>
+  </dgm:styleLbl>
+  <dgm:styleLbl name="node3">
+    <dgm:fillClrLst meth="repeat">
+      <a:schemeClr val="accent1"/>
+    </dgm:fillClrLst>
+    <dgm:linClrLst meth="repeat">
+      <a:schemeClr val="lt1"/>
+    </dgm:linClrLst>
+    <dgm:effectClrLst/>
+    <dgm:txLinClrLst/>
+    <dgm:txFillClrLst/>
+    <dgm:txEffectClrLst/>
+  </dgm:styleLbl>
+  <dgm:styleLbl name="node4">
+    <dgm:fillClrLst meth="repeat">
+      <a:schemeClr val="accent1"/>
+    </dgm:fillClrLst>
+    <dgm:linClrLst meth="repeat">
+      <a:schemeClr val="lt1"/>
+    </dgm:linClrLst>
+    <dgm:effectClrLst/>
+    <dgm:txLinClrLst/>
+    <dgm:txFillClrLst/>
+    <dgm:txEffectClrLst/>
+  </dgm:styleLbl>
+  <dgm:styleLbl name="fgImgPlace1">
+    <dgm:fillClrLst meth="repeat">
+      <a:schemeClr val="accent1">
+        <a:tint val="50000"/>
+      </a:schemeClr>
+    </dgm:fillClrLst>
+    <dgm:linClrLst meth="repeat">
+      <a:schemeClr val="lt1"/>
+    </dgm:linClrLst>
+    <dgm:effectClrLst/>
+    <dgm:txLinClrLst/>
+    <dgm:txFillClrLst meth="repeat">
+      <a:schemeClr val="lt1"/>
+    </dgm:txFillClrLst>
+    <dgm:txEffectClrLst/>
+  </dgm:styleLbl>
+  <dgm:styleLbl name="alignImgPlace1">
+    <dgm:fillClrLst meth="repeat">
+      <a:schemeClr val="accent1">
+        <a:tint val="50000"/>
+      </a:schemeClr>
+    </dgm:fillClrLst>
+    <dgm:linClrLst meth="repeat">
+      <a:schemeClr val="lt1"/>
+    </dgm:linClrLst>
+    <dgm:effectClrLst/>
+    <dgm:txLinClrLst/>
+    <dgm:txFillClrLst meth="repeat">
+      <a:schemeClr val="lt1"/>
+    </dgm:txFillClrLst>
+    <dgm:txEffectClrLst/>
+  </dgm:styleLbl>
+  <dgm:styleLbl name="bgImgPlace1">
+    <dgm:fillClrLst meth="repeat">
+      <a:schemeClr val="accent1">
+        <a:tint val="50000"/>
+      </a:schemeClr>
+    </dgm:fillClrLst>
+    <dgm:linClrLst meth="repeat">
+      <a:schemeClr val="lt1"/>
+    </dgm:linClrLst>
+    <dgm:effectClrLst/>
+    <dgm:txLinClrLst/>
+    <dgm:txFillClrLst meth="repeat">
+      <a:schemeClr val="lt1"/>
+    </dgm:txFillClrLst>
+    <dgm:txEffectClrLst/>
+  </dgm:styleLbl>
+  <dgm:styleLbl name="sibTrans2D1">
+    <dgm:fillClrLst meth="repeat">
+      <a:schemeClr val="accent1">
+        <a:tint val="60000"/>
+      </a:schemeClr>
+    </dgm:fillClrLst>
+    <dgm:linClrLst meth="repeat">
+      <a:schemeClr val="accent1">
+        <a:tint val="60000"/>
+      </a:schemeClr>
+    </dgm:linClrLst>
+    <dgm:effectClrLst/>
+    <dgm:txLinClrLst/>
+    <dgm:txFillClrLst/>
+    <dgm:txEffectClrLst/>
+  </dgm:styleLbl>
+  <dgm:styleLbl name="fgSibTrans2D1">
+    <dgm:fillClrLst meth="repeat">
+      <a:schemeClr val="accent1">
+        <a:tint val="60000"/>
+      </a:schemeClr>
+    </dgm:fillClrLst>
+    <dgm:linClrLst meth="repeat">
+      <a:schemeClr val="accent1">
+        <a:tint val="60000"/>
+      </a:schemeClr>
+    </dgm:linClrLst>
+    <dgm:effectClrLst/>
+    <dgm:txLinClrLst/>
+    <dgm:txFillClrLst/>
+    <dgm:txEffectClrLst/>
+  </dgm:styleLbl>
+  <dgm:styleLbl name="bgSibTrans2D1">
+    <dgm:fillClrLst meth="repeat">
+      <a:schemeClr val="accent1">
+        <a:tint val="60000"/>
+      </a:schemeClr>
+    </dgm:fillClrLst>
+    <dgm:linClrLst meth="repeat">
+      <a:schemeClr val="accent1">
+        <a:tint val="60000"/>
+      </a:schemeClr>
+    </dgm:linClrLst>
+    <dgm:effectClrLst/>
+    <dgm:txLinClrLst/>
+    <dgm:txFillClrLst/>
+    <dgm:txEffectClrLst/>
+  </dgm:styleLbl>
+  <dgm:styleLbl name="sibTrans1D1">
+    <dgm:fillClrLst meth="repeat">
+      <a:schemeClr val="accent1"/>
+    </dgm:fillClrLst>
+    <dgm:linClrLst meth="repeat">
+      <a:schemeClr val="accent1"/>
+    </dgm:linClrLst>
+    <dgm:effectClrLst/>
+    <dgm:txLinClrLst/>
+    <dgm:txFillClrLst meth="repeat">
+      <a:schemeClr val="tx1"/>
+    </dgm:txFillClrLst>
+    <dgm:txEffectClrLst/>
+  </dgm:styleLbl>
+  <dgm:styleLbl name="callout">
+    <dgm:fillClrLst meth="repeat">
+      <a:schemeClr val="accent1"/>
+    </dgm:fillClrLst>
+    <dgm:linClrLst meth="repeat">
+      <a:schemeClr val="accent1">
+        <a:tint val="50000"/>
+      </a:schemeClr>
+    </dgm:linClrLst>
+    <dgm:effectClrLst/>
+    <dgm:txLinClrLst/>
+    <dgm:txFillClrLst meth="repeat">
+      <a:schemeClr val="tx1"/>
+    </dgm:txFillClrLst>
+    <dgm:txEffectClrLst/>
+  </dgm:styleLbl>
+  <dgm:styleLbl name="asst0">
+    <dgm:fillClrLst meth="repeat">
+      <a:schemeClr val="accent1"/>
+    </dgm:fillClrLst>
+    <dgm:linClrLst meth="repeat">
+      <a:schemeClr val="lt1"/>
+    </dgm:linClrLst>
+    <dgm:effectClrLst/>
+    <dgm:txLinClrLst/>
+    <dgm:txFillClrLst/>
+    <dgm:txEffectClrLst/>
+  </dgm:styleLbl>
+  <dgm:styleLbl name="asst1">
+    <dgm:fillClrLst meth="repeat">
+      <a:schemeClr val="accent1"/>
+    </dgm:fillClrLst>
+    <dgm:linClrLst meth="repeat">
+      <a:schemeClr val="lt1"/>
+    </dgm:linClrLst>
+    <dgm:effectClrLst/>
+    <dgm:txLinClrLst/>
+    <dgm:txFillClrLst/>
+    <dgm:txEffectClrLst/>
+  </dgm:styleLbl>
+  <dgm:styleLbl name="asst2">
+    <dgm:fillClrLst meth="repeat">
+      <a:schemeClr val="accent1"/>
+    </dgm:fillClrLst>
+    <dgm:linClrLst meth="repeat">
+      <a:schemeClr val="lt1"/>
+    </dgm:linClrLst>
+    <dgm:effectClrLst/>
+    <dgm:txLinClrLst/>
+    <dgm:txFillClrLst/>
+    <dgm:txEffectClrLst/>
+  </dgm:styleLbl>
+  <dgm:styleLbl name="asst3">
+    <dgm:fillClrLst meth="repeat">
+      <a:schemeClr val="accent1"/>
+    </dgm:fillClrLst>
+    <dgm:linClrLst meth="repeat">
+      <a:schemeClr val="lt1"/>
+    </dgm:linClrLst>
+    <dgm:effectClrLst/>
+    <dgm:txLinClrLst/>
+    <dgm:txFillClrLst/>
+    <dgm:txEffectClrLst/>
+  </dgm:styleLbl>
+  <dgm:styleLbl name="asst4">
+    <dgm:fillClrLst meth="repeat">
+      <a:schemeClr val="accent1"/>
+    </dgm:fillClrLst>
+    <dgm:linClrLst meth="repeat">
+      <a:schemeClr val="lt1"/>
+    </dgm:linClrLst>
+    <dgm:effectClrLst/>
+    <dgm:txLinClrLst/>
+    <dgm:txFillClrLst/>
+    <dgm:txEffectClrLst/>
+  </dgm:styleLbl>
+  <dgm:styleLbl name="parChTrans2D1">
+    <dgm:fillClrLst meth="repeat">
+      <a:schemeClr val="accent1">
+        <a:tint val="60000"/>
+      </a:schemeClr>
+    </dgm:fillClrLst>
+    <dgm:linClrLst meth="repeat">
+      <a:schemeClr val="accent1">
+        <a:tint val="60000"/>
+      </a:schemeClr>
+    </dgm:linClrLst>
+    <dgm:effectClrLst/>
+    <dgm:txLinClrLst/>
+    <dgm:txFillClrLst meth="repeat">
+      <a:schemeClr val="lt1"/>
+    </dgm:txFillClrLst>
+    <dgm:txEffectClrLst/>
+  </dgm:styleLbl>
+  <dgm:styleLbl name="parChTrans2D2">
+    <dgm:fillClrLst meth="repeat">
+      <a:schemeClr val="accent1"/>
+    </dgm:fillClrLst>
+    <dgm:linClrLst meth="repeat">
+      <a:schemeClr val="accent1"/>
+    </dgm:linClrLst>
+    <dgm:effectClrLst/>
+    <dgm:txLinClrLst/>
+    <dgm:txFillClrLst meth="repeat">
+      <a:schemeClr val="lt1"/>
+    </dgm:txFillClrLst>
+    <dgm:txEffectClrLst/>
+  </dgm:styleLbl>
+  <dgm:styleLbl name="parChTrans2D3">
+    <dgm:fillClrLst meth="repeat">
+      <a:schemeClr val="accent1"/>
+    </dgm:fillClrLst>
+    <dgm:linClrLst meth="repeat">
+      <a:schemeClr val="accent1"/>
+    </dgm:linClrLst>
+    <dgm:effectClrLst/>
+    <dgm:txLinClrLst/>
+    <dgm:txFillClrLst meth="repeat">
+      <a:schemeClr val="lt1"/>
+    </dgm:txFillClrLst>
+    <dgm:txEffectClrLst/>
+  </dgm:styleLbl>
+  <dgm:styleLbl name="parChTrans2D4">
+    <dgm:fillClrLst meth="repeat">
+      <a:schemeClr val="accent1"/>
+    </dgm:fillClrLst>
+    <dgm:linClrLst meth="repeat">
+      <a:schemeClr val="accent1"/>
+    </dgm:linClrLst>
+    <dgm:effectClrLst/>
+    <dgm:txLinClrLst/>
+    <dgm:txFillClrLst meth="repeat">
+      <a:schemeClr val="lt1"/>
+    </dgm:txFillClrLst>
+    <dgm:txEffectClrLst/>
+  </dgm:styleLbl>
+  <dgm:styleLbl name="parChTrans1D1">
+    <dgm:fillClrLst meth="repeat">
+      <a:schemeClr val="accent1"/>
+    </dgm:fillClrLst>
+    <dgm:linClrLst meth="repeat">
+      <a:schemeClr val="accent1">
+        <a:shade val="60000"/>
+      </a:schemeClr>
+    </dgm:linClrLst>
+    <dgm:effectClrLst/>
+    <dgm:txLinClrLst/>
+    <dgm:txFillClrLst meth="repeat">
+      <a:schemeClr val="tx1"/>
+    </dgm:txFillClrLst>
+    <dgm:txEffectClrLst/>
+  </dgm:styleLbl>
+  <dgm:styleLbl name="parChTrans1D2">
+    <dgm:fillClrLst meth="repeat">
+      <a:schemeClr val="accent1"/>
+    </dgm:fillClrLst>
+    <dgm:linClrLst meth="repeat">
+      <a:schemeClr val="accent1">
+        <a:shade val="60000"/>
+      </a:schemeClr>
+    </dgm:linClrLst>
+    <dgm:effectClrLst/>
+    <dgm:txLinClrLst/>
+    <dgm:txFillClrLst meth="repeat">
+      <a:schemeClr val="tx1"/>
+    </dgm:txFillClrLst>
+    <dgm:txEffectClrLst/>
+  </dgm:styleLbl>
+  <dgm:styleLbl name="parChTrans1D3">
+    <dgm:fillClrLst meth="repeat">
+      <a:schemeClr val="accent1"/>
+    </dgm:fillClrLst>
+    <dgm:linClrLst meth="repeat">
+      <a:schemeClr val="accent1">
+        <a:shade val="80000"/>
+      </a:schemeClr>
+    </dgm:linClrLst>
+    <dgm:effectClrLst/>
+    <dgm:txLinClrLst/>
+    <dgm:txFillClrLst meth="repeat">
+      <a:schemeClr val="tx1"/>
+    </dgm:txFillClrLst>
+    <dgm:txEffectClrLst/>
+  </dgm:styleLbl>
+  <dgm:styleLbl name="parChTrans1D4">
+    <dgm:fillClrLst meth="repeat">
+      <a:schemeClr val="accent1"/>
+    </dgm:fillClrLst>
+    <dgm:linClrLst meth="repeat">
+      <a:schemeClr val="accent1">
+        <a:shade val="80000"/>
+      </a:schemeClr>
+    </dgm:linClrLst>
+    <dgm:effectClrLst/>
+    <dgm:txLinClrLst/>
+    <dgm:txFillClrLst meth="repeat">
+      <a:schemeClr val="tx1"/>
+    </dgm:txFillClrLst>
+    <dgm:txEffectClrLst/>
+  </dgm:styleLbl>
+  <dgm:styleLbl name="fgAcc1">
+    <dgm:fillClrLst meth="repeat">
+      <a:schemeClr val="lt1">
+        <a:alpha val="90000"/>
+      </a:schemeClr>
+    </dgm:fillClrLst>
+    <dgm:linClrLst meth="repeat">
+      <a:schemeClr val="accent1"/>
+    </dgm:linClrLst>
+    <dgm:effectClrLst/>
+    <dgm:txLinClrLst/>
+    <dgm:txFillClrLst meth="repeat">
+      <a:schemeClr val="dk1"/>
+    </dgm:txFillClrLst>
+    <dgm:txEffectClrLst/>
+  </dgm:styleLbl>
+  <dgm:styleLbl name="conFgAcc1">
+    <dgm:fillClrLst meth="repeat">
+      <a:schemeClr val="lt1">
+        <a:alpha val="90000"/>
+      </a:schemeClr>
+    </dgm:fillClrLst>
+    <dgm:linClrLst meth="repeat">
+      <a:schemeClr val="accent1"/>
+    </dgm:linClrLst>
+    <dgm:effectClrLst/>
+    <dgm:txLinClrLst/>
+    <dgm:txFillClrLst meth="repeat">
+      <a:schemeClr val="dk1"/>
+    </dgm:txFillClrLst>
+    <dgm:txEffectClrLst/>
+  </dgm:styleLbl>
+  <dgm:styleLbl name="alignAcc1">
+    <dgm:fillClrLst meth="repeat">
+      <a:schemeClr val="lt1">
+        <a:alpha val="90000"/>
+      </a:schemeClr>
+    </dgm:fillClrLst>
+    <dgm:linClrLst meth="repeat">
+      <a:schemeClr val="accent1"/>
+    </dgm:linClrLst>
+    <dgm:effectClrLst/>
+    <dgm:txLinClrLst/>
+    <dgm:txFillClrLst meth="repeat">
+      <a:schemeClr val="dk1"/>
+    </dgm:txFillClrLst>
+    <dgm:txEffectClrLst/>
+  </dgm:styleLbl>
+  <dgm:styleLbl name="trAlignAcc1">
+    <dgm:fillClrLst meth="repeat">
+      <a:schemeClr val="lt1">
+        <a:alpha val="40000"/>
+      </a:schemeClr>
+    </dgm:fillClrLst>
+    <dgm:linClrLst meth="repeat">
+      <a:schemeClr val="accent1"/>
+    </dgm:linClrLst>
+    <dgm:effectClrLst/>
+    <dgm:txLinClrLst/>
+    <dgm:txFillClrLst meth="repeat">
+      <a:schemeClr val="dk1"/>
+    </dgm:txFillClrLst>
+    <dgm:txEffectClrLst/>
+  </dgm:styleLbl>
+  <dgm:styleLbl name="bgAcc1">
+    <dgm:fillClrLst meth="repeat">
+      <a:schemeClr val="lt1">
+        <a:alpha val="90000"/>
+      </a:schemeClr>
+    </dgm:fillClrLst>
+    <dgm:linClrLst meth="repeat">
+      <a:schemeClr val="accent1"/>
+    </dgm:linClrLst>
+    <dgm:effectClrLst/>
+    <dgm:txLinClrLst/>
+    <dgm:txFillClrLst meth="repeat">
+      <a:schemeClr val="dk1"/>
+    </dgm:txFillClrLst>
+    <dgm:txEffectClrLst/>
+  </dgm:styleLbl>
+  <dgm:styleLbl name="solidFgAcc1">
+    <dgm:fillClrLst meth="repeat">
+      <a:schemeClr val="lt1"/>
+    </dgm:fillClrLst>
+    <dgm:linClrLst meth="repeat">
+      <a:schemeClr val="accent1"/>
+    </dgm:linClrLst>
+    <dgm:effectClrLst/>
+    <dgm:txLinClrLst/>
+    <dgm:txFillClrLst meth="repeat">
+      <a:schemeClr val="dk1"/>
+    </dgm:txFillClrLst>
+    <dgm:txEffectClrLst/>
+  </dgm:styleLbl>
+  <dgm:styleLbl name="solidAlignAcc1">
+    <dgm:fillClrLst meth="repeat">
+      <a:schemeClr val="lt1"/>
+    </dgm:fillClrLst>
+    <dgm:linClrLst meth="repeat">
+      <a:schemeClr val="accent1"/>
+    </dgm:linClrLst>
+    <dgm:effectClrLst/>
+    <dgm:txLinClrLst/>
+    <dgm:txFillClrLst meth="repeat">
+      <a:schemeClr val="dk1"/>
+    </dgm:txFillClrLst>
+    <dgm:txEffectClrLst/>
+  </dgm:styleLbl>
+  <dgm:styleLbl name="solidBgAcc1">
+    <dgm:fillClrLst meth="repeat">
+      <a:schemeClr val="lt1"/>
+    </dgm:fillClrLst>
+    <dgm:linClrLst meth="repeat">
+      <a:schemeClr val="accent1"/>
+    </dgm:linClrLst>
+    <dgm:effectClrLst/>
+    <dgm:txLinClrLst/>
+    <dgm:txFillClrLst meth="repeat">
+      <a:schemeClr val="dk1"/>
+    </dgm:txFillClrLst>
+    <dgm:txEffectClrLst/>
+  </dgm:styleLbl>
+  <dgm:styleLbl name="fgAccFollowNode1">
+    <dgm:fillClrLst meth="repeat">
+      <a:schemeClr val="accent1">
+        <a:alpha val="90000"/>
+        <a:tint val="40000"/>
+      </a:schemeClr>
+    </dgm:fillClrLst>
+    <dgm:linClrLst meth="repeat">
+      <a:schemeClr val="accent1">
+        <a:alpha val="90000"/>
+        <a:tint val="40000"/>
+      </a:schemeClr>
+    </dgm:linClrLst>
+    <dgm:effectClrLst/>
+    <dgm:txLinClrLst/>
+    <dgm:txFillClrLst meth="repeat">
+      <a:schemeClr val="dk1"/>
+    </dgm:txFillClrLst>
+    <dgm:txEffectClrLst/>
+  </dgm:styleLbl>
+  <dgm:styleLbl name="alignAccFollowNode1">
+    <dgm:fillClrLst meth="repeat">
+      <a:schemeClr val="accent1">
+        <a:alpha val="90000"/>
+        <a:tint val="40000"/>
+      </a:schemeClr>
+    </dgm:fillClrLst>
+    <dgm:linClrLst meth="repeat">
+      <a:schemeClr val="accent1">
+        <a:alpha val="90000"/>
+        <a:tint val="40000"/>
+      </a:schemeClr>
+    </dgm:linClrLst>
+    <dgm:effectClrLst/>
+    <dgm:txLinClrLst/>
+    <dgm:txFillClrLst meth="repeat">
+      <a:schemeClr val="dk1"/>
+    </dgm:txFillClrLst>
+    <dgm:txEffectClrLst/>
+  </dgm:styleLbl>
+  <dgm:styleLbl name="bgAccFollowNode1">
+    <dgm:fillClrLst meth="repeat">
+      <a:schemeClr val="accent1">
+        <a:alpha val="90000"/>
+        <a:tint val="40000"/>
+      </a:schemeClr>
+    </dgm:fillClrLst>
+    <dgm:linClrLst meth="repeat">
+      <a:schemeClr val="accent1">
+        <a:alpha val="90000"/>
+        <a:tint val="40000"/>
+      </a:schemeClr>
+    </dgm:linClrLst>
+    <dgm:effectClrLst/>
+    <dgm:txLinClrLst/>
+    <dgm:txFillClrLst meth="repeat">
+      <a:schemeClr val="dk1"/>
+    </dgm:txFillClrLst>
+    <dgm:txEffectClrLst/>
+  </dgm:styleLbl>
+  <dgm:styleLbl name="fgAcc0">
+    <dgm:fillClrLst meth="repeat">
+      <a:schemeClr val="lt1">
+        <a:alpha val="90000"/>
+      </a:schemeClr>
+    </dgm:fillClrLst>
+    <dgm:linClrLst meth="repeat">
+      <a:schemeClr val="accent1"/>
+    </dgm:linClrLst>
+    <dgm:effectClrLst/>
+    <dgm:txLinClrLst/>
+    <dgm:txFillClrLst meth="repeat">
+      <a:schemeClr val="dk1"/>
+    </dgm:txFillClrLst>
+    <dgm:txEffectClrLst/>
+  </dgm:styleLbl>
+  <dgm:styleLbl name="fgAcc2">
+    <dgm:fillClrLst meth="repeat">
+      <a:schemeClr val="lt1">
+        <a:alpha val="90000"/>
+      </a:schemeClr>
+    </dgm:fillClrLst>
+    <dgm:linClrLst meth="repeat">
+      <a:schemeClr val="accent1"/>
+    </dgm:linClrLst>
+    <dgm:effectClrLst/>
+    <dgm:txLinClrLst/>
+    <dgm:txFillClrLst meth="repeat">
+      <a:schemeClr val="dk1"/>
+    </dgm:txFillClrLst>
+    <dgm:txEffectClrLst/>
+  </dgm:styleLbl>
+  <dgm:styleLbl name="fgAcc3">
+    <dgm:fillClrLst meth="repeat">
+      <a:schemeClr val="lt1">
+        <a:alpha val="90000"/>
+      </a:schemeClr>
+    </dgm:fillClrLst>
+    <dgm:linClrLst meth="repeat">
+      <a:schemeClr val="accent1"/>
+    </dgm:linClrLst>
+    <dgm:effectClrLst/>
+    <dgm:txLinClrLst/>
+    <dgm:txFillClrLst meth="repeat">
+      <a:schemeClr val="dk1"/>
+    </dgm:txFillClrLst>
+    <dgm:txEffectClrLst/>
+  </dgm:styleLbl>
+  <dgm:styleLbl name="fgAcc4">
+    <dgm:fillClrLst meth="repeat">
+      <a:schemeClr val="lt1">
+        <a:alpha val="90000"/>
+      </a:schemeClr>
+    </dgm:fillClrLst>
+    <dgm:linClrLst meth="repeat">
+      <a:schemeClr val="accent1"/>
+    </dgm:linClrLst>
+    <dgm:effectClrLst/>
+    <dgm:txLinClrLst/>
+    <dgm:txFillClrLst meth="repeat">
+      <a:schemeClr val="dk1"/>
+    </dgm:txFillClrLst>
+    <dgm:txEffectClrLst/>
+  </dgm:styleLbl>
+  <dgm:styleLbl name="bgShp">
+    <dgm:fillClrLst meth="repeat">
+      <a:schemeClr val="accent1">
+        <a:tint val="40000"/>
+      </a:schemeClr>
+    </dgm:fillClrLst>
+    <dgm:linClrLst meth="repeat">
+      <a:schemeClr val="accent1"/>
+    </dgm:linClrLst>
+    <dgm:effectClrLst/>
+    <dgm:txLinClrLst/>
+    <dgm:txFillClrLst meth="repeat">
+      <a:schemeClr val="dk1"/>
+    </dgm:txFillClrLst>
+    <dgm:txEffectClrLst/>
+  </dgm:styleLbl>
+  <dgm:styleLbl name="dkBgShp">
+    <dgm:fillClrLst meth="repeat">
+      <a:schemeClr val="accent1">
+        <a:shade val="80000"/>
+      </a:schemeClr>
+    </dgm:fillClrLst>
+    <dgm:linClrLst meth="repeat">
+      <a:schemeClr val="accent1"/>
+    </dgm:linClrLst>
+    <dgm:effectClrLst/>
+    <dgm:txLinClrLst/>
+    <dgm:txFillClrLst meth="repeat">
+      <a:schemeClr val="lt1"/>
+    </dgm:txFillClrLst>
+    <dgm:txEffectClrLst/>
+  </dgm:styleLbl>
+  <dgm:styleLbl name="trBgShp">
+    <dgm:fillClrLst meth="repeat">
+      <a:schemeClr val="accent1">
+        <a:tint val="50000"/>
+        <a:alpha val="40000"/>
+      </a:schemeClr>
+    </dgm:fillClrLst>
+    <dgm:linClrLst meth="repeat">
+      <a:schemeClr val="accent1"/>
+    </dgm:linClrLst>
+    <dgm:effectClrLst/>
+    <dgm:txLinClrLst/>
+    <dgm:txFillClrLst meth="repeat">
+      <a:schemeClr val="lt1"/>
+    </dgm:txFillClrLst>
+    <dgm:txEffectClrLst/>
+  </dgm:styleLbl>
+  <dgm:styleLbl name="fgShp">
+    <dgm:fillClrLst meth="repeat">
+      <a:schemeClr val="accent1">
+        <a:tint val="60000"/>
+      </a:schemeClr>
+    </dgm:fillClrLst>
+    <dgm:linClrLst meth="repeat">
+      <a:schemeClr val="lt1"/>
+    </dgm:linClrLst>
+    <dgm:effectClrLst/>
+    <dgm:txLinClrLst/>
+    <dgm:txFillClrLst meth="repeat">
+      <a:schemeClr val="dk1"/>
+    </dgm:txFillClrLst>
+    <dgm:txEffectClrLst/>
+  </dgm:styleLbl>
+  <dgm:styleLbl name="revTx">
+    <dgm:fillClrLst meth="repeat">
+      <a:schemeClr val="lt1">
+        <a:alpha val="0"/>
+      </a:schemeClr>
+    </dgm:fillClrLst>
+    <dgm:linClrLst meth="repeat">
+      <a:schemeClr val="dk1">
+        <a:alpha val="0"/>
+      </a:schemeClr>
+    </dgm:linClrLst>
+    <dgm:effectClrLst/>
+    <dgm:txLinClrLst/>
+    <dgm:txFillClrLst meth="repeat">
+      <a:schemeClr val="tx1"/>
+    </dgm:txFillClrLst>
+    <dgm:txEffectClrLst/>
+  </dgm:styleLbl>
+</dgm:colorsDef>
+</file>
+
+<file path=ppt/diagrams/colors2.xml><?xml version="1.0" encoding="utf-8"?>
 <dgm:colorsDef xmlns:dgm="http://schemas.openxmlformats.org/drawingml/2006/diagram" xmlns:a="http://schemas.openxmlformats.org/drawingml/2006/main" uniqueId="urn:microsoft.com/office/officeart/2005/8/colors/colorful2">
   <dgm:title val=""/>
   <dgm:desc val=""/>
@@ -919,6 +1667,515 @@
 <file path=ppt/diagrams/data1.xml><?xml version="1.0" encoding="utf-8"?>
 <dgm:dataModel xmlns:dgm="http://schemas.openxmlformats.org/drawingml/2006/diagram" xmlns:a="http://schemas.openxmlformats.org/drawingml/2006/main">
   <dgm:ptLst>
+    <dgm:pt modelId="{3F916644-2E8A-4B6F-B43F-2D0046B6A616}" type="doc">
+      <dgm:prSet loTypeId="urn:microsoft.com/office/officeart/2005/8/layout/cycle5" loCatId="cycle" qsTypeId="urn:microsoft.com/office/officeart/2005/8/quickstyle/simple1" qsCatId="simple" csTypeId="urn:microsoft.com/office/officeart/2005/8/colors/accent1_2" csCatId="accent1" phldr="1"/>
+      <dgm:spPr/>
+      <dgm:t>
+        <a:bodyPr/>
+        <a:lstStyle/>
+        <a:p>
+          <a:endParaRPr lang="fr-FR"/>
+        </a:p>
+      </dgm:t>
+    </dgm:pt>
+    <dgm:pt modelId="{F9157FC7-84AD-4A5A-89B0-B470B45FE340}">
+      <dgm:prSet phldrT="[Texte]">
+        <dgm:style>
+          <a:lnRef idx="1">
+            <a:schemeClr val="accent6"/>
+          </a:lnRef>
+          <a:fillRef idx="3">
+            <a:schemeClr val="accent6"/>
+          </a:fillRef>
+          <a:effectRef idx="2">
+            <a:schemeClr val="accent6"/>
+          </a:effectRef>
+          <a:fontRef idx="minor">
+            <a:schemeClr val="lt1"/>
+          </a:fontRef>
+        </dgm:style>
+      </dgm:prSet>
+      <dgm:spPr/>
+      <dgm:t>
+        <a:bodyPr/>
+        <a:lstStyle/>
+        <a:p>
+          <a:r>
+            <a:rPr lang="fr-FR" dirty="0" smtClean="0"/>
+            <a:t>Tableau de 52 cartes dans l’ordre</a:t>
+          </a:r>
+          <a:endParaRPr lang="fr-FR" dirty="0"/>
+        </a:p>
+      </dgm:t>
+    </dgm:pt>
+    <dgm:pt modelId="{C4B0C759-895F-452F-8A61-AD2A745AC964}" type="parTrans" cxnId="{EEB427CF-17CD-4180-8A71-15A697526EAF}">
+      <dgm:prSet/>
+      <dgm:spPr/>
+      <dgm:t>
+        <a:bodyPr/>
+        <a:lstStyle/>
+        <a:p>
+          <a:endParaRPr lang="fr-FR"/>
+        </a:p>
+      </dgm:t>
+    </dgm:pt>
+    <dgm:pt modelId="{28B3AD9D-1F61-403D-A9A4-E2EBE7C7A1E5}" type="sibTrans" cxnId="{EEB427CF-17CD-4180-8A71-15A697526EAF}">
+      <dgm:prSet>
+        <dgm:style>
+          <a:lnRef idx="1">
+            <a:schemeClr val="accent6"/>
+          </a:lnRef>
+          <a:fillRef idx="3">
+            <a:schemeClr val="accent6"/>
+          </a:fillRef>
+          <a:effectRef idx="2">
+            <a:schemeClr val="accent6"/>
+          </a:effectRef>
+          <a:fontRef idx="minor">
+            <a:schemeClr val="lt1"/>
+          </a:fontRef>
+        </dgm:style>
+      </dgm:prSet>
+      <dgm:spPr/>
+      <dgm:t>
+        <a:bodyPr/>
+        <a:lstStyle/>
+        <a:p>
+          <a:endParaRPr lang="fr-FR"/>
+        </a:p>
+      </dgm:t>
+    </dgm:pt>
+    <dgm:pt modelId="{62041C44-F7ED-4163-B711-9ACF87A53496}">
+      <dgm:prSet phldrT="[Texte]">
+        <dgm:style>
+          <a:lnRef idx="1">
+            <a:schemeClr val="accent6"/>
+          </a:lnRef>
+          <a:fillRef idx="3">
+            <a:schemeClr val="accent6"/>
+          </a:fillRef>
+          <a:effectRef idx="2">
+            <a:schemeClr val="accent6"/>
+          </a:effectRef>
+          <a:fontRef idx="minor">
+            <a:schemeClr val="lt1"/>
+          </a:fontRef>
+        </dgm:style>
+      </dgm:prSet>
+      <dgm:spPr/>
+      <dgm:t>
+        <a:bodyPr/>
+        <a:lstStyle/>
+        <a:p>
+          <a:r>
+            <a:rPr lang="fr-FR" dirty="0" smtClean="0"/>
+            <a:t>Piochage d’une carte au hasard</a:t>
+          </a:r>
+          <a:endParaRPr lang="fr-FR" dirty="0"/>
+        </a:p>
+      </dgm:t>
+    </dgm:pt>
+    <dgm:pt modelId="{2547519F-7BAF-4399-AD74-545DF3CEF68A}" type="parTrans" cxnId="{16AF2F47-FCCC-4654-B9CA-4B0F96FBC8E1}">
+      <dgm:prSet/>
+      <dgm:spPr/>
+      <dgm:t>
+        <a:bodyPr/>
+        <a:lstStyle/>
+        <a:p>
+          <a:endParaRPr lang="fr-FR"/>
+        </a:p>
+      </dgm:t>
+    </dgm:pt>
+    <dgm:pt modelId="{F7DCD137-ACA9-4AE4-87CB-2EA1504660D9}" type="sibTrans" cxnId="{16AF2F47-FCCC-4654-B9CA-4B0F96FBC8E1}">
+      <dgm:prSet>
+        <dgm:style>
+          <a:lnRef idx="1">
+            <a:schemeClr val="accent6"/>
+          </a:lnRef>
+          <a:fillRef idx="3">
+            <a:schemeClr val="accent6"/>
+          </a:fillRef>
+          <a:effectRef idx="2">
+            <a:schemeClr val="accent6"/>
+          </a:effectRef>
+          <a:fontRef idx="minor">
+            <a:schemeClr val="lt1"/>
+          </a:fontRef>
+        </dgm:style>
+      </dgm:prSet>
+      <dgm:spPr/>
+      <dgm:t>
+        <a:bodyPr/>
+        <a:lstStyle/>
+        <a:p>
+          <a:endParaRPr lang="fr-FR"/>
+        </a:p>
+      </dgm:t>
+    </dgm:pt>
+    <dgm:pt modelId="{77CEC789-368A-4D46-AB7C-1677E57DB778}">
+      <dgm:prSet phldrT="[Texte]">
+        <dgm:style>
+          <a:lnRef idx="1">
+            <a:schemeClr val="accent6"/>
+          </a:lnRef>
+          <a:fillRef idx="3">
+            <a:schemeClr val="accent6"/>
+          </a:fillRef>
+          <a:effectRef idx="2">
+            <a:schemeClr val="accent6"/>
+          </a:effectRef>
+          <a:fontRef idx="minor">
+            <a:schemeClr val="lt1"/>
+          </a:fontRef>
+        </dgm:style>
+      </dgm:prSet>
+      <dgm:spPr/>
+      <dgm:t>
+        <a:bodyPr/>
+        <a:lstStyle/>
+        <a:p>
+          <a:r>
+            <a:rPr lang="fr-FR" dirty="0" smtClean="0"/>
+            <a:t>Distribution puis déplacement à la fin du tableau </a:t>
+          </a:r>
+          <a:endParaRPr lang="fr-FR" dirty="0"/>
+        </a:p>
+      </dgm:t>
+    </dgm:pt>
+    <dgm:pt modelId="{3D264AD8-531C-4F6D-839A-FF11493F6666}" type="parTrans" cxnId="{22079A04-213A-4BF5-A000-29C28BE36417}">
+      <dgm:prSet/>
+      <dgm:spPr/>
+      <dgm:t>
+        <a:bodyPr/>
+        <a:lstStyle/>
+        <a:p>
+          <a:endParaRPr lang="fr-FR"/>
+        </a:p>
+      </dgm:t>
+    </dgm:pt>
+    <dgm:pt modelId="{A2867DC0-2D3B-408F-82C0-C5AC9AC675CE}" type="sibTrans" cxnId="{22079A04-213A-4BF5-A000-29C28BE36417}">
+      <dgm:prSet>
+        <dgm:style>
+          <a:lnRef idx="1">
+            <a:schemeClr val="accent6"/>
+          </a:lnRef>
+          <a:fillRef idx="3">
+            <a:schemeClr val="accent6"/>
+          </a:fillRef>
+          <a:effectRef idx="2">
+            <a:schemeClr val="accent6"/>
+          </a:effectRef>
+          <a:fontRef idx="minor">
+            <a:schemeClr val="lt1"/>
+          </a:fontRef>
+        </dgm:style>
+      </dgm:prSet>
+      <dgm:spPr/>
+      <dgm:t>
+        <a:bodyPr/>
+        <a:lstStyle/>
+        <a:p>
+          <a:endParaRPr lang="fr-FR"/>
+        </a:p>
+      </dgm:t>
+    </dgm:pt>
+    <dgm:pt modelId="{6CB93919-E534-4C63-916A-2E41E9893E4A}">
+      <dgm:prSet phldrT="[Texte]">
+        <dgm:style>
+          <a:lnRef idx="1">
+            <a:schemeClr val="accent6"/>
+          </a:lnRef>
+          <a:fillRef idx="3">
+            <a:schemeClr val="accent6"/>
+          </a:fillRef>
+          <a:effectRef idx="2">
+            <a:schemeClr val="accent6"/>
+          </a:effectRef>
+          <a:fontRef idx="minor">
+            <a:schemeClr val="lt1"/>
+          </a:fontRef>
+        </dgm:style>
+      </dgm:prSet>
+      <dgm:spPr/>
+      <dgm:t>
+        <a:bodyPr/>
+        <a:lstStyle/>
+        <a:p>
+          <a:r>
+            <a:rPr lang="fr-FR" dirty="0" smtClean="0"/>
+            <a:t>Décrémentation  d’une variable </a:t>
+          </a:r>
+          <a:r>
+            <a:rPr lang="fr-FR" dirty="0" err="1" smtClean="0"/>
+            <a:t>TailleTableau</a:t>
+          </a:r>
+          <a:endParaRPr lang="fr-FR" dirty="0"/>
+        </a:p>
+      </dgm:t>
+    </dgm:pt>
+    <dgm:pt modelId="{1437AF69-A9FE-4E96-BC87-9AA71098B8AE}" type="parTrans" cxnId="{D7591916-97BE-4E33-AABD-316C321F8C84}">
+      <dgm:prSet/>
+      <dgm:spPr/>
+      <dgm:t>
+        <a:bodyPr/>
+        <a:lstStyle/>
+        <a:p>
+          <a:endParaRPr lang="fr-FR"/>
+        </a:p>
+      </dgm:t>
+    </dgm:pt>
+    <dgm:pt modelId="{C8D8DC83-6244-4770-A039-3062F81C1A32}" type="sibTrans" cxnId="{D7591916-97BE-4E33-AABD-316C321F8C84}">
+      <dgm:prSet>
+        <dgm:style>
+          <a:lnRef idx="1">
+            <a:schemeClr val="accent6"/>
+          </a:lnRef>
+          <a:fillRef idx="3">
+            <a:schemeClr val="accent6"/>
+          </a:fillRef>
+          <a:effectRef idx="2">
+            <a:schemeClr val="accent6"/>
+          </a:effectRef>
+          <a:fontRef idx="minor">
+            <a:schemeClr val="lt1"/>
+          </a:fontRef>
+        </dgm:style>
+      </dgm:prSet>
+      <dgm:spPr/>
+      <dgm:t>
+        <a:bodyPr/>
+        <a:lstStyle/>
+        <a:p>
+          <a:endParaRPr lang="fr-FR"/>
+        </a:p>
+      </dgm:t>
+    </dgm:pt>
+    <dgm:pt modelId="{C931E3FF-FE6C-40FB-9ADB-17CCC7BB756E}">
+      <dgm:prSet phldrT="[Texte]">
+        <dgm:style>
+          <a:lnRef idx="1">
+            <a:schemeClr val="accent6"/>
+          </a:lnRef>
+          <a:fillRef idx="3">
+            <a:schemeClr val="accent6"/>
+          </a:fillRef>
+          <a:effectRef idx="2">
+            <a:schemeClr val="accent6"/>
+          </a:effectRef>
+          <a:fontRef idx="minor">
+            <a:schemeClr val="lt1"/>
+          </a:fontRef>
+        </dgm:style>
+      </dgm:prSet>
+      <dgm:spPr/>
+      <dgm:t>
+        <a:bodyPr/>
+        <a:lstStyle/>
+        <a:p>
+          <a:r>
+            <a:rPr lang="fr-FR" dirty="0" smtClean="0"/>
+            <a:t>Et ainsi de suite…</a:t>
+          </a:r>
+          <a:endParaRPr lang="fr-FR" dirty="0"/>
+        </a:p>
+      </dgm:t>
+    </dgm:pt>
+    <dgm:pt modelId="{4D8654DD-BBFB-4152-B782-ED7019F69016}" type="parTrans" cxnId="{4914B1D9-50CE-4DE5-9FA7-E56A43DAA51C}">
+      <dgm:prSet/>
+      <dgm:spPr/>
+      <dgm:t>
+        <a:bodyPr/>
+        <a:lstStyle/>
+        <a:p>
+          <a:endParaRPr lang="fr-FR"/>
+        </a:p>
+      </dgm:t>
+    </dgm:pt>
+    <dgm:pt modelId="{DF5F10F2-37F6-4150-B7B4-669743D6E2CB}" type="sibTrans" cxnId="{4914B1D9-50CE-4DE5-9FA7-E56A43DAA51C}">
+      <dgm:prSet>
+        <dgm:style>
+          <a:lnRef idx="1">
+            <a:schemeClr val="accent6"/>
+          </a:lnRef>
+          <a:fillRef idx="3">
+            <a:schemeClr val="accent6"/>
+          </a:fillRef>
+          <a:effectRef idx="2">
+            <a:schemeClr val="accent6"/>
+          </a:effectRef>
+          <a:fontRef idx="minor">
+            <a:schemeClr val="lt1"/>
+          </a:fontRef>
+        </dgm:style>
+      </dgm:prSet>
+      <dgm:spPr/>
+      <dgm:t>
+        <a:bodyPr/>
+        <a:lstStyle/>
+        <a:p>
+          <a:endParaRPr lang="fr-FR"/>
+        </a:p>
+      </dgm:t>
+    </dgm:pt>
+    <dgm:pt modelId="{87DE19E5-C82B-43F4-A15B-CB71BA55E53A}" type="pres">
+      <dgm:prSet presAssocID="{3F916644-2E8A-4B6F-B43F-2D0046B6A616}" presName="cycle" presStyleCnt="0">
+        <dgm:presLayoutVars>
+          <dgm:dir/>
+          <dgm:resizeHandles val="exact"/>
+        </dgm:presLayoutVars>
+      </dgm:prSet>
+      <dgm:spPr/>
+    </dgm:pt>
+    <dgm:pt modelId="{DD88AB64-0DBB-4E44-B6BD-33E9D9A59330}" type="pres">
+      <dgm:prSet presAssocID="{F9157FC7-84AD-4A5A-89B0-B470B45FE340}" presName="node" presStyleLbl="node1" presStyleIdx="0" presStyleCnt="5">
+        <dgm:presLayoutVars>
+          <dgm:bulletEnabled val="1"/>
+        </dgm:presLayoutVars>
+      </dgm:prSet>
+      <dgm:spPr/>
+      <dgm:t>
+        <a:bodyPr/>
+        <a:lstStyle/>
+        <a:p>
+          <a:endParaRPr lang="fr-FR"/>
+        </a:p>
+      </dgm:t>
+    </dgm:pt>
+    <dgm:pt modelId="{C6AEA586-6263-4A83-999C-98C91F3A3E28}" type="pres">
+      <dgm:prSet presAssocID="{F9157FC7-84AD-4A5A-89B0-B470B45FE340}" presName="spNode" presStyleCnt="0"/>
+      <dgm:spPr/>
+    </dgm:pt>
+    <dgm:pt modelId="{A656F961-90F8-4D1C-ACF3-C7AA4E2A906F}" type="pres">
+      <dgm:prSet presAssocID="{28B3AD9D-1F61-403D-A9A4-E2EBE7C7A1E5}" presName="sibTrans" presStyleLbl="sibTrans1D1" presStyleIdx="0" presStyleCnt="5"/>
+      <dgm:spPr/>
+    </dgm:pt>
+    <dgm:pt modelId="{33F7A666-D047-42A1-B42B-0BE6F20751F6}" type="pres">
+      <dgm:prSet presAssocID="{62041C44-F7ED-4163-B711-9ACF87A53496}" presName="node" presStyleLbl="node1" presStyleIdx="1" presStyleCnt="5">
+        <dgm:presLayoutVars>
+          <dgm:bulletEnabled val="1"/>
+        </dgm:presLayoutVars>
+      </dgm:prSet>
+      <dgm:spPr/>
+      <dgm:t>
+        <a:bodyPr/>
+        <a:lstStyle/>
+        <a:p>
+          <a:endParaRPr lang="fr-FR"/>
+        </a:p>
+      </dgm:t>
+    </dgm:pt>
+    <dgm:pt modelId="{2C26C018-00B4-4842-863D-5348ABEC5DAD}" type="pres">
+      <dgm:prSet presAssocID="{62041C44-F7ED-4163-B711-9ACF87A53496}" presName="spNode" presStyleCnt="0"/>
+      <dgm:spPr/>
+    </dgm:pt>
+    <dgm:pt modelId="{F56EE369-719E-45A8-A097-B270961B21A0}" type="pres">
+      <dgm:prSet presAssocID="{F7DCD137-ACA9-4AE4-87CB-2EA1504660D9}" presName="sibTrans" presStyleLbl="sibTrans1D1" presStyleIdx="1" presStyleCnt="5"/>
+      <dgm:spPr/>
+    </dgm:pt>
+    <dgm:pt modelId="{DB401924-68DF-41B9-8F4C-A9BCAD74108A}" type="pres">
+      <dgm:prSet presAssocID="{77CEC789-368A-4D46-AB7C-1677E57DB778}" presName="node" presStyleLbl="node1" presStyleIdx="2" presStyleCnt="5">
+        <dgm:presLayoutVars>
+          <dgm:bulletEnabled val="1"/>
+        </dgm:presLayoutVars>
+      </dgm:prSet>
+      <dgm:spPr/>
+      <dgm:t>
+        <a:bodyPr/>
+        <a:lstStyle/>
+        <a:p>
+          <a:endParaRPr lang="fr-FR"/>
+        </a:p>
+      </dgm:t>
+    </dgm:pt>
+    <dgm:pt modelId="{731BD4A0-1F85-441D-AD24-DF0EC97047DF}" type="pres">
+      <dgm:prSet presAssocID="{77CEC789-368A-4D46-AB7C-1677E57DB778}" presName="spNode" presStyleCnt="0"/>
+      <dgm:spPr/>
+    </dgm:pt>
+    <dgm:pt modelId="{C8A54F2D-48C1-4CF4-942A-773E8EE11BB2}" type="pres">
+      <dgm:prSet presAssocID="{A2867DC0-2D3B-408F-82C0-C5AC9AC675CE}" presName="sibTrans" presStyleLbl="sibTrans1D1" presStyleIdx="2" presStyleCnt="5"/>
+      <dgm:spPr/>
+    </dgm:pt>
+    <dgm:pt modelId="{D5BEFD69-E139-4D86-96AF-8995FC63B8ED}" type="pres">
+      <dgm:prSet presAssocID="{6CB93919-E534-4C63-916A-2E41E9893E4A}" presName="node" presStyleLbl="node1" presStyleIdx="3" presStyleCnt="5">
+        <dgm:presLayoutVars>
+          <dgm:bulletEnabled val="1"/>
+        </dgm:presLayoutVars>
+      </dgm:prSet>
+      <dgm:spPr/>
+      <dgm:t>
+        <a:bodyPr/>
+        <a:lstStyle/>
+        <a:p>
+          <a:endParaRPr lang="fr-FR"/>
+        </a:p>
+      </dgm:t>
+    </dgm:pt>
+    <dgm:pt modelId="{5C69B94A-7DD7-4978-A888-23B5F3CBD3F7}" type="pres">
+      <dgm:prSet presAssocID="{6CB93919-E534-4C63-916A-2E41E9893E4A}" presName="spNode" presStyleCnt="0"/>
+      <dgm:spPr/>
+    </dgm:pt>
+    <dgm:pt modelId="{5F61474C-8E73-46EE-AA24-6F557D36EAB3}" type="pres">
+      <dgm:prSet presAssocID="{C8D8DC83-6244-4770-A039-3062F81C1A32}" presName="sibTrans" presStyleLbl="sibTrans1D1" presStyleIdx="3" presStyleCnt="5"/>
+      <dgm:spPr/>
+    </dgm:pt>
+    <dgm:pt modelId="{0469E915-6954-449E-B902-025699F471A4}" type="pres">
+      <dgm:prSet presAssocID="{C931E3FF-FE6C-40FB-9ADB-17CCC7BB756E}" presName="node" presStyleLbl="node1" presStyleIdx="4" presStyleCnt="5">
+        <dgm:presLayoutVars>
+          <dgm:bulletEnabled val="1"/>
+        </dgm:presLayoutVars>
+      </dgm:prSet>
+      <dgm:spPr/>
+    </dgm:pt>
+    <dgm:pt modelId="{F11DEAF9-E987-4B6A-966B-0AA6F5A63DE8}" type="pres">
+      <dgm:prSet presAssocID="{C931E3FF-FE6C-40FB-9ADB-17CCC7BB756E}" presName="spNode" presStyleCnt="0"/>
+      <dgm:spPr/>
+    </dgm:pt>
+    <dgm:pt modelId="{7EF6D4C4-1AB7-47F5-A6BF-59A11497289A}" type="pres">
+      <dgm:prSet presAssocID="{DF5F10F2-37F6-4150-B7B4-669743D6E2CB}" presName="sibTrans" presStyleLbl="sibTrans1D1" presStyleIdx="4" presStyleCnt="5"/>
+      <dgm:spPr/>
+    </dgm:pt>
+  </dgm:ptLst>
+  <dgm:cxnLst>
+    <dgm:cxn modelId="{22079A04-213A-4BF5-A000-29C28BE36417}" srcId="{3F916644-2E8A-4B6F-B43F-2D0046B6A616}" destId="{77CEC789-368A-4D46-AB7C-1677E57DB778}" srcOrd="2" destOrd="0" parTransId="{3D264AD8-531C-4F6D-839A-FF11493F6666}" sibTransId="{A2867DC0-2D3B-408F-82C0-C5AC9AC675CE}"/>
+    <dgm:cxn modelId="{1CAE3C04-2D9E-440B-A9A1-FEFA96952151}" type="presOf" srcId="{28B3AD9D-1F61-403D-A9A4-E2EBE7C7A1E5}" destId="{A656F961-90F8-4D1C-ACF3-C7AA4E2A906F}" srcOrd="0" destOrd="0" presId="urn:microsoft.com/office/officeart/2005/8/layout/cycle5"/>
+    <dgm:cxn modelId="{E3CA786E-EFDA-425C-B770-C82B1219985E}" type="presOf" srcId="{DF5F10F2-37F6-4150-B7B4-669743D6E2CB}" destId="{7EF6D4C4-1AB7-47F5-A6BF-59A11497289A}" srcOrd="0" destOrd="0" presId="urn:microsoft.com/office/officeart/2005/8/layout/cycle5"/>
+    <dgm:cxn modelId="{EF0E6E7B-69AD-41CD-B7A2-75A4749998CA}" type="presOf" srcId="{62041C44-F7ED-4163-B711-9ACF87A53496}" destId="{33F7A666-D047-42A1-B42B-0BE6F20751F6}" srcOrd="0" destOrd="0" presId="urn:microsoft.com/office/officeart/2005/8/layout/cycle5"/>
+    <dgm:cxn modelId="{E3C8A356-DBF7-47AC-B8A2-7A20594538D4}" type="presOf" srcId="{C8D8DC83-6244-4770-A039-3062F81C1A32}" destId="{5F61474C-8E73-46EE-AA24-6F557D36EAB3}" srcOrd="0" destOrd="0" presId="urn:microsoft.com/office/officeart/2005/8/layout/cycle5"/>
+    <dgm:cxn modelId="{AC17F962-FED8-4E0F-ADB7-F2F21B0DD40F}" type="presOf" srcId="{6CB93919-E534-4C63-916A-2E41E9893E4A}" destId="{D5BEFD69-E139-4D86-96AF-8995FC63B8ED}" srcOrd="0" destOrd="0" presId="urn:microsoft.com/office/officeart/2005/8/layout/cycle5"/>
+    <dgm:cxn modelId="{1C0955C2-BDF8-4617-88E8-46862598863E}" type="presOf" srcId="{A2867DC0-2D3B-408F-82C0-C5AC9AC675CE}" destId="{C8A54F2D-48C1-4CF4-942A-773E8EE11BB2}" srcOrd="0" destOrd="0" presId="urn:microsoft.com/office/officeart/2005/8/layout/cycle5"/>
+    <dgm:cxn modelId="{EEB427CF-17CD-4180-8A71-15A697526EAF}" srcId="{3F916644-2E8A-4B6F-B43F-2D0046B6A616}" destId="{F9157FC7-84AD-4A5A-89B0-B470B45FE340}" srcOrd="0" destOrd="0" parTransId="{C4B0C759-895F-452F-8A61-AD2A745AC964}" sibTransId="{28B3AD9D-1F61-403D-A9A4-E2EBE7C7A1E5}"/>
+    <dgm:cxn modelId="{36C6DF58-5391-41E2-ADF6-3E84B0182830}" type="presOf" srcId="{C931E3FF-FE6C-40FB-9ADB-17CCC7BB756E}" destId="{0469E915-6954-449E-B902-025699F471A4}" srcOrd="0" destOrd="0" presId="urn:microsoft.com/office/officeart/2005/8/layout/cycle5"/>
+    <dgm:cxn modelId="{8CB48232-564B-4594-AE6C-098E9C159B2E}" type="presOf" srcId="{77CEC789-368A-4D46-AB7C-1677E57DB778}" destId="{DB401924-68DF-41B9-8F4C-A9BCAD74108A}" srcOrd="0" destOrd="0" presId="urn:microsoft.com/office/officeart/2005/8/layout/cycle5"/>
+    <dgm:cxn modelId="{D7591916-97BE-4E33-AABD-316C321F8C84}" srcId="{3F916644-2E8A-4B6F-B43F-2D0046B6A616}" destId="{6CB93919-E534-4C63-916A-2E41E9893E4A}" srcOrd="3" destOrd="0" parTransId="{1437AF69-A9FE-4E96-BC87-9AA71098B8AE}" sibTransId="{C8D8DC83-6244-4770-A039-3062F81C1A32}"/>
+    <dgm:cxn modelId="{16AF2F47-FCCC-4654-B9CA-4B0F96FBC8E1}" srcId="{3F916644-2E8A-4B6F-B43F-2D0046B6A616}" destId="{62041C44-F7ED-4163-B711-9ACF87A53496}" srcOrd="1" destOrd="0" parTransId="{2547519F-7BAF-4399-AD74-545DF3CEF68A}" sibTransId="{F7DCD137-ACA9-4AE4-87CB-2EA1504660D9}"/>
+    <dgm:cxn modelId="{388956EA-421C-4487-8EDE-76FF1E3AF44E}" type="presOf" srcId="{F7DCD137-ACA9-4AE4-87CB-2EA1504660D9}" destId="{F56EE369-719E-45A8-A097-B270961B21A0}" srcOrd="0" destOrd="0" presId="urn:microsoft.com/office/officeart/2005/8/layout/cycle5"/>
+    <dgm:cxn modelId="{4914B1D9-50CE-4DE5-9FA7-E56A43DAA51C}" srcId="{3F916644-2E8A-4B6F-B43F-2D0046B6A616}" destId="{C931E3FF-FE6C-40FB-9ADB-17CCC7BB756E}" srcOrd="4" destOrd="0" parTransId="{4D8654DD-BBFB-4152-B782-ED7019F69016}" sibTransId="{DF5F10F2-37F6-4150-B7B4-669743D6E2CB}"/>
+    <dgm:cxn modelId="{09F2EDB1-1ED4-4F9C-A9C9-ECFD1E74CA5F}" type="presOf" srcId="{3F916644-2E8A-4B6F-B43F-2D0046B6A616}" destId="{87DE19E5-C82B-43F4-A15B-CB71BA55E53A}" srcOrd="0" destOrd="0" presId="urn:microsoft.com/office/officeart/2005/8/layout/cycle5"/>
+    <dgm:cxn modelId="{5A6F51DB-673A-4BC9-AA01-D1D109624CC0}" type="presOf" srcId="{F9157FC7-84AD-4A5A-89B0-B470B45FE340}" destId="{DD88AB64-0DBB-4E44-B6BD-33E9D9A59330}" srcOrd="0" destOrd="0" presId="urn:microsoft.com/office/officeart/2005/8/layout/cycle5"/>
+    <dgm:cxn modelId="{F12FD970-516D-4FB7-BFDD-A88F5F61D213}" type="presParOf" srcId="{87DE19E5-C82B-43F4-A15B-CB71BA55E53A}" destId="{DD88AB64-0DBB-4E44-B6BD-33E9D9A59330}" srcOrd="0" destOrd="0" presId="urn:microsoft.com/office/officeart/2005/8/layout/cycle5"/>
+    <dgm:cxn modelId="{01D4408A-6356-45A2-9BA6-3791D81DD992}" type="presParOf" srcId="{87DE19E5-C82B-43F4-A15B-CB71BA55E53A}" destId="{C6AEA586-6263-4A83-999C-98C91F3A3E28}" srcOrd="1" destOrd="0" presId="urn:microsoft.com/office/officeart/2005/8/layout/cycle5"/>
+    <dgm:cxn modelId="{DF9EA5FD-5D57-4C99-8A9E-D38BAE1F705C}" type="presParOf" srcId="{87DE19E5-C82B-43F4-A15B-CB71BA55E53A}" destId="{A656F961-90F8-4D1C-ACF3-C7AA4E2A906F}" srcOrd="2" destOrd="0" presId="urn:microsoft.com/office/officeart/2005/8/layout/cycle5"/>
+    <dgm:cxn modelId="{5B70891C-9A2E-42C4-9BE3-E2FF73BD43C1}" type="presParOf" srcId="{87DE19E5-C82B-43F4-A15B-CB71BA55E53A}" destId="{33F7A666-D047-42A1-B42B-0BE6F20751F6}" srcOrd="3" destOrd="0" presId="urn:microsoft.com/office/officeart/2005/8/layout/cycle5"/>
+    <dgm:cxn modelId="{9C7C1568-D899-4C24-A0DC-70A99F405F6D}" type="presParOf" srcId="{87DE19E5-C82B-43F4-A15B-CB71BA55E53A}" destId="{2C26C018-00B4-4842-863D-5348ABEC5DAD}" srcOrd="4" destOrd="0" presId="urn:microsoft.com/office/officeart/2005/8/layout/cycle5"/>
+    <dgm:cxn modelId="{1D4EB82B-DA2E-48FB-A9B2-7FD3F6DF122C}" type="presParOf" srcId="{87DE19E5-C82B-43F4-A15B-CB71BA55E53A}" destId="{F56EE369-719E-45A8-A097-B270961B21A0}" srcOrd="5" destOrd="0" presId="urn:microsoft.com/office/officeart/2005/8/layout/cycle5"/>
+    <dgm:cxn modelId="{84F474D8-7311-4303-A3E3-4FB80A43D735}" type="presParOf" srcId="{87DE19E5-C82B-43F4-A15B-CB71BA55E53A}" destId="{DB401924-68DF-41B9-8F4C-A9BCAD74108A}" srcOrd="6" destOrd="0" presId="urn:microsoft.com/office/officeart/2005/8/layout/cycle5"/>
+    <dgm:cxn modelId="{9BB83083-555F-4DDD-995C-F815D72A6D18}" type="presParOf" srcId="{87DE19E5-C82B-43F4-A15B-CB71BA55E53A}" destId="{731BD4A0-1F85-441D-AD24-DF0EC97047DF}" srcOrd="7" destOrd="0" presId="urn:microsoft.com/office/officeart/2005/8/layout/cycle5"/>
+    <dgm:cxn modelId="{D4FABCBC-D0EE-42ED-8610-AF5390EDF9B7}" type="presParOf" srcId="{87DE19E5-C82B-43F4-A15B-CB71BA55E53A}" destId="{C8A54F2D-48C1-4CF4-942A-773E8EE11BB2}" srcOrd="8" destOrd="0" presId="urn:microsoft.com/office/officeart/2005/8/layout/cycle5"/>
+    <dgm:cxn modelId="{64CCB9AE-45E5-4F37-8646-DC0C2E2CBB06}" type="presParOf" srcId="{87DE19E5-C82B-43F4-A15B-CB71BA55E53A}" destId="{D5BEFD69-E139-4D86-96AF-8995FC63B8ED}" srcOrd="9" destOrd="0" presId="urn:microsoft.com/office/officeart/2005/8/layout/cycle5"/>
+    <dgm:cxn modelId="{0FCA80E2-ABC6-4650-A6BD-3A7A3D9FEA3F}" type="presParOf" srcId="{87DE19E5-C82B-43F4-A15B-CB71BA55E53A}" destId="{5C69B94A-7DD7-4978-A888-23B5F3CBD3F7}" srcOrd="10" destOrd="0" presId="urn:microsoft.com/office/officeart/2005/8/layout/cycle5"/>
+    <dgm:cxn modelId="{1B5F1983-C2CE-4F50-AB67-5AB98611770B}" type="presParOf" srcId="{87DE19E5-C82B-43F4-A15B-CB71BA55E53A}" destId="{5F61474C-8E73-46EE-AA24-6F557D36EAB3}" srcOrd="11" destOrd="0" presId="urn:microsoft.com/office/officeart/2005/8/layout/cycle5"/>
+    <dgm:cxn modelId="{503BFE36-108D-4210-A288-8C7C3CC9E03E}" type="presParOf" srcId="{87DE19E5-C82B-43F4-A15B-CB71BA55E53A}" destId="{0469E915-6954-449E-B902-025699F471A4}" srcOrd="12" destOrd="0" presId="urn:microsoft.com/office/officeart/2005/8/layout/cycle5"/>
+    <dgm:cxn modelId="{354D8019-4758-4DC1-A794-4CEE72AE02D0}" type="presParOf" srcId="{87DE19E5-C82B-43F4-A15B-CB71BA55E53A}" destId="{F11DEAF9-E987-4B6A-966B-0AA6F5A63DE8}" srcOrd="13" destOrd="0" presId="urn:microsoft.com/office/officeart/2005/8/layout/cycle5"/>
+    <dgm:cxn modelId="{9FB4E729-5DA6-4D42-A68C-BE4065FB70A2}" type="presParOf" srcId="{87DE19E5-C82B-43F4-A15B-CB71BA55E53A}" destId="{7EF6D4C4-1AB7-47F5-A6BF-59A11497289A}" srcOrd="14" destOrd="0" presId="urn:microsoft.com/office/officeart/2005/8/layout/cycle5"/>
+  </dgm:cxnLst>
+  <dgm:bg/>
+  <dgm:whole/>
+</dgm:dataModel>
+</file>
+
+<file path=ppt/diagrams/data2.xml><?xml version="1.0" encoding="utf-8"?>
+<dgm:dataModel xmlns:dgm="http://schemas.openxmlformats.org/drawingml/2006/diagram" xmlns:a="http://schemas.openxmlformats.org/drawingml/2006/main">
+  <dgm:ptLst>
     <dgm:pt modelId="{516AA38D-0E1E-494D-9076-AB4C7EFE4489}" type="doc">
       <dgm:prSet loTypeId="urn:microsoft.com/office/officeart/2005/8/layout/process5" loCatId="process" qsTypeId="urn:microsoft.com/office/officeart/2005/8/quickstyle/simple5" qsCatId="simple" csTypeId="urn:microsoft.com/office/officeart/2005/8/colors/colorful2" csCatId="colorful" phldr="1"/>
       <dgm:spPr/>
@@ -1428,6 +2685,214 @@
 </file>
 
 <file path=ppt/diagrams/layout1.xml><?xml version="1.0" encoding="utf-8"?>
+<dgm:layoutDef xmlns:dgm="http://schemas.openxmlformats.org/drawingml/2006/diagram" xmlns:a="http://schemas.openxmlformats.org/drawingml/2006/main" uniqueId="urn:microsoft.com/office/officeart/2005/8/layout/cycle5">
+  <dgm:title val=""/>
+  <dgm:desc val=""/>
+  <dgm:catLst>
+    <dgm:cat type="cycle" pri="3000"/>
+  </dgm:catLst>
+  <dgm:sampData>
+    <dgm:dataModel>
+      <dgm:ptLst>
+        <dgm:pt modelId="0" type="doc"/>
+        <dgm:pt modelId="1">
+          <dgm:prSet phldr="1"/>
+        </dgm:pt>
+        <dgm:pt modelId="2">
+          <dgm:prSet phldr="1"/>
+        </dgm:pt>
+        <dgm:pt modelId="3">
+          <dgm:prSet phldr="1"/>
+        </dgm:pt>
+        <dgm:pt modelId="4">
+          <dgm:prSet phldr="1"/>
+        </dgm:pt>
+        <dgm:pt modelId="5">
+          <dgm:prSet phldr="1"/>
+        </dgm:pt>
+      </dgm:ptLst>
+      <dgm:cxnLst>
+        <dgm:cxn modelId="6" srcId="0" destId="1" srcOrd="0" destOrd="0"/>
+        <dgm:cxn modelId="7" srcId="0" destId="2" srcOrd="1" destOrd="0"/>
+        <dgm:cxn modelId="8" srcId="0" destId="3" srcOrd="2" destOrd="0"/>
+        <dgm:cxn modelId="9" srcId="0" destId="4" srcOrd="3" destOrd="0"/>
+        <dgm:cxn modelId="10" srcId="0" destId="5" srcOrd="4" destOrd="0"/>
+      </dgm:cxnLst>
+      <dgm:bg/>
+      <dgm:whole/>
+    </dgm:dataModel>
+  </dgm:sampData>
+  <dgm:styleData>
+    <dgm:dataModel>
+      <dgm:ptLst>
+        <dgm:pt modelId="0" type="doc"/>
+        <dgm:pt modelId="1"/>
+        <dgm:pt modelId="2"/>
+        <dgm:pt modelId="3"/>
+      </dgm:ptLst>
+      <dgm:cxnLst>
+        <dgm:cxn modelId="4" srcId="0" destId="1" srcOrd="0" destOrd="0"/>
+        <dgm:cxn modelId="5" srcId="0" destId="2" srcOrd="1" destOrd="0"/>
+        <dgm:cxn modelId="6" srcId="0" destId="3" srcOrd="2" destOrd="0"/>
+      </dgm:cxnLst>
+      <dgm:bg/>
+      <dgm:whole/>
+    </dgm:dataModel>
+  </dgm:styleData>
+  <dgm:clrData>
+    <dgm:dataModel>
+      <dgm:ptLst>
+        <dgm:pt modelId="0" type="doc"/>
+        <dgm:pt modelId="1"/>
+        <dgm:pt modelId="2"/>
+        <dgm:pt modelId="3"/>
+        <dgm:pt modelId="4"/>
+        <dgm:pt modelId="5"/>
+        <dgm:pt modelId="6"/>
+      </dgm:ptLst>
+      <dgm:cxnLst>
+        <dgm:cxn modelId="7" srcId="0" destId="1" srcOrd="0" destOrd="0"/>
+        <dgm:cxn modelId="8" srcId="0" destId="2" srcOrd="1" destOrd="0"/>
+        <dgm:cxn modelId="9" srcId="0" destId="3" srcOrd="2" destOrd="0"/>
+        <dgm:cxn modelId="10" srcId="0" destId="4" srcOrd="3" destOrd="0"/>
+        <dgm:cxn modelId="11" srcId="0" destId="5" srcOrd="4" destOrd="0"/>
+        <dgm:cxn modelId="12" srcId="0" destId="6" srcOrd="5" destOrd="0"/>
+      </dgm:cxnLst>
+      <dgm:bg/>
+      <dgm:whole/>
+    </dgm:dataModel>
+  </dgm:clrData>
+  <dgm:layoutNode name="cycle">
+    <dgm:varLst>
+      <dgm:dir/>
+      <dgm:resizeHandles val="exact"/>
+    </dgm:varLst>
+    <dgm:choose name="Name0">
+      <dgm:if name="Name1" func="var" arg="dir" op="equ" val="norm">
+        <dgm:choose name="Name2">
+          <dgm:if name="Name3" axis="ch" ptType="node" func="cnt" op="gt" val="2">
+            <dgm:alg type="cycle">
+              <dgm:param type="stAng" val="0"/>
+              <dgm:param type="spanAng" val="360"/>
+            </dgm:alg>
+          </dgm:if>
+          <dgm:else name="Name4">
+            <dgm:alg type="cycle">
+              <dgm:param type="stAng" val="-90"/>
+              <dgm:param type="spanAng" val="360"/>
+            </dgm:alg>
+          </dgm:else>
+        </dgm:choose>
+      </dgm:if>
+      <dgm:else name="Name5">
+        <dgm:choose name="Name6">
+          <dgm:if name="Name7" axis="ch" ptType="node" func="cnt" op="gt" val="2">
+            <dgm:alg type="cycle">
+              <dgm:param type="stAng" val="0"/>
+              <dgm:param type="spanAng" val="-360"/>
+            </dgm:alg>
+          </dgm:if>
+          <dgm:else name="Name8">
+            <dgm:alg type="cycle">
+              <dgm:param type="stAng" val="90"/>
+              <dgm:param type="spanAng" val="-360"/>
+            </dgm:alg>
+          </dgm:else>
+        </dgm:choose>
+      </dgm:else>
+    </dgm:choose>
+    <dgm:shape xmlns:r="http://schemas.openxmlformats.org/officeDocument/2006/relationships" r:blip="">
+      <dgm:adjLst/>
+    </dgm:shape>
+    <dgm:presOf/>
+    <dgm:choose name="Name9">
+      <dgm:if name="Name10" func="var" arg="dir" op="equ" val="norm">
+        <dgm:constrLst>
+          <dgm:constr type="w" for="ch" forName="node" refType="w"/>
+          <dgm:constr type="w" for="ch" ptType="sibTrans" refType="w" refFor="ch" refForName="node" op="equ" fact="0.3"/>
+          <dgm:constr type="diam" for="ch" ptType="sibTrans" refType="diam" op="equ"/>
+          <dgm:constr type="sibSp" refType="w" refFor="ch" refForName="node" op="equ" fact="0.15"/>
+          <dgm:constr type="w" for="ch" forName="spNode" refType="sibSp" fact="1.6"/>
+          <dgm:constr type="primFontSz" for="ch" forName="node" op="equ" val="65"/>
+        </dgm:constrLst>
+      </dgm:if>
+      <dgm:else name="Name11">
+        <dgm:constrLst>
+          <dgm:constr type="w" for="ch" forName="node" refType="w"/>
+          <dgm:constr type="w" for="ch" ptType="sibTrans" refType="w" refFor="ch" refForName="node" op="equ" fact="0.3"/>
+          <dgm:constr type="diam" for="ch" ptType="sibTrans" refType="diam" fact="-1"/>
+          <dgm:constr type="diam" for="ch" refType="diam" op="equ" fact="-1"/>
+          <dgm:constr type="sibSp" refType="w" refFor="ch" refForName="node" op="equ" fact="0.15"/>
+          <dgm:constr type="w" for="ch" forName="spNode" refType="sibSp" fact="1.6"/>
+          <dgm:constr type="primFontSz" for="ch" forName="node" op="equ" val="65"/>
+        </dgm:constrLst>
+      </dgm:else>
+    </dgm:choose>
+    <dgm:ruleLst/>
+    <dgm:forEach name="Name12" axis="ch" ptType="node">
+      <dgm:layoutNode name="node">
+        <dgm:varLst>
+          <dgm:bulletEnabled val="1"/>
+        </dgm:varLst>
+        <dgm:alg type="tx"/>
+        <dgm:shape xmlns:r="http://schemas.openxmlformats.org/officeDocument/2006/relationships" type="roundRect" r:blip="">
+          <dgm:adjLst/>
+        </dgm:shape>
+        <dgm:presOf axis="desOrSelf" ptType="node"/>
+        <dgm:constrLst>
+          <dgm:constr type="h" refType="w" fact="0.65"/>
+          <dgm:constr type="tMarg" refType="primFontSz" fact="0.3"/>
+          <dgm:constr type="bMarg" refType="primFontSz" fact="0.3"/>
+          <dgm:constr type="lMarg" refType="primFontSz" fact="0.3"/>
+          <dgm:constr type="rMarg" refType="primFontSz" fact="0.3"/>
+        </dgm:constrLst>
+        <dgm:ruleLst>
+          <dgm:rule type="primFontSz" val="5" fact="NaN" max="NaN"/>
+        </dgm:ruleLst>
+      </dgm:layoutNode>
+      <dgm:choose name="Name13">
+        <dgm:if name="Name14" axis="par ch" ptType="doc node" func="cnt" op="gt" val="1">
+          <dgm:layoutNode name="spNode">
+            <dgm:alg type="sp"/>
+            <dgm:shape xmlns:r="http://schemas.openxmlformats.org/officeDocument/2006/relationships" r:blip="">
+              <dgm:adjLst/>
+            </dgm:shape>
+            <dgm:presOf/>
+            <dgm:constrLst>
+              <dgm:constr type="h" refType="w"/>
+            </dgm:constrLst>
+            <dgm:ruleLst/>
+          </dgm:layoutNode>
+          <dgm:forEach name="Name15" axis="followSib" ptType="sibTrans" hideLastTrans="0" cnt="1">
+            <dgm:layoutNode name="sibTrans">
+              <dgm:alg type="conn">
+                <dgm:param type="dim" val="1D"/>
+                <dgm:param type="connRout" val="curve"/>
+                <dgm:param type="begPts" val="radial"/>
+                <dgm:param type="endPts" val="radial"/>
+              </dgm:alg>
+              <dgm:shape xmlns:r="http://schemas.openxmlformats.org/officeDocument/2006/relationships" type="conn" r:blip="">
+                <dgm:adjLst/>
+              </dgm:shape>
+              <dgm:presOf axis="self"/>
+              <dgm:constrLst>
+                <dgm:constr type="h" refType="w" fact="0.65"/>
+                <dgm:constr type="connDist"/>
+                <dgm:constr type="begPad" refType="connDist" fact="0.2"/>
+                <dgm:constr type="endPad" refType="connDist" fact="0.2"/>
+              </dgm:constrLst>
+              <dgm:ruleLst/>
+            </dgm:layoutNode>
+          </dgm:forEach>
+        </dgm:if>
+        <dgm:else name="Name16"/>
+      </dgm:choose>
+    </dgm:forEach>
+  </dgm:layoutNode>
+</dgm:layoutDef>
+</file>
+
+<file path=ppt/diagrams/layout2.xml><?xml version="1.0" encoding="utf-8"?>
 <dgm:layoutDef xmlns:dgm="http://schemas.openxmlformats.org/drawingml/2006/diagram" xmlns:a="http://schemas.openxmlformats.org/drawingml/2006/main" uniqueId="urn:microsoft.com/office/officeart/2005/8/layout/process5">
   <dgm:title val=""/>
   <dgm:desc val=""/>
@@ -1599,6 +3064,1040 @@
 </file>
 
 <file path=ppt/diagrams/quickStyle1.xml><?xml version="1.0" encoding="utf-8"?>
+<dgm:styleDef xmlns:dgm="http://schemas.openxmlformats.org/drawingml/2006/diagram" xmlns:a="http://schemas.openxmlformats.org/drawingml/2006/main" uniqueId="urn:microsoft.com/office/officeart/2005/8/quickstyle/simple1">
+  <dgm:title val=""/>
+  <dgm:desc val=""/>
+  <dgm:catLst>
+    <dgm:cat type="simple" pri="10100"/>
+  </dgm:catLst>
+  <dgm:scene3d>
+    <a:camera prst="orthographicFront"/>
+    <a:lightRig rig="threePt" dir="t"/>
+  </dgm:scene3d>
+  <dgm:styleLbl name="node0">
+    <dgm:scene3d>
+      <a:camera prst="orthographicFront"/>
+      <a:lightRig rig="threePt" dir="t"/>
+    </dgm:scene3d>
+    <dgm:sp3d/>
+    <dgm:txPr/>
+    <dgm:style>
+      <a:lnRef idx="2">
+        <a:scrgbClr r="0" g="0" b="0"/>
+      </a:lnRef>
+      <a:fillRef idx="1">
+        <a:scrgbClr r="0" g="0" b="0"/>
+      </a:fillRef>
+      <a:effectRef idx="0">
+        <a:scrgbClr r="0" g="0" b="0"/>
+      </a:effectRef>
+      <a:fontRef idx="minor">
+        <a:schemeClr val="lt1"/>
+      </a:fontRef>
+    </dgm:style>
+  </dgm:styleLbl>
+  <dgm:styleLbl name="lnNode1">
+    <dgm:scene3d>
+      <a:camera prst="orthographicFront"/>
+      <a:lightRig rig="threePt" dir="t"/>
+    </dgm:scene3d>
+    <dgm:sp3d/>
+    <dgm:txPr/>
+    <dgm:style>
+      <a:lnRef idx="2">
+        <a:scrgbClr r="0" g="0" b="0"/>
+      </a:lnRef>
+      <a:fillRef idx="1">
+        <a:scrgbClr r="0" g="0" b="0"/>
+      </a:fillRef>
+      <a:effectRef idx="0">
+        <a:scrgbClr r="0" g="0" b="0"/>
+      </a:effectRef>
+      <a:fontRef idx="minor">
+        <a:schemeClr val="lt1"/>
+      </a:fontRef>
+    </dgm:style>
+  </dgm:styleLbl>
+  <dgm:styleLbl name="vennNode1">
+    <dgm:scene3d>
+      <a:camera prst="orthographicFront"/>
+      <a:lightRig rig="threePt" dir="t"/>
+    </dgm:scene3d>
+    <dgm:sp3d/>
+    <dgm:txPr/>
+    <dgm:style>
+      <a:lnRef idx="2">
+        <a:scrgbClr r="0" g="0" b="0"/>
+      </a:lnRef>
+      <a:fillRef idx="1">
+        <a:scrgbClr r="0" g="0" b="0"/>
+      </a:fillRef>
+      <a:effectRef idx="0">
+        <a:scrgbClr r="0" g="0" b="0"/>
+      </a:effectRef>
+      <a:fontRef idx="minor">
+        <a:schemeClr val="tx1"/>
+      </a:fontRef>
+    </dgm:style>
+  </dgm:styleLbl>
+  <dgm:styleLbl name="alignNode1">
+    <dgm:scene3d>
+      <a:camera prst="orthographicFront"/>
+      <a:lightRig rig="threePt" dir="t"/>
+    </dgm:scene3d>
+    <dgm:sp3d/>
+    <dgm:txPr/>
+    <dgm:style>
+      <a:lnRef idx="2">
+        <a:scrgbClr r="0" g="0" b="0"/>
+      </a:lnRef>
+      <a:fillRef idx="1">
+        <a:scrgbClr r="0" g="0" b="0"/>
+      </a:fillRef>
+      <a:effectRef idx="0">
+        <a:scrgbClr r="0" g="0" b="0"/>
+      </a:effectRef>
+      <a:fontRef idx="minor">
+        <a:schemeClr val="lt1"/>
+      </a:fontRef>
+    </dgm:style>
+  </dgm:styleLbl>
+  <dgm:styleLbl name="node1">
+    <dgm:scene3d>
+      <a:camera prst="orthographicFront"/>
+      <a:lightRig rig="threePt" dir="t"/>
+    </dgm:scene3d>
+    <dgm:sp3d/>
+    <dgm:txPr/>
+    <dgm:style>
+      <a:lnRef idx="2">
+        <a:scrgbClr r="0" g="0" b="0"/>
+      </a:lnRef>
+      <a:fillRef idx="1">
+        <a:scrgbClr r="0" g="0" b="0"/>
+      </a:fillRef>
+      <a:effectRef idx="0">
+        <a:scrgbClr r="0" g="0" b="0"/>
+      </a:effectRef>
+      <a:fontRef idx="minor">
+        <a:schemeClr val="lt1"/>
+      </a:fontRef>
+    </dgm:style>
+  </dgm:styleLbl>
+  <dgm:styleLbl name="node2">
+    <dgm:scene3d>
+      <a:camera prst="orthographicFront"/>
+      <a:lightRig rig="threePt" dir="t"/>
+    </dgm:scene3d>
+    <dgm:sp3d/>
+    <dgm:txPr/>
+    <dgm:style>
+      <a:lnRef idx="2">
+        <a:scrgbClr r="0" g="0" b="0"/>
+      </a:lnRef>
+      <a:fillRef idx="1">
+        <a:scrgbClr r="0" g="0" b="0"/>
+      </a:fillRef>
+      <a:effectRef idx="0">
+        <a:scrgbClr r="0" g="0" b="0"/>
+      </a:effectRef>
+      <a:fontRef idx="minor">
+        <a:schemeClr val="lt1"/>
+      </a:fontRef>
+    </dgm:style>
+  </dgm:styleLbl>
+  <dgm:styleLbl name="node3">
+    <dgm:scene3d>
+      <a:camera prst="orthographicFront"/>
+      <a:lightRig rig="threePt" dir="t"/>
+    </dgm:scene3d>
+    <dgm:sp3d/>
+    <dgm:txPr/>
+    <dgm:style>
+      <a:lnRef idx="2">
+        <a:scrgbClr r="0" g="0" b="0"/>
+      </a:lnRef>
+      <a:fillRef idx="1">
+        <a:scrgbClr r="0" g="0" b="0"/>
+      </a:fillRef>
+      <a:effectRef idx="0">
+        <a:scrgbClr r="0" g="0" b="0"/>
+      </a:effectRef>
+      <a:fontRef idx="minor">
+        <a:schemeClr val="lt1"/>
+      </a:fontRef>
+    </dgm:style>
+  </dgm:styleLbl>
+  <dgm:styleLbl name="node4">
+    <dgm:scene3d>
+      <a:camera prst="orthographicFront"/>
+      <a:lightRig rig="threePt" dir="t"/>
+    </dgm:scene3d>
+    <dgm:sp3d/>
+    <dgm:txPr/>
+    <dgm:style>
+      <a:lnRef idx="2">
+        <a:scrgbClr r="0" g="0" b="0"/>
+      </a:lnRef>
+      <a:fillRef idx="1">
+        <a:scrgbClr r="0" g="0" b="0"/>
+      </a:fillRef>
+      <a:effectRef idx="0">
+        <a:scrgbClr r="0" g="0" b="0"/>
+      </a:effectRef>
+      <a:fontRef idx="minor">
+        <a:schemeClr val="lt1"/>
+      </a:fontRef>
+    </dgm:style>
+  </dgm:styleLbl>
+  <dgm:styleLbl name="fgImgPlace1">
+    <dgm:scene3d>
+      <a:camera prst="orthographicFront"/>
+      <a:lightRig rig="threePt" dir="t"/>
+    </dgm:scene3d>
+    <dgm:sp3d/>
+    <dgm:txPr/>
+    <dgm:style>
+      <a:lnRef idx="2">
+        <a:scrgbClr r="0" g="0" b="0"/>
+      </a:lnRef>
+      <a:fillRef idx="1">
+        <a:scrgbClr r="0" g="0" b="0"/>
+      </a:fillRef>
+      <a:effectRef idx="0">
+        <a:scrgbClr r="0" g="0" b="0"/>
+      </a:effectRef>
+      <a:fontRef idx="minor"/>
+    </dgm:style>
+  </dgm:styleLbl>
+  <dgm:styleLbl name="alignImgPlace1">
+    <dgm:scene3d>
+      <a:camera prst="orthographicFront"/>
+      <a:lightRig rig="threePt" dir="t"/>
+    </dgm:scene3d>
+    <dgm:sp3d/>
+    <dgm:txPr/>
+    <dgm:style>
+      <a:lnRef idx="2">
+        <a:scrgbClr r="0" g="0" b="0"/>
+      </a:lnRef>
+      <a:fillRef idx="1">
+        <a:scrgbClr r="0" g="0" b="0"/>
+      </a:fillRef>
+      <a:effectRef idx="0">
+        <a:scrgbClr r="0" g="0" b="0"/>
+      </a:effectRef>
+      <a:fontRef idx="minor"/>
+    </dgm:style>
+  </dgm:styleLbl>
+  <dgm:styleLbl name="bgImgPlace1">
+    <dgm:scene3d>
+      <a:camera prst="orthographicFront"/>
+      <a:lightRig rig="threePt" dir="t"/>
+    </dgm:scene3d>
+    <dgm:sp3d/>
+    <dgm:txPr/>
+    <dgm:style>
+      <a:lnRef idx="2">
+        <a:scrgbClr r="0" g="0" b="0"/>
+      </a:lnRef>
+      <a:fillRef idx="1">
+        <a:scrgbClr r="0" g="0" b="0"/>
+      </a:fillRef>
+      <a:effectRef idx="0">
+        <a:scrgbClr r="0" g="0" b="0"/>
+      </a:effectRef>
+      <a:fontRef idx="minor"/>
+    </dgm:style>
+  </dgm:styleLbl>
+  <dgm:styleLbl name="sibTrans2D1">
+    <dgm:scene3d>
+      <a:camera prst="orthographicFront"/>
+      <a:lightRig rig="threePt" dir="t"/>
+    </dgm:scene3d>
+    <dgm:sp3d/>
+    <dgm:txPr/>
+    <dgm:style>
+      <a:lnRef idx="0">
+        <a:scrgbClr r="0" g="0" b="0"/>
+      </a:lnRef>
+      <a:fillRef idx="1">
+        <a:scrgbClr r="0" g="0" b="0"/>
+      </a:fillRef>
+      <a:effectRef idx="0">
+        <a:scrgbClr r="0" g="0" b="0"/>
+      </a:effectRef>
+      <a:fontRef idx="minor">
+        <a:schemeClr val="lt1"/>
+      </a:fontRef>
+    </dgm:style>
+  </dgm:styleLbl>
+  <dgm:styleLbl name="fgSibTrans2D1">
+    <dgm:scene3d>
+      <a:camera prst="orthographicFront"/>
+      <a:lightRig rig="threePt" dir="t"/>
+    </dgm:scene3d>
+    <dgm:sp3d/>
+    <dgm:txPr/>
+    <dgm:style>
+      <a:lnRef idx="0">
+        <a:scrgbClr r="0" g="0" b="0"/>
+      </a:lnRef>
+      <a:fillRef idx="1">
+        <a:scrgbClr r="0" g="0" b="0"/>
+      </a:fillRef>
+      <a:effectRef idx="0">
+        <a:scrgbClr r="0" g="0" b="0"/>
+      </a:effectRef>
+      <a:fontRef idx="minor">
+        <a:schemeClr val="lt1"/>
+      </a:fontRef>
+    </dgm:style>
+  </dgm:styleLbl>
+  <dgm:styleLbl name="bgSibTrans2D1">
+    <dgm:scene3d>
+      <a:camera prst="orthographicFront"/>
+      <a:lightRig rig="threePt" dir="t"/>
+    </dgm:scene3d>
+    <dgm:sp3d/>
+    <dgm:txPr/>
+    <dgm:style>
+      <a:lnRef idx="0">
+        <a:scrgbClr r="0" g="0" b="0"/>
+      </a:lnRef>
+      <a:fillRef idx="1">
+        <a:scrgbClr r="0" g="0" b="0"/>
+      </a:fillRef>
+      <a:effectRef idx="0">
+        <a:scrgbClr r="0" g="0" b="0"/>
+      </a:effectRef>
+      <a:fontRef idx="minor">
+        <a:schemeClr val="lt1"/>
+      </a:fontRef>
+    </dgm:style>
+  </dgm:styleLbl>
+  <dgm:styleLbl name="sibTrans1D1">
+    <dgm:scene3d>
+      <a:camera prst="orthographicFront"/>
+      <a:lightRig rig="threePt" dir="t"/>
+    </dgm:scene3d>
+    <dgm:sp3d/>
+    <dgm:txPr/>
+    <dgm:style>
+      <a:lnRef idx="1">
+        <a:scrgbClr r="0" g="0" b="0"/>
+      </a:lnRef>
+      <a:fillRef idx="0">
+        <a:scrgbClr r="0" g="0" b="0"/>
+      </a:fillRef>
+      <a:effectRef idx="0">
+        <a:scrgbClr r="0" g="0" b="0"/>
+      </a:effectRef>
+      <a:fontRef idx="minor"/>
+    </dgm:style>
+  </dgm:styleLbl>
+  <dgm:styleLbl name="callout">
+    <dgm:scene3d>
+      <a:camera prst="orthographicFront"/>
+      <a:lightRig rig="threePt" dir="t"/>
+    </dgm:scene3d>
+    <dgm:sp3d/>
+    <dgm:txPr/>
+    <dgm:style>
+      <a:lnRef idx="2">
+        <a:scrgbClr r="0" g="0" b="0"/>
+      </a:lnRef>
+      <a:fillRef idx="1">
+        <a:scrgbClr r="0" g="0" b="0"/>
+      </a:fillRef>
+      <a:effectRef idx="0">
+        <a:scrgbClr r="0" g="0" b="0"/>
+      </a:effectRef>
+      <a:fontRef idx="minor"/>
+    </dgm:style>
+  </dgm:styleLbl>
+  <dgm:styleLbl name="asst0">
+    <dgm:scene3d>
+      <a:camera prst="orthographicFront"/>
+      <a:lightRig rig="threePt" dir="t"/>
+    </dgm:scene3d>
+    <dgm:sp3d/>
+    <dgm:txPr/>
+    <dgm:style>
+      <a:lnRef idx="2">
+        <a:scrgbClr r="0" g="0" b="0"/>
+      </a:lnRef>
+      <a:fillRef idx="1">
+        <a:scrgbClr r="0" g="0" b="0"/>
+      </a:fillRef>
+      <a:effectRef idx="0">
+        <a:scrgbClr r="0" g="0" b="0"/>
+      </a:effectRef>
+      <a:fontRef idx="minor">
+        <a:schemeClr val="lt1"/>
+      </a:fontRef>
+    </dgm:style>
+  </dgm:styleLbl>
+  <dgm:styleLbl name="asst1">
+    <dgm:scene3d>
+      <a:camera prst="orthographicFront"/>
+      <a:lightRig rig="threePt" dir="t"/>
+    </dgm:scene3d>
+    <dgm:sp3d/>
+    <dgm:txPr/>
+    <dgm:style>
+      <a:lnRef idx="2">
+        <a:scrgbClr r="0" g="0" b="0"/>
+      </a:lnRef>
+      <a:fillRef idx="1">
+        <a:scrgbClr r="0" g="0" b="0"/>
+      </a:fillRef>
+      <a:effectRef idx="0">
+        <a:scrgbClr r="0" g="0" b="0"/>
+      </a:effectRef>
+      <a:fontRef idx="minor">
+        <a:schemeClr val="lt1"/>
+      </a:fontRef>
+    </dgm:style>
+  </dgm:styleLbl>
+  <dgm:styleLbl name="asst2">
+    <dgm:scene3d>
+      <a:camera prst="orthographicFront"/>
+      <a:lightRig rig="threePt" dir="t"/>
+    </dgm:scene3d>
+    <dgm:sp3d/>
+    <dgm:txPr/>
+    <dgm:style>
+      <a:lnRef idx="2">
+        <a:scrgbClr r="0" g="0" b="0"/>
+      </a:lnRef>
+      <a:fillRef idx="1">
+        <a:scrgbClr r="0" g="0" b="0"/>
+      </a:fillRef>
+      <a:effectRef idx="0">
+        <a:scrgbClr r="0" g="0" b="0"/>
+      </a:effectRef>
+      <a:fontRef idx="minor">
+        <a:schemeClr val="lt1"/>
+      </a:fontRef>
+    </dgm:style>
+  </dgm:styleLbl>
+  <dgm:styleLbl name="asst3">
+    <dgm:scene3d>
+      <a:camera prst="orthographicFront"/>
+      <a:lightRig rig="threePt" dir="t"/>
+    </dgm:scene3d>
+    <dgm:sp3d/>
+    <dgm:txPr/>
+    <dgm:style>
+      <a:lnRef idx="2">
+        <a:scrgbClr r="0" g="0" b="0"/>
+      </a:lnRef>
+      <a:fillRef idx="1">
+        <a:scrgbClr r="0" g="0" b="0"/>
+      </a:fillRef>
+      <a:effectRef idx="0">
+        <a:scrgbClr r="0" g="0" b="0"/>
+      </a:effectRef>
+      <a:fontRef idx="minor">
+        <a:schemeClr val="lt1"/>
+      </a:fontRef>
+    </dgm:style>
+  </dgm:styleLbl>
+  <dgm:styleLbl name="asst4">
+    <dgm:scene3d>
+      <a:camera prst="orthographicFront"/>
+      <a:lightRig rig="threePt" dir="t"/>
+    </dgm:scene3d>
+    <dgm:sp3d/>
+    <dgm:txPr/>
+    <dgm:style>
+      <a:lnRef idx="2">
+        <a:scrgbClr r="0" g="0" b="0"/>
+      </a:lnRef>
+      <a:fillRef idx="1">
+        <a:scrgbClr r="0" g="0" b="0"/>
+      </a:fillRef>
+      <a:effectRef idx="0">
+        <a:scrgbClr r="0" g="0" b="0"/>
+      </a:effectRef>
+      <a:fontRef idx="minor">
+        <a:schemeClr val="lt1"/>
+      </a:fontRef>
+    </dgm:style>
+  </dgm:styleLbl>
+  <dgm:styleLbl name="parChTrans2D1">
+    <dgm:scene3d>
+      <a:camera prst="orthographicFront"/>
+      <a:lightRig rig="threePt" dir="t"/>
+    </dgm:scene3d>
+    <dgm:sp3d/>
+    <dgm:txPr/>
+    <dgm:style>
+      <a:lnRef idx="2">
+        <a:scrgbClr r="0" g="0" b="0"/>
+      </a:lnRef>
+      <a:fillRef idx="1">
+        <a:scrgbClr r="0" g="0" b="0"/>
+      </a:fillRef>
+      <a:effectRef idx="0">
+        <a:scrgbClr r="0" g="0" b="0"/>
+      </a:effectRef>
+      <a:fontRef idx="minor">
+        <a:schemeClr val="lt1"/>
+      </a:fontRef>
+    </dgm:style>
+  </dgm:styleLbl>
+  <dgm:styleLbl name="parChTrans2D2">
+    <dgm:scene3d>
+      <a:camera prst="orthographicFront"/>
+      <a:lightRig rig="threePt" dir="t"/>
+    </dgm:scene3d>
+    <dgm:sp3d/>
+    <dgm:txPr/>
+    <dgm:style>
+      <a:lnRef idx="2">
+        <a:scrgbClr r="0" g="0" b="0"/>
+      </a:lnRef>
+      <a:fillRef idx="1">
+        <a:scrgbClr r="0" g="0" b="0"/>
+      </a:fillRef>
+      <a:effectRef idx="0">
+        <a:scrgbClr r="0" g="0" b="0"/>
+      </a:effectRef>
+      <a:fontRef idx="minor">
+        <a:schemeClr val="lt1"/>
+      </a:fontRef>
+    </dgm:style>
+  </dgm:styleLbl>
+  <dgm:styleLbl name="parChTrans2D3">
+    <dgm:scene3d>
+      <a:camera prst="orthographicFront"/>
+      <a:lightRig rig="threePt" dir="t"/>
+    </dgm:scene3d>
+    <dgm:sp3d/>
+    <dgm:txPr/>
+    <dgm:style>
+      <a:lnRef idx="2">
+        <a:scrgbClr r="0" g="0" b="0"/>
+      </a:lnRef>
+      <a:fillRef idx="1">
+        <a:scrgbClr r="0" g="0" b="0"/>
+      </a:fillRef>
+      <a:effectRef idx="0">
+        <a:scrgbClr r="0" g="0" b="0"/>
+      </a:effectRef>
+      <a:fontRef idx="minor">
+        <a:schemeClr val="lt1"/>
+      </a:fontRef>
+    </dgm:style>
+  </dgm:styleLbl>
+  <dgm:styleLbl name="parChTrans2D4">
+    <dgm:scene3d>
+      <a:camera prst="orthographicFront"/>
+      <a:lightRig rig="threePt" dir="t"/>
+    </dgm:scene3d>
+    <dgm:sp3d/>
+    <dgm:txPr/>
+    <dgm:style>
+      <a:lnRef idx="2">
+        <a:scrgbClr r="0" g="0" b="0"/>
+      </a:lnRef>
+      <a:fillRef idx="1">
+        <a:scrgbClr r="0" g="0" b="0"/>
+      </a:fillRef>
+      <a:effectRef idx="0">
+        <a:scrgbClr r="0" g="0" b="0"/>
+      </a:effectRef>
+      <a:fontRef idx="minor">
+        <a:schemeClr val="lt1"/>
+      </a:fontRef>
+    </dgm:style>
+  </dgm:styleLbl>
+  <dgm:styleLbl name="parChTrans1D1">
+    <dgm:scene3d>
+      <a:camera prst="orthographicFront"/>
+      <a:lightRig rig="threePt" dir="t"/>
+    </dgm:scene3d>
+    <dgm:sp3d/>
+    <dgm:txPr/>
+    <dgm:style>
+      <a:lnRef idx="2">
+        <a:scrgbClr r="0" g="0" b="0"/>
+      </a:lnRef>
+      <a:fillRef idx="0">
+        <a:scrgbClr r="0" g="0" b="0"/>
+      </a:fillRef>
+      <a:effectRef idx="0">
+        <a:scrgbClr r="0" g="0" b="0"/>
+      </a:effectRef>
+      <a:fontRef idx="minor"/>
+    </dgm:style>
+  </dgm:styleLbl>
+  <dgm:styleLbl name="parChTrans1D2">
+    <dgm:scene3d>
+      <a:camera prst="orthographicFront"/>
+      <a:lightRig rig="threePt" dir="t"/>
+    </dgm:scene3d>
+    <dgm:sp3d/>
+    <dgm:txPr/>
+    <dgm:style>
+      <a:lnRef idx="2">
+        <a:scrgbClr r="0" g="0" b="0"/>
+      </a:lnRef>
+      <a:fillRef idx="0">
+        <a:scrgbClr r="0" g="0" b="0"/>
+      </a:fillRef>
+      <a:effectRef idx="0">
+        <a:scrgbClr r="0" g="0" b="0"/>
+      </a:effectRef>
+      <a:fontRef idx="minor"/>
+    </dgm:style>
+  </dgm:styleLbl>
+  <dgm:styleLbl name="parChTrans1D3">
+    <dgm:scene3d>
+      <a:camera prst="orthographicFront"/>
+      <a:lightRig rig="threePt" dir="t"/>
+    </dgm:scene3d>
+    <dgm:sp3d/>
+    <dgm:txPr/>
+    <dgm:style>
+      <a:lnRef idx="2">
+        <a:scrgbClr r="0" g="0" b="0"/>
+      </a:lnRef>
+      <a:fillRef idx="0">
+        <a:scrgbClr r="0" g="0" b="0"/>
+      </a:fillRef>
+      <a:effectRef idx="0">
+        <a:scrgbClr r="0" g="0" b="0"/>
+      </a:effectRef>
+      <a:fontRef idx="minor"/>
+    </dgm:style>
+  </dgm:styleLbl>
+  <dgm:styleLbl name="parChTrans1D4">
+    <dgm:scene3d>
+      <a:camera prst="orthographicFront"/>
+      <a:lightRig rig="threePt" dir="t"/>
+    </dgm:scene3d>
+    <dgm:sp3d/>
+    <dgm:txPr/>
+    <dgm:style>
+      <a:lnRef idx="2">
+        <a:scrgbClr r="0" g="0" b="0"/>
+      </a:lnRef>
+      <a:fillRef idx="0">
+        <a:scrgbClr r="0" g="0" b="0"/>
+      </a:fillRef>
+      <a:effectRef idx="0">
+        <a:scrgbClr r="0" g="0" b="0"/>
+      </a:effectRef>
+      <a:fontRef idx="minor"/>
+    </dgm:style>
+  </dgm:styleLbl>
+  <dgm:styleLbl name="fgAcc1">
+    <dgm:scene3d>
+      <a:camera prst="orthographicFront"/>
+      <a:lightRig rig="threePt" dir="t"/>
+    </dgm:scene3d>
+    <dgm:sp3d/>
+    <dgm:txPr/>
+    <dgm:style>
+      <a:lnRef idx="2">
+        <a:scrgbClr r="0" g="0" b="0"/>
+      </a:lnRef>
+      <a:fillRef idx="1">
+        <a:scrgbClr r="0" g="0" b="0"/>
+      </a:fillRef>
+      <a:effectRef idx="0">
+        <a:scrgbClr r="0" g="0" b="0"/>
+      </a:effectRef>
+      <a:fontRef idx="minor"/>
+    </dgm:style>
+  </dgm:styleLbl>
+  <dgm:styleLbl name="conFgAcc1">
+    <dgm:scene3d>
+      <a:camera prst="orthographicFront"/>
+      <a:lightRig rig="threePt" dir="t"/>
+    </dgm:scene3d>
+    <dgm:sp3d/>
+    <dgm:txPr/>
+    <dgm:style>
+      <a:lnRef idx="2">
+        <a:scrgbClr r="0" g="0" b="0"/>
+      </a:lnRef>
+      <a:fillRef idx="1">
+        <a:scrgbClr r="0" g="0" b="0"/>
+      </a:fillRef>
+      <a:effectRef idx="0">
+        <a:scrgbClr r="0" g="0" b="0"/>
+      </a:effectRef>
+      <a:fontRef idx="minor"/>
+    </dgm:style>
+  </dgm:styleLbl>
+  <dgm:styleLbl name="alignAcc1">
+    <dgm:scene3d>
+      <a:camera prst="orthographicFront"/>
+      <a:lightRig rig="threePt" dir="t"/>
+    </dgm:scene3d>
+    <dgm:sp3d/>
+    <dgm:txPr/>
+    <dgm:style>
+      <a:lnRef idx="2">
+        <a:scrgbClr r="0" g="0" b="0"/>
+      </a:lnRef>
+      <a:fillRef idx="1">
+        <a:scrgbClr r="0" g="0" b="0"/>
+      </a:fillRef>
+      <a:effectRef idx="0">
+        <a:scrgbClr r="0" g="0" b="0"/>
+      </a:effectRef>
+      <a:fontRef idx="minor"/>
+    </dgm:style>
+  </dgm:styleLbl>
+  <dgm:styleLbl name="trAlignAcc1">
+    <dgm:scene3d>
+      <a:camera prst="orthographicFront"/>
+      <a:lightRig rig="threePt" dir="t"/>
+    </dgm:scene3d>
+    <dgm:sp3d/>
+    <dgm:txPr/>
+    <dgm:style>
+      <a:lnRef idx="1">
+        <a:scrgbClr r="0" g="0" b="0"/>
+      </a:lnRef>
+      <a:fillRef idx="1">
+        <a:scrgbClr r="0" g="0" b="0"/>
+      </a:fillRef>
+      <a:effectRef idx="0">
+        <a:scrgbClr r="0" g="0" b="0"/>
+      </a:effectRef>
+      <a:fontRef idx="minor"/>
+    </dgm:style>
+  </dgm:styleLbl>
+  <dgm:styleLbl name="bgAcc1">
+    <dgm:scene3d>
+      <a:camera prst="orthographicFront"/>
+      <a:lightRig rig="threePt" dir="t"/>
+    </dgm:scene3d>
+    <dgm:sp3d/>
+    <dgm:txPr/>
+    <dgm:style>
+      <a:lnRef idx="2">
+        <a:scrgbClr r="0" g="0" b="0"/>
+      </a:lnRef>
+      <a:fillRef idx="1">
+        <a:scrgbClr r="0" g="0" b="0"/>
+      </a:fillRef>
+      <a:effectRef idx="0">
+        <a:scrgbClr r="0" g="0" b="0"/>
+      </a:effectRef>
+      <a:fontRef idx="minor"/>
+    </dgm:style>
+  </dgm:styleLbl>
+  <dgm:styleLbl name="solidFgAcc1">
+    <dgm:scene3d>
+      <a:camera prst="orthographicFront"/>
+      <a:lightRig rig="threePt" dir="t"/>
+    </dgm:scene3d>
+    <dgm:sp3d/>
+    <dgm:txPr/>
+    <dgm:style>
+      <a:lnRef idx="2">
+        <a:scrgbClr r="0" g="0" b="0"/>
+      </a:lnRef>
+      <a:fillRef idx="1">
+        <a:scrgbClr r="0" g="0" b="0"/>
+      </a:fillRef>
+      <a:effectRef idx="0">
+        <a:scrgbClr r="0" g="0" b="0"/>
+      </a:effectRef>
+      <a:fontRef idx="minor"/>
+    </dgm:style>
+  </dgm:styleLbl>
+  <dgm:styleLbl name="solidAlignAcc1">
+    <dgm:scene3d>
+      <a:camera prst="orthographicFront"/>
+      <a:lightRig rig="threePt" dir="t"/>
+    </dgm:scene3d>
+    <dgm:sp3d/>
+    <dgm:txPr/>
+    <dgm:style>
+      <a:lnRef idx="2">
+        <a:scrgbClr r="0" g="0" b="0"/>
+      </a:lnRef>
+      <a:fillRef idx="1">
+        <a:scrgbClr r="0" g="0" b="0"/>
+      </a:fillRef>
+      <a:effectRef idx="0">
+        <a:scrgbClr r="0" g="0" b="0"/>
+      </a:effectRef>
+      <a:fontRef idx="minor"/>
+    </dgm:style>
+  </dgm:styleLbl>
+  <dgm:styleLbl name="solidBgAcc1">
+    <dgm:scene3d>
+      <a:camera prst="orthographicFront"/>
+      <a:lightRig rig="threePt" dir="t"/>
+    </dgm:scene3d>
+    <dgm:sp3d/>
+    <dgm:txPr/>
+    <dgm:style>
+      <a:lnRef idx="2">
+        <a:scrgbClr r="0" g="0" b="0"/>
+      </a:lnRef>
+      <a:fillRef idx="1">
+        <a:scrgbClr r="0" g="0" b="0"/>
+      </a:fillRef>
+      <a:effectRef idx="0">
+        <a:scrgbClr r="0" g="0" b="0"/>
+      </a:effectRef>
+      <a:fontRef idx="minor"/>
+    </dgm:style>
+  </dgm:styleLbl>
+  <dgm:styleLbl name="fgAccFollowNode1">
+    <dgm:scene3d>
+      <a:camera prst="orthographicFront"/>
+      <a:lightRig rig="threePt" dir="t"/>
+    </dgm:scene3d>
+    <dgm:sp3d/>
+    <dgm:txPr/>
+    <dgm:style>
+      <a:lnRef idx="2">
+        <a:scrgbClr r="0" g="0" b="0"/>
+      </a:lnRef>
+      <a:fillRef idx="1">
+        <a:scrgbClr r="0" g="0" b="0"/>
+      </a:fillRef>
+      <a:effectRef idx="0">
+        <a:scrgbClr r="0" g="0" b="0"/>
+      </a:effectRef>
+      <a:fontRef idx="minor"/>
+    </dgm:style>
+  </dgm:styleLbl>
+  <dgm:styleLbl name="alignAccFollowNode1">
+    <dgm:scene3d>
+      <a:camera prst="orthographicFront"/>
+      <a:lightRig rig="threePt" dir="t"/>
+    </dgm:scene3d>
+    <dgm:sp3d/>
+    <dgm:txPr/>
+    <dgm:style>
+      <a:lnRef idx="2">
+        <a:scrgbClr r="0" g="0" b="0"/>
+      </a:lnRef>
+      <a:fillRef idx="1">
+        <a:scrgbClr r="0" g="0" b="0"/>
+      </a:fillRef>
+      <a:effectRef idx="0">
+        <a:scrgbClr r="0" g="0" b="0"/>
+      </a:effectRef>
+      <a:fontRef idx="minor"/>
+    </dgm:style>
+  </dgm:styleLbl>
+  <dgm:styleLbl name="bgAccFollowNode1">
+    <dgm:scene3d>
+      <a:camera prst="orthographicFront"/>
+      <a:lightRig rig="threePt" dir="t"/>
+    </dgm:scene3d>
+    <dgm:sp3d/>
+    <dgm:txPr/>
+    <dgm:style>
+      <a:lnRef idx="2">
+        <a:scrgbClr r="0" g="0" b="0"/>
+      </a:lnRef>
+      <a:fillRef idx="1">
+        <a:scrgbClr r="0" g="0" b="0"/>
+      </a:fillRef>
+      <a:effectRef idx="0">
+        <a:scrgbClr r="0" g="0" b="0"/>
+      </a:effectRef>
+      <a:fontRef idx="minor"/>
+    </dgm:style>
+  </dgm:styleLbl>
+  <dgm:styleLbl name="fgAcc0">
+    <dgm:scene3d>
+      <a:camera prst="orthographicFront"/>
+      <a:lightRig rig="threePt" dir="t"/>
+    </dgm:scene3d>
+    <dgm:sp3d/>
+    <dgm:txPr/>
+    <dgm:style>
+      <a:lnRef idx="2">
+        <a:scrgbClr r="0" g="0" b="0"/>
+      </a:lnRef>
+      <a:fillRef idx="1">
+        <a:scrgbClr r="0" g="0" b="0"/>
+      </a:fillRef>
+      <a:effectRef idx="0">
+        <a:scrgbClr r="0" g="0" b="0"/>
+      </a:effectRef>
+      <a:fontRef idx="minor"/>
+    </dgm:style>
+  </dgm:styleLbl>
+  <dgm:styleLbl name="fgAcc2">
+    <dgm:scene3d>
+      <a:camera prst="orthographicFront"/>
+      <a:lightRig rig="threePt" dir="t"/>
+    </dgm:scene3d>
+    <dgm:sp3d/>
+    <dgm:txPr/>
+    <dgm:style>
+      <a:lnRef idx="2">
+        <a:scrgbClr r="0" g="0" b="0"/>
+      </a:lnRef>
+      <a:fillRef idx="1">
+        <a:scrgbClr r="0" g="0" b="0"/>
+      </a:fillRef>
+      <a:effectRef idx="0">
+        <a:scrgbClr r="0" g="0" b="0"/>
+      </a:effectRef>
+      <a:fontRef idx="minor"/>
+    </dgm:style>
+  </dgm:styleLbl>
+  <dgm:styleLbl name="fgAcc3">
+    <dgm:scene3d>
+      <a:camera prst="orthographicFront"/>
+      <a:lightRig rig="threePt" dir="t"/>
+    </dgm:scene3d>
+    <dgm:sp3d/>
+    <dgm:txPr/>
+    <dgm:style>
+      <a:lnRef idx="2">
+        <a:scrgbClr r="0" g="0" b="0"/>
+      </a:lnRef>
+      <a:fillRef idx="1">
+        <a:scrgbClr r="0" g="0" b="0"/>
+      </a:fillRef>
+      <a:effectRef idx="0">
+        <a:scrgbClr r="0" g="0" b="0"/>
+      </a:effectRef>
+      <a:fontRef idx="minor"/>
+    </dgm:style>
+  </dgm:styleLbl>
+  <dgm:styleLbl name="fgAcc4">
+    <dgm:scene3d>
+      <a:camera prst="orthographicFront"/>
+      <a:lightRig rig="threePt" dir="t"/>
+    </dgm:scene3d>
+    <dgm:sp3d/>
+    <dgm:txPr/>
+    <dgm:style>
+      <a:lnRef idx="2">
+        <a:scrgbClr r="0" g="0" b="0"/>
+      </a:lnRef>
+      <a:fillRef idx="1">
+        <a:scrgbClr r="0" g="0" b="0"/>
+      </a:fillRef>
+      <a:effectRef idx="0">
+        <a:scrgbClr r="0" g="0" b="0"/>
+      </a:effectRef>
+      <a:fontRef idx="minor"/>
+    </dgm:style>
+  </dgm:styleLbl>
+  <dgm:styleLbl name="bgShp">
+    <dgm:scene3d>
+      <a:camera prst="orthographicFront"/>
+      <a:lightRig rig="threePt" dir="t"/>
+    </dgm:scene3d>
+    <dgm:sp3d/>
+    <dgm:txPr/>
+    <dgm:style>
+      <a:lnRef idx="0">
+        <a:scrgbClr r="0" g="0" b="0"/>
+      </a:lnRef>
+      <a:fillRef idx="1">
+        <a:scrgbClr r="0" g="0" b="0"/>
+      </a:fillRef>
+      <a:effectRef idx="0">
+        <a:scrgbClr r="0" g="0" b="0"/>
+      </a:effectRef>
+      <a:fontRef idx="minor"/>
+    </dgm:style>
+  </dgm:styleLbl>
+  <dgm:styleLbl name="dkBgShp">
+    <dgm:scene3d>
+      <a:camera prst="orthographicFront"/>
+      <a:lightRig rig="threePt" dir="t"/>
+    </dgm:scene3d>
+    <dgm:sp3d/>
+    <dgm:txPr/>
+    <dgm:style>
+      <a:lnRef idx="0">
+        <a:scrgbClr r="0" g="0" b="0"/>
+      </a:lnRef>
+      <a:fillRef idx="1">
+        <a:scrgbClr r="0" g="0" b="0"/>
+      </a:fillRef>
+      <a:effectRef idx="0">
+        <a:scrgbClr r="0" g="0" b="0"/>
+      </a:effectRef>
+      <a:fontRef idx="minor"/>
+    </dgm:style>
+  </dgm:styleLbl>
+  <dgm:styleLbl name="trBgShp">
+    <dgm:scene3d>
+      <a:camera prst="orthographicFront"/>
+      <a:lightRig rig="threePt" dir="t"/>
+    </dgm:scene3d>
+    <dgm:sp3d/>
+    <dgm:txPr/>
+    <dgm:style>
+      <a:lnRef idx="0">
+        <a:scrgbClr r="0" g="0" b="0"/>
+      </a:lnRef>
+      <a:fillRef idx="1">
+        <a:scrgbClr r="0" g="0" b="0"/>
+      </a:fillRef>
+      <a:effectRef idx="0">
+        <a:scrgbClr r="0" g="0" b="0"/>
+      </a:effectRef>
+      <a:fontRef idx="minor"/>
+    </dgm:style>
+  </dgm:styleLbl>
+  <dgm:styleLbl name="fgShp">
+    <dgm:scene3d>
+      <a:camera prst="orthographicFront"/>
+      <a:lightRig rig="threePt" dir="t"/>
+    </dgm:scene3d>
+    <dgm:sp3d/>
+    <dgm:txPr/>
+    <dgm:style>
+      <a:lnRef idx="2">
+        <a:scrgbClr r="0" g="0" b="0"/>
+      </a:lnRef>
+      <a:fillRef idx="1">
+        <a:scrgbClr r="0" g="0" b="0"/>
+      </a:fillRef>
+      <a:effectRef idx="0">
+        <a:scrgbClr r="0" g="0" b="0"/>
+      </a:effectRef>
+      <a:fontRef idx="minor"/>
+    </dgm:style>
+  </dgm:styleLbl>
+  <dgm:styleLbl name="revTx">
+    <dgm:scene3d>
+      <a:camera prst="orthographicFront"/>
+      <a:lightRig rig="threePt" dir="t"/>
+    </dgm:scene3d>
+    <dgm:sp3d/>
+    <dgm:txPr/>
+    <dgm:style>
+      <a:lnRef idx="0">
+        <a:scrgbClr r="0" g="0" b="0"/>
+      </a:lnRef>
+      <a:fillRef idx="0">
+        <a:scrgbClr r="0" g="0" b="0"/>
+      </a:fillRef>
+      <a:effectRef idx="0">
+        <a:scrgbClr r="0" g="0" b="0"/>
+      </a:effectRef>
+      <a:fontRef idx="minor"/>
+    </dgm:style>
+  </dgm:styleLbl>
+</dgm:styleDef>
+</file>
+
+<file path=ppt/diagrams/quickStyle2.xml><?xml version="1.0" encoding="utf-8"?>
 <dgm:styleDef xmlns:dgm="http://schemas.openxmlformats.org/drawingml/2006/diagram" xmlns:a="http://schemas.openxmlformats.org/drawingml/2006/main" uniqueId="urn:microsoft.com/office/officeart/2005/8/quickstyle/simple5">
   <dgm:title val=""/>
   <dgm:desc val=""/>
@@ -12712,6 +15211,77 @@
           <a:lstStyle/>
           <a:p>
             <a:r>
+              <a:rPr lang="fr-FR" smtClean="0"/>
+              <a:t>Mélange des cartes :</a:t>
+            </a:r>
+            <a:endParaRPr lang="fr-FR" dirty="0"/>
+          </a:p>
+        </p:txBody>
+      </p:sp>
+      <p:graphicFrame>
+        <p:nvGraphicFramePr>
+          <p:cNvPr id="5" name="Espace réservé du contenu 4"/>
+          <p:cNvGraphicFramePr>
+            <a:graphicFrameLocks noGrp="1"/>
+          </p:cNvGraphicFramePr>
+          <p:nvPr>
+            <p:ph idx="1"/>
+          </p:nvPr>
+        </p:nvGraphicFramePr>
+        <p:xfrm>
+          <a:off x="457200" y="1600200"/>
+          <a:ext cx="8229600" cy="4525963"/>
+        </p:xfrm>
+        <a:graphic>
+          <a:graphicData uri="http://schemas.openxmlformats.org/drawingml/2006/diagram">
+            <dgm:relIds xmlns:dgm="http://schemas.openxmlformats.org/drawingml/2006/diagram" xmlns:r="http://schemas.openxmlformats.org/officeDocument/2006/relationships" r:dm="rId2" r:lo="rId3" r:qs="rId4" r:cs="rId5"/>
+          </a:graphicData>
+        </a:graphic>
+      </p:graphicFrame>
+    </p:spTree>
+  </p:cSld>
+  <p:clrMapOvr>
+    <a:masterClrMapping/>
+  </p:clrMapOvr>
+  <p:transition spd="slow">
+    <p:fade/>
+  </p:transition>
+</p:sld>
+</file>
+
+<file path=ppt/slides/slide18.xml><?xml version="1.0" encoding="utf-8"?>
+<p:sld xmlns:a="http://schemas.openxmlformats.org/drawingml/2006/main" xmlns:r="http://schemas.openxmlformats.org/officeDocument/2006/relationships" xmlns:p="http://schemas.openxmlformats.org/presentationml/2006/main">
+  <p:cSld>
+    <p:spTree>
+      <p:nvGrpSpPr>
+        <p:cNvPr id="1" name=""/>
+        <p:cNvGrpSpPr/>
+        <p:nvPr/>
+      </p:nvGrpSpPr>
+      <p:grpSpPr>
+        <a:xfrm>
+          <a:off x="0" y="0"/>
+          <a:ext cx="0" cy="0"/>
+          <a:chOff x="0" y="0"/>
+          <a:chExt cx="0" cy="0"/>
+        </a:xfrm>
+      </p:grpSpPr>
+      <p:sp>
+        <p:nvSpPr>
+          <p:cNvPr id="2" name="Titre 1"/>
+          <p:cNvSpPr>
+            <a:spLocks noGrp="1"/>
+          </p:cNvSpPr>
+          <p:nvPr>
+            <p:ph type="title"/>
+          </p:nvPr>
+        </p:nvSpPr>
+        <p:spPr/>
+        <p:txBody>
+          <a:bodyPr/>
+          <a:lstStyle/>
+          <a:p>
+            <a:r>
               <a:rPr lang="fr-FR" dirty="0" smtClean="0"/>
               <a:t>Un design sobre et soigné :</a:t>
             </a:r>
@@ -12828,7 +15398,7 @@
 </p:sld>
 </file>
 
-<file path=ppt/slides/slide18.xml><?xml version="1.0" encoding="utf-8"?>
+<file path=ppt/slides/slide19.xml><?xml version="1.0" encoding="utf-8"?>
 <p:sld xmlns:a="http://schemas.openxmlformats.org/drawingml/2006/main" xmlns:r="http://schemas.openxmlformats.org/officeDocument/2006/relationships" xmlns:p="http://schemas.openxmlformats.org/presentationml/2006/main">
   <p:cSld>
     <p:spTree>
@@ -12898,11 +15468,7 @@
           <a:p>
             <a:r>
               <a:rPr lang="fr-FR" dirty="0" smtClean="0"/>
-              <a:t>‘m’ </a:t>
-            </a:r>
-            <a:r>
-              <a:rPr lang="fr-FR" dirty="0" smtClean="0"/>
-              <a:t>pour le menu</a:t>
+              <a:t>‘m’ pour le menu</a:t>
             </a:r>
           </a:p>
           <a:p>
@@ -12942,84 +15508,9 @@
               <a:rPr lang="nl-NL" dirty="0" smtClean="0"/>
               <a:t> jeu</a:t>
             </a:r>
-            <a:endParaRPr lang="nl-NL" dirty="0" smtClean="0"/>
           </a:p>
         </p:txBody>
       </p:sp>
-    </p:spTree>
-  </p:cSld>
-  <p:clrMapOvr>
-    <a:masterClrMapping/>
-  </p:clrMapOvr>
-  <p:transition spd="slow">
-    <p:fade/>
-  </p:transition>
-</p:sld>
-</file>
-
-<file path=ppt/slides/slide19.xml><?xml version="1.0" encoding="utf-8"?>
-<p:sld xmlns:a="http://schemas.openxmlformats.org/drawingml/2006/main" xmlns:r="http://schemas.openxmlformats.org/officeDocument/2006/relationships" xmlns:p="http://schemas.openxmlformats.org/presentationml/2006/main">
-  <p:cSld>
-    <p:spTree>
-      <p:nvGrpSpPr>
-        <p:cNvPr id="1" name=""/>
-        <p:cNvGrpSpPr/>
-        <p:nvPr/>
-      </p:nvGrpSpPr>
-      <p:grpSpPr>
-        <a:xfrm>
-          <a:off x="0" y="0"/>
-          <a:ext cx="0" cy="0"/>
-          <a:chOff x="0" y="0"/>
-          <a:chExt cx="0" cy="0"/>
-        </a:xfrm>
-      </p:grpSpPr>
-      <p:sp>
-        <p:nvSpPr>
-          <p:cNvPr id="2" name="Titre 1"/>
-          <p:cNvSpPr>
-            <a:spLocks noGrp="1"/>
-          </p:cNvSpPr>
-          <p:nvPr>
-            <p:ph type="title"/>
-          </p:nvPr>
-        </p:nvSpPr>
-        <p:spPr/>
-        <p:txBody>
-          <a:bodyPr/>
-          <a:lstStyle/>
-          <a:p>
-            <a:r>
-              <a:rPr lang="fr-FR" dirty="0" smtClean="0"/>
-              <a:t>Une partie… en Anglais :</a:t>
-            </a:r>
-            <a:endParaRPr lang="fr-FR" dirty="0"/>
-          </a:p>
-        </p:txBody>
-      </p:sp>
-      <p:pic>
-        <p:nvPicPr>
-          <p:cNvPr id="4" name="Espace réservé du contenu 3" descr="english.png"/>
-          <p:cNvPicPr>
-            <a:picLocks noGrp="1" noChangeAspect="1"/>
-          </p:cNvPicPr>
-          <p:nvPr>
-            <p:ph idx="1"/>
-          </p:nvPr>
-        </p:nvPicPr>
-        <p:blipFill>
-          <a:blip r:embed="rId2"/>
-          <a:stretch>
-            <a:fillRect/>
-          </a:stretch>
-        </p:blipFill>
-        <p:spPr>
-          <a:xfrm>
-            <a:off x="1636086" y="1600200"/>
-            <a:ext cx="5871827" cy="4525963"/>
-          </a:xfrm>
-        </p:spPr>
-      </p:pic>
     </p:spTree>
   </p:cSld>
   <p:clrMapOvr>
@@ -13190,6 +15681,80 @@
         </p:nvSpPr>
         <p:spPr/>
         <p:txBody>
+          <a:bodyPr/>
+          <a:lstStyle/>
+          <a:p>
+            <a:r>
+              <a:rPr lang="fr-FR" dirty="0" smtClean="0"/>
+              <a:t>Une partie… en Anglais :</a:t>
+            </a:r>
+            <a:endParaRPr lang="fr-FR" dirty="0"/>
+          </a:p>
+        </p:txBody>
+      </p:sp>
+      <p:pic>
+        <p:nvPicPr>
+          <p:cNvPr id="4" name="Espace réservé du contenu 3" descr="english.png"/>
+          <p:cNvPicPr>
+            <a:picLocks noGrp="1" noChangeAspect="1"/>
+          </p:cNvPicPr>
+          <p:nvPr>
+            <p:ph idx="1"/>
+          </p:nvPr>
+        </p:nvPicPr>
+        <p:blipFill>
+          <a:blip r:embed="rId2"/>
+          <a:stretch>
+            <a:fillRect/>
+          </a:stretch>
+        </p:blipFill>
+        <p:spPr>
+          <a:xfrm>
+            <a:off x="1636086" y="1600200"/>
+            <a:ext cx="5871827" cy="4525963"/>
+          </a:xfrm>
+        </p:spPr>
+      </p:pic>
+    </p:spTree>
+  </p:cSld>
+  <p:clrMapOvr>
+    <a:masterClrMapping/>
+  </p:clrMapOvr>
+  <p:transition spd="slow">
+    <p:fade/>
+  </p:transition>
+</p:sld>
+</file>
+
+<file path=ppt/slides/slide21.xml><?xml version="1.0" encoding="utf-8"?>
+<p:sld xmlns:a="http://schemas.openxmlformats.org/drawingml/2006/main" xmlns:r="http://schemas.openxmlformats.org/officeDocument/2006/relationships" xmlns:p="http://schemas.openxmlformats.org/presentationml/2006/main">
+  <p:cSld>
+    <p:spTree>
+      <p:nvGrpSpPr>
+        <p:cNvPr id="1" name=""/>
+        <p:cNvGrpSpPr/>
+        <p:nvPr/>
+      </p:nvGrpSpPr>
+      <p:grpSpPr>
+        <a:xfrm>
+          <a:off x="0" y="0"/>
+          <a:ext cx="0" cy="0"/>
+          <a:chOff x="0" y="0"/>
+          <a:chExt cx="0" cy="0"/>
+        </a:xfrm>
+      </p:grpSpPr>
+      <p:sp>
+        <p:nvSpPr>
+          <p:cNvPr id="2" name="Titre 1"/>
+          <p:cNvSpPr>
+            <a:spLocks noGrp="1"/>
+          </p:cNvSpPr>
+          <p:nvPr>
+            <p:ph type="title"/>
+          </p:nvPr>
+        </p:nvSpPr>
+        <p:spPr/>
+        <p:txBody>
           <a:bodyPr>
             <a:normAutofit fontScale="90000"/>
           </a:bodyPr>
@@ -13273,7 +15838,7 @@
 </p:sld>
 </file>
 
-<file path=ppt/slides/slide21.xml><?xml version="1.0" encoding="utf-8"?>
+<file path=ppt/slides/slide22.xml><?xml version="1.0" encoding="utf-8"?>
 <p:sld xmlns:a="http://schemas.openxmlformats.org/drawingml/2006/main" xmlns:r="http://schemas.openxmlformats.org/officeDocument/2006/relationships" xmlns:p="http://schemas.openxmlformats.org/presentationml/2006/main">
   <p:cSld>
     <p:spTree>
@@ -13413,7 +15978,7 @@
 </p:sld>
 </file>
 
-<file path=ppt/slides/slide22.xml><?xml version="1.0" encoding="utf-8"?>
+<file path=ppt/slides/slide23.xml><?xml version="1.0" encoding="utf-8"?>
 <p:sld xmlns:a="http://schemas.openxmlformats.org/drawingml/2006/main" xmlns:r="http://schemas.openxmlformats.org/officeDocument/2006/relationships" xmlns:p="http://schemas.openxmlformats.org/presentationml/2006/main">
   <p:cSld>
     <p:spTree>
@@ -13509,21 +16074,13 @@
           <a:p>
             <a:r>
               <a:rPr lang="fr-FR" dirty="0" smtClean="0"/>
-              <a:t>Programmer un affichage graphique en </a:t>
-            </a:r>
-            <a:r>
-              <a:rPr lang="fr-FR" dirty="0" smtClean="0"/>
-              <a:t>C</a:t>
-            </a:r>
-          </a:p>
-          <a:p>
-            <a:r>
-              <a:rPr lang="fr-FR" dirty="0" smtClean="0"/>
-              <a:t>Utilisation </a:t>
-            </a:r>
-            <a:r>
-              <a:rPr lang="fr-FR" dirty="0" smtClean="0"/>
-              <a:t>du </a:t>
+              <a:t>Programmer un affichage graphique en C</a:t>
+            </a:r>
+          </a:p>
+          <a:p>
+            <a:r>
+              <a:rPr lang="fr-FR" dirty="0" smtClean="0"/>
+              <a:t>Utilisation du </a:t>
             </a:r>
             <a:r>
               <a:rPr lang="fr-FR" dirty="0" err="1" smtClean="0"/>

</xml_diff>

<commit_message>
maj de la Presentation.pptx
</commit_message>
<xml_diff>
--- a/Annexes/Presentation.pptx
+++ b/Annexes/Presentation.pptx
@@ -1702,7 +1702,11 @@
         <a:p>
           <a:r>
             <a:rPr lang="fr-FR" dirty="0" smtClean="0"/>
-            <a:t>Tableau de 52 cartes dans l’ordre</a:t>
+            <a:t>Tableau de </a:t>
+          </a:r>
+          <a:r>
+            <a:rPr lang="fr-FR" dirty="0" smtClean="0"/>
+            <a:t>n cartes ordonnées</a:t>
           </a:r>
           <a:endParaRPr lang="fr-FR" dirty="0"/>
         </a:p>
@@ -1836,7 +1840,11 @@
         <a:p>
           <a:r>
             <a:rPr lang="fr-FR" dirty="0" smtClean="0"/>
-            <a:t>Distribution puis déplacement à la fin du tableau </a:t>
+            <a:t>Déplacement de la carte à la fin </a:t>
+          </a:r>
+          <a:r>
+            <a:rPr lang="fr-FR" dirty="0" smtClean="0"/>
+            <a:t>du tableau </a:t>
           </a:r>
           <a:endParaRPr lang="fr-FR" dirty="0"/>
         </a:p>
@@ -1903,11 +1911,19 @@
         <a:p>
           <a:r>
             <a:rPr lang="fr-FR" dirty="0" smtClean="0"/>
-            <a:t>Décrémentation  d’une variable </a:t>
+            <a:t>Décrémentation  </a:t>
           </a:r>
           <a:r>
-            <a:rPr lang="fr-FR" dirty="0" err="1" smtClean="0"/>
-            <a:t>TailleTableau</a:t>
+            <a:rPr lang="fr-FR" dirty="0" smtClean="0"/>
+            <a:t>de la </a:t>
+          </a:r>
+          <a:r>
+            <a:rPr lang="fr-FR" dirty="0" smtClean="0"/>
+            <a:t>variable </a:t>
+          </a:r>
+          <a:r>
+            <a:rPr lang="fr-FR" dirty="0" smtClean="0"/>
+            <a:t>n</a:t>
           </a:r>
           <a:endParaRPr lang="fr-FR" dirty="0"/>
         </a:p>
@@ -2025,6 +2041,13 @@
         </dgm:presLayoutVars>
       </dgm:prSet>
       <dgm:spPr/>
+      <dgm:t>
+        <a:bodyPr/>
+        <a:lstStyle/>
+        <a:p>
+          <a:endParaRPr lang="fr-FR"/>
+        </a:p>
+      </dgm:t>
     </dgm:pt>
     <dgm:pt modelId="{DD88AB64-0DBB-4E44-B6BD-33E9D9A59330}" type="pres">
       <dgm:prSet presAssocID="{F9157FC7-84AD-4A5A-89B0-B470B45FE340}" presName="node" presStyleLbl="node1" presStyleIdx="0" presStyleCnt="5">
@@ -2048,6 +2071,13 @@
     <dgm:pt modelId="{A656F961-90F8-4D1C-ACF3-C7AA4E2A906F}" type="pres">
       <dgm:prSet presAssocID="{28B3AD9D-1F61-403D-A9A4-E2EBE7C7A1E5}" presName="sibTrans" presStyleLbl="sibTrans1D1" presStyleIdx="0" presStyleCnt="5"/>
       <dgm:spPr/>
+      <dgm:t>
+        <a:bodyPr/>
+        <a:lstStyle/>
+        <a:p>
+          <a:endParaRPr lang="fr-FR"/>
+        </a:p>
+      </dgm:t>
     </dgm:pt>
     <dgm:pt modelId="{33F7A666-D047-42A1-B42B-0BE6F20751F6}" type="pres">
       <dgm:prSet presAssocID="{62041C44-F7ED-4163-B711-9ACF87A53496}" presName="node" presStyleLbl="node1" presStyleIdx="1" presStyleCnt="5">
@@ -2071,6 +2101,13 @@
     <dgm:pt modelId="{F56EE369-719E-45A8-A097-B270961B21A0}" type="pres">
       <dgm:prSet presAssocID="{F7DCD137-ACA9-4AE4-87CB-2EA1504660D9}" presName="sibTrans" presStyleLbl="sibTrans1D1" presStyleIdx="1" presStyleCnt="5"/>
       <dgm:spPr/>
+      <dgm:t>
+        <a:bodyPr/>
+        <a:lstStyle/>
+        <a:p>
+          <a:endParaRPr lang="fr-FR"/>
+        </a:p>
+      </dgm:t>
     </dgm:pt>
     <dgm:pt modelId="{DB401924-68DF-41B9-8F4C-A9BCAD74108A}" type="pres">
       <dgm:prSet presAssocID="{77CEC789-368A-4D46-AB7C-1677E57DB778}" presName="node" presStyleLbl="node1" presStyleIdx="2" presStyleCnt="5">
@@ -2094,6 +2131,13 @@
     <dgm:pt modelId="{C8A54F2D-48C1-4CF4-942A-773E8EE11BB2}" type="pres">
       <dgm:prSet presAssocID="{A2867DC0-2D3B-408F-82C0-C5AC9AC675CE}" presName="sibTrans" presStyleLbl="sibTrans1D1" presStyleIdx="2" presStyleCnt="5"/>
       <dgm:spPr/>
+      <dgm:t>
+        <a:bodyPr/>
+        <a:lstStyle/>
+        <a:p>
+          <a:endParaRPr lang="fr-FR"/>
+        </a:p>
+      </dgm:t>
     </dgm:pt>
     <dgm:pt modelId="{D5BEFD69-E139-4D86-96AF-8995FC63B8ED}" type="pres">
       <dgm:prSet presAssocID="{6CB93919-E534-4C63-916A-2E41E9893E4A}" presName="node" presStyleLbl="node1" presStyleIdx="3" presStyleCnt="5">
@@ -2117,6 +2161,13 @@
     <dgm:pt modelId="{5F61474C-8E73-46EE-AA24-6F557D36EAB3}" type="pres">
       <dgm:prSet presAssocID="{C8D8DC83-6244-4770-A039-3062F81C1A32}" presName="sibTrans" presStyleLbl="sibTrans1D1" presStyleIdx="3" presStyleCnt="5"/>
       <dgm:spPr/>
+      <dgm:t>
+        <a:bodyPr/>
+        <a:lstStyle/>
+        <a:p>
+          <a:endParaRPr lang="fr-FR"/>
+        </a:p>
+      </dgm:t>
     </dgm:pt>
     <dgm:pt modelId="{0469E915-6954-449E-B902-025699F471A4}" type="pres">
       <dgm:prSet presAssocID="{C931E3FF-FE6C-40FB-9ADB-17CCC7BB756E}" presName="node" presStyleLbl="node1" presStyleIdx="4" presStyleCnt="5">
@@ -2125,6 +2176,13 @@
         </dgm:presLayoutVars>
       </dgm:prSet>
       <dgm:spPr/>
+      <dgm:t>
+        <a:bodyPr/>
+        <a:lstStyle/>
+        <a:p>
+          <a:endParaRPr lang="fr-FR"/>
+        </a:p>
+      </dgm:t>
     </dgm:pt>
     <dgm:pt modelId="{F11DEAF9-E987-4B6A-966B-0AA6F5A63DE8}" type="pres">
       <dgm:prSet presAssocID="{C931E3FF-FE6C-40FB-9ADB-17CCC7BB756E}" presName="spNode" presStyleCnt="0"/>
@@ -2133,16 +2191,23 @@
     <dgm:pt modelId="{7EF6D4C4-1AB7-47F5-A6BF-59A11497289A}" type="pres">
       <dgm:prSet presAssocID="{DF5F10F2-37F6-4150-B7B4-669743D6E2CB}" presName="sibTrans" presStyleLbl="sibTrans1D1" presStyleIdx="4" presStyleCnt="5"/>
       <dgm:spPr/>
+      <dgm:t>
+        <a:bodyPr/>
+        <a:lstStyle/>
+        <a:p>
+          <a:endParaRPr lang="fr-FR"/>
+        </a:p>
+      </dgm:t>
     </dgm:pt>
   </dgm:ptLst>
   <dgm:cxnLst>
     <dgm:cxn modelId="{22079A04-213A-4BF5-A000-29C28BE36417}" srcId="{3F916644-2E8A-4B6F-B43F-2D0046B6A616}" destId="{77CEC789-368A-4D46-AB7C-1677E57DB778}" srcOrd="2" destOrd="0" parTransId="{3D264AD8-531C-4F6D-839A-FF11493F6666}" sibTransId="{A2867DC0-2D3B-408F-82C0-C5AC9AC675CE}"/>
     <dgm:cxn modelId="{1CAE3C04-2D9E-440B-A9A1-FEFA96952151}" type="presOf" srcId="{28B3AD9D-1F61-403D-A9A4-E2EBE7C7A1E5}" destId="{A656F961-90F8-4D1C-ACF3-C7AA4E2A906F}" srcOrd="0" destOrd="0" presId="urn:microsoft.com/office/officeart/2005/8/layout/cycle5"/>
     <dgm:cxn modelId="{E3CA786E-EFDA-425C-B770-C82B1219985E}" type="presOf" srcId="{DF5F10F2-37F6-4150-B7B4-669743D6E2CB}" destId="{7EF6D4C4-1AB7-47F5-A6BF-59A11497289A}" srcOrd="0" destOrd="0" presId="urn:microsoft.com/office/officeart/2005/8/layout/cycle5"/>
+    <dgm:cxn modelId="{E3C8A356-DBF7-47AC-B8A2-7A20594538D4}" type="presOf" srcId="{C8D8DC83-6244-4770-A039-3062F81C1A32}" destId="{5F61474C-8E73-46EE-AA24-6F557D36EAB3}" srcOrd="0" destOrd="0" presId="urn:microsoft.com/office/officeart/2005/8/layout/cycle5"/>
     <dgm:cxn modelId="{EF0E6E7B-69AD-41CD-B7A2-75A4749998CA}" type="presOf" srcId="{62041C44-F7ED-4163-B711-9ACF87A53496}" destId="{33F7A666-D047-42A1-B42B-0BE6F20751F6}" srcOrd="0" destOrd="0" presId="urn:microsoft.com/office/officeart/2005/8/layout/cycle5"/>
-    <dgm:cxn modelId="{E3C8A356-DBF7-47AC-B8A2-7A20594538D4}" type="presOf" srcId="{C8D8DC83-6244-4770-A039-3062F81C1A32}" destId="{5F61474C-8E73-46EE-AA24-6F557D36EAB3}" srcOrd="0" destOrd="0" presId="urn:microsoft.com/office/officeart/2005/8/layout/cycle5"/>
+    <dgm:cxn modelId="{1C0955C2-BDF8-4617-88E8-46862598863E}" type="presOf" srcId="{A2867DC0-2D3B-408F-82C0-C5AC9AC675CE}" destId="{C8A54F2D-48C1-4CF4-942A-773E8EE11BB2}" srcOrd="0" destOrd="0" presId="urn:microsoft.com/office/officeart/2005/8/layout/cycle5"/>
     <dgm:cxn modelId="{AC17F962-FED8-4E0F-ADB7-F2F21B0DD40F}" type="presOf" srcId="{6CB93919-E534-4C63-916A-2E41E9893E4A}" destId="{D5BEFD69-E139-4D86-96AF-8995FC63B8ED}" srcOrd="0" destOrd="0" presId="urn:microsoft.com/office/officeart/2005/8/layout/cycle5"/>
-    <dgm:cxn modelId="{1C0955C2-BDF8-4617-88E8-46862598863E}" type="presOf" srcId="{A2867DC0-2D3B-408F-82C0-C5AC9AC675CE}" destId="{C8A54F2D-48C1-4CF4-942A-773E8EE11BB2}" srcOrd="0" destOrd="0" presId="urn:microsoft.com/office/officeart/2005/8/layout/cycle5"/>
     <dgm:cxn modelId="{EEB427CF-17CD-4180-8A71-15A697526EAF}" srcId="{3F916644-2E8A-4B6F-B43F-2D0046B6A616}" destId="{F9157FC7-84AD-4A5A-89B0-B470B45FE340}" srcOrd="0" destOrd="0" parTransId="{C4B0C759-895F-452F-8A61-AD2A745AC964}" sibTransId="{28B3AD9D-1F61-403D-A9A4-E2EBE7C7A1E5}"/>
     <dgm:cxn modelId="{36C6DF58-5391-41E2-ADF6-3E84B0182830}" type="presOf" srcId="{C931E3FF-FE6C-40FB-9ADB-17CCC7BB756E}" destId="{0469E915-6954-449E-B902-025699F471A4}" srcOrd="0" destOrd="0" presId="urn:microsoft.com/office/officeart/2005/8/layout/cycle5"/>
     <dgm:cxn modelId="{8CB48232-564B-4594-AE6C-098E9C159B2E}" type="presOf" srcId="{77CEC789-368A-4D46-AB7C-1677E57DB778}" destId="{DB401924-68DF-41B9-8F4C-A9BCAD74108A}" srcOrd="0" destOrd="0" presId="urn:microsoft.com/office/officeart/2005/8/layout/cycle5"/>
@@ -15450,31 +15515,38 @@
         </p:nvSpPr>
         <p:spPr/>
         <p:txBody>
-          <a:bodyPr/>
+          <a:bodyPr>
+            <a:normAutofit fontScale="92500" lnSpcReduction="20000"/>
+          </a:bodyPr>
           <a:lstStyle/>
           <a:p>
-            <a:pPr algn="just">
-              <a:buNone/>
-            </a:pPr>
-            <a:r>
-              <a:rPr lang="fr-FR" dirty="0" smtClean="0"/>
-              <a:t>		</a:t>
-            </a:r>
-            <a:r>
-              <a:rPr lang="fr-FR" u="sng" dirty="0" smtClean="0"/>
-              <a:t>En cours de partie, il est possible d’accéder directement à un endroit en cliquant tout simplement sur :</a:t>
-            </a:r>
-          </a:p>
-          <a:p>
-            <a:r>
-              <a:rPr lang="fr-FR" dirty="0" smtClean="0"/>
-              <a:t>‘m’ pour le menu</a:t>
-            </a:r>
+            <a:pPr algn="just"/>
+            <a:r>
+              <a:rPr lang="fr-FR" dirty="0" smtClean="0"/>
+              <a:t>&lt;m&gt; </a:t>
+            </a:r>
+            <a:r>
+              <a:rPr lang="fr-FR" dirty="0" smtClean="0"/>
+              <a:t>pour le </a:t>
+            </a:r>
+            <a:r>
+              <a:rPr lang="fr-FR" dirty="0" smtClean="0"/>
+              <a:t>menu , &lt;</a:t>
+            </a:r>
+            <a:r>
+              <a:rPr lang="fr-FR" dirty="0" err="1" smtClean="0"/>
+              <a:t>Echap</a:t>
+            </a:r>
+            <a:r>
+              <a:rPr lang="fr-FR" dirty="0" smtClean="0"/>
+              <a:t>&gt; pour en sortir</a:t>
+            </a:r>
+            <a:endParaRPr lang="fr-FR" dirty="0" smtClean="0"/>
           </a:p>
           <a:p>
             <a:r>
               <a:rPr lang="nl-NL" dirty="0" smtClean="0"/>
-              <a:t>‘</a:t>
+              <a:t>&lt;</a:t>
             </a:r>
             <a:r>
               <a:rPr lang="nl-NL" dirty="0" err="1" smtClean="0"/>
@@ -15482,7 +15554,19 @@
             </a:r>
             <a:r>
               <a:rPr lang="nl-NL" dirty="0" smtClean="0"/>
-              <a:t>’ </a:t>
+              <a:t>&gt;</a:t>
+            </a:r>
+            <a:r>
+              <a:rPr lang="nl-NL" dirty="0" smtClean="0"/>
+              <a:t> en cours de </a:t>
+            </a:r>
+            <a:r>
+              <a:rPr lang="nl-NL" dirty="0" err="1" smtClean="0"/>
+              <a:t>partie</a:t>
+            </a:r>
+            <a:r>
+              <a:rPr lang="nl-NL" dirty="0" smtClean="0"/>
+              <a:t> </a:t>
             </a:r>
             <a:r>
               <a:rPr lang="nl-NL" dirty="0" err="1" smtClean="0"/>
@@ -15506,8 +15590,249 @@
             </a:r>
             <a:r>
               <a:rPr lang="nl-NL" dirty="0" smtClean="0"/>
-              <a:t> jeu</a:t>
-            </a:r>
+              <a:t> </a:t>
+            </a:r>
+            <a:r>
+              <a:rPr lang="nl-NL" dirty="0" smtClean="0"/>
+              <a:t>jeu</a:t>
+            </a:r>
+          </a:p>
+          <a:p>
+            <a:r>
+              <a:rPr lang="nl-NL" dirty="0" err="1" smtClean="0"/>
+              <a:t>Clic</a:t>
+            </a:r>
+            <a:r>
+              <a:rPr lang="nl-NL" dirty="0" smtClean="0"/>
+              <a:t> </a:t>
+            </a:r>
+            <a:r>
+              <a:rPr lang="nl-NL" dirty="0" err="1" smtClean="0"/>
+              <a:t>gauche</a:t>
+            </a:r>
+            <a:r>
+              <a:rPr lang="nl-NL" dirty="0" smtClean="0"/>
+              <a:t> </a:t>
+            </a:r>
+            <a:r>
+              <a:rPr lang="nl-NL" dirty="0" err="1" smtClean="0"/>
+              <a:t>pour</a:t>
+            </a:r>
+            <a:r>
+              <a:rPr lang="nl-NL" dirty="0" smtClean="0"/>
+              <a:t> </a:t>
+            </a:r>
+            <a:r>
+              <a:rPr lang="nl-NL" dirty="0" err="1" smtClean="0"/>
+              <a:t>poursuivre</a:t>
+            </a:r>
+            <a:r>
+              <a:rPr lang="nl-NL" dirty="0" smtClean="0"/>
+              <a:t> </a:t>
+            </a:r>
+            <a:r>
+              <a:rPr lang="nl-NL" dirty="0" err="1" smtClean="0"/>
+              <a:t>le</a:t>
+            </a:r>
+            <a:r>
+              <a:rPr lang="nl-NL" dirty="0" smtClean="0"/>
+              <a:t> </a:t>
+            </a:r>
+            <a:r>
+              <a:rPr lang="nl-NL" dirty="0" err="1" smtClean="0"/>
+              <a:t>déroulement</a:t>
+            </a:r>
+            <a:r>
+              <a:rPr lang="nl-NL" dirty="0" smtClean="0"/>
+              <a:t> de la </a:t>
+            </a:r>
+            <a:r>
+              <a:rPr lang="nl-NL" dirty="0" err="1" smtClean="0"/>
+              <a:t>partie</a:t>
+            </a:r>
+            <a:r>
+              <a:rPr lang="nl-NL" dirty="0" smtClean="0"/>
+              <a:t> à la fin </a:t>
+            </a:r>
+            <a:r>
+              <a:rPr lang="nl-NL" dirty="0" err="1" smtClean="0"/>
+              <a:t>d’une</a:t>
+            </a:r>
+            <a:r>
+              <a:rPr lang="nl-NL" dirty="0" smtClean="0"/>
+              <a:t> manche</a:t>
+            </a:r>
+          </a:p>
+          <a:p>
+            <a:r>
+              <a:rPr lang="nl-NL" dirty="0" err="1" smtClean="0"/>
+              <a:t>Clic</a:t>
+            </a:r>
+            <a:r>
+              <a:rPr lang="nl-NL" dirty="0" smtClean="0"/>
+              <a:t> sur </a:t>
+            </a:r>
+            <a:r>
+              <a:rPr lang="nl-NL" dirty="0" err="1" smtClean="0"/>
+              <a:t>credits</a:t>
+            </a:r>
+            <a:r>
+              <a:rPr lang="nl-NL" dirty="0" smtClean="0"/>
+              <a:t> dans </a:t>
+            </a:r>
+            <a:r>
+              <a:rPr lang="nl-NL" dirty="0" err="1" smtClean="0"/>
+              <a:t>le</a:t>
+            </a:r>
+            <a:r>
+              <a:rPr lang="nl-NL" dirty="0" smtClean="0"/>
+              <a:t> menu : affiche les </a:t>
+            </a:r>
+            <a:r>
+              <a:rPr lang="nl-NL" dirty="0" err="1" smtClean="0"/>
+              <a:t>crédits</a:t>
+            </a:r>
+            <a:r>
+              <a:rPr lang="nl-NL" dirty="0" smtClean="0"/>
+              <a:t> dans la console</a:t>
+            </a:r>
+          </a:p>
+          <a:p>
+            <a:r>
+              <a:rPr lang="nl-NL" dirty="0" err="1" smtClean="0"/>
+              <a:t>Fichier</a:t>
+            </a:r>
+            <a:r>
+              <a:rPr lang="nl-NL" dirty="0" smtClean="0"/>
+              <a:t> </a:t>
+            </a:r>
+            <a:r>
+              <a:rPr lang="nl-NL" dirty="0" err="1" smtClean="0"/>
+              <a:t>config</a:t>
+            </a:r>
+            <a:r>
+              <a:rPr lang="nl-NL" dirty="0" smtClean="0"/>
+              <a:t> :</a:t>
+            </a:r>
+          </a:p>
+          <a:p>
+            <a:pPr lvl="1"/>
+            <a:r>
+              <a:rPr lang="nl-NL" dirty="0" smtClean="0"/>
+              <a:t>1</a:t>
+            </a:r>
+            <a:r>
+              <a:rPr lang="nl-NL" baseline="30000" dirty="0" smtClean="0"/>
+              <a:t>ere</a:t>
+            </a:r>
+            <a:r>
+              <a:rPr lang="nl-NL" dirty="0" smtClean="0"/>
+              <a:t> </a:t>
+            </a:r>
+            <a:r>
+              <a:rPr lang="nl-NL" dirty="0" err="1" smtClean="0"/>
+              <a:t>ligne</a:t>
+            </a:r>
+            <a:r>
+              <a:rPr lang="nl-NL" dirty="0" smtClean="0"/>
+              <a:t> : ‘f’ </a:t>
+            </a:r>
+            <a:r>
+              <a:rPr lang="nl-NL" dirty="0" err="1" smtClean="0"/>
+              <a:t>pour</a:t>
+            </a:r>
+            <a:r>
+              <a:rPr lang="nl-NL" dirty="0" smtClean="0"/>
+              <a:t> francais, ‘e’ </a:t>
+            </a:r>
+            <a:r>
+              <a:rPr lang="nl-NL" dirty="0" err="1" smtClean="0"/>
+              <a:t>pour</a:t>
+            </a:r>
+            <a:r>
+              <a:rPr lang="nl-NL" dirty="0" smtClean="0"/>
+              <a:t> </a:t>
+            </a:r>
+            <a:r>
+              <a:rPr lang="nl-NL" dirty="0" err="1" smtClean="0"/>
+              <a:t>anglais</a:t>
+            </a:r>
+            <a:endParaRPr lang="nl-NL" dirty="0" smtClean="0"/>
+          </a:p>
+          <a:p>
+            <a:pPr lvl="1"/>
+            <a:r>
+              <a:rPr lang="nl-NL" dirty="0" smtClean="0"/>
+              <a:t>2</a:t>
+            </a:r>
+            <a:r>
+              <a:rPr lang="nl-NL" baseline="30000" dirty="0" smtClean="0"/>
+              <a:t>e</a:t>
+            </a:r>
+            <a:r>
+              <a:rPr lang="nl-NL" dirty="0" smtClean="0"/>
+              <a:t> </a:t>
+            </a:r>
+            <a:r>
+              <a:rPr lang="nl-NL" dirty="0" err="1" smtClean="0"/>
+              <a:t>ligne</a:t>
+            </a:r>
+            <a:r>
+              <a:rPr lang="nl-NL" dirty="0" smtClean="0"/>
+              <a:t> : </a:t>
+            </a:r>
+            <a:r>
+              <a:rPr lang="nl-NL" dirty="0" err="1" smtClean="0"/>
+              <a:t>nombre</a:t>
+            </a:r>
+            <a:r>
+              <a:rPr lang="nl-NL" dirty="0" smtClean="0"/>
+              <a:t> de </a:t>
+            </a:r>
+            <a:r>
+              <a:rPr lang="nl-NL" dirty="0" err="1" smtClean="0"/>
+              <a:t>joueur</a:t>
+            </a:r>
+            <a:r>
+              <a:rPr lang="nl-NL" dirty="0" smtClean="0"/>
+              <a:t> en plus de 1 à 7</a:t>
+            </a:r>
+          </a:p>
+          <a:p>
+            <a:pPr lvl="1"/>
+            <a:r>
+              <a:rPr lang="nl-NL" dirty="0" smtClean="0"/>
+              <a:t>3</a:t>
+            </a:r>
+            <a:r>
+              <a:rPr lang="nl-NL" baseline="30000" dirty="0" smtClean="0"/>
+              <a:t>e</a:t>
+            </a:r>
+            <a:r>
+              <a:rPr lang="nl-NL" dirty="0" smtClean="0"/>
+              <a:t> </a:t>
+            </a:r>
+            <a:r>
+              <a:rPr lang="nl-NL" dirty="0" err="1" smtClean="0"/>
+              <a:t>ligne</a:t>
+            </a:r>
+            <a:r>
+              <a:rPr lang="nl-NL" dirty="0" smtClean="0"/>
+              <a:t> : </a:t>
+            </a:r>
+            <a:r>
+              <a:rPr lang="nl-NL" dirty="0" err="1" smtClean="0"/>
+              <a:t>argent</a:t>
+            </a:r>
+            <a:r>
+              <a:rPr lang="nl-NL" dirty="0" smtClean="0"/>
+              <a:t> de </a:t>
+            </a:r>
+            <a:r>
+              <a:rPr lang="nl-NL" smtClean="0"/>
+              <a:t>départ</a:t>
+            </a:r>
+            <a:endParaRPr lang="nl-NL" dirty="0" smtClean="0"/>
           </a:p>
         </p:txBody>
       </p:sp>
@@ -15686,7 +16011,11 @@
           <a:p>
             <a:r>
               <a:rPr lang="fr-FR" dirty="0" smtClean="0"/>
-              <a:t>Une partie… en Anglais :</a:t>
+              <a:t>Une partie… </a:t>
+            </a:r>
+            <a:r>
+              <a:rPr lang="fr-FR" dirty="0" smtClean="0"/>
+              <a:t>in English :</a:t>
             </a:r>
             <a:endParaRPr lang="fr-FR" dirty="0"/>
           </a:p>
@@ -15710,9 +16039,22 @@
         </p:blipFill>
         <p:spPr>
           <a:xfrm>
-            <a:off x="1636086" y="1600200"/>
+            <a:off x="1643042" y="1428736"/>
             <a:ext cx="5871827" cy="4525963"/>
           </a:xfrm>
+          <a:prstGeom prst="rect">
+            <a:avLst/>
+          </a:prstGeom>
+          <a:ln>
+            <a:noFill/>
+          </a:ln>
+          <a:effectLst>
+            <a:outerShdw blurRad="292100" dist="139700" dir="2700000" algn="tl" rotWithShape="0">
+              <a:srgbClr val="333333">
+                <a:alpha val="65000"/>
+              </a:srgbClr>
+            </a:outerShdw>
+          </a:effectLst>
         </p:spPr>
       </p:pic>
     </p:spTree>
@@ -16083,8 +16425,8 @@
               <a:t>Utilisation du </a:t>
             </a:r>
             <a:r>
-              <a:rPr lang="fr-FR" dirty="0" err="1" smtClean="0"/>
-              <a:t>deboggeur</a:t>
+              <a:rPr lang="fr-FR" dirty="0" smtClean="0"/>
+              <a:t>débuggeur</a:t>
             </a:r>
             <a:endParaRPr lang="fr-FR" dirty="0"/>
           </a:p>
@@ -16288,8 +16630,21 @@
           <a:p>
             <a:r>
               <a:rPr lang="fr-FR" dirty="0" smtClean="0"/>
-              <a:t>Jeu disponible en Anglais et Français</a:t>
-            </a:r>
+              <a:t>Jeu disponible en </a:t>
+            </a:r>
+            <a:r>
+              <a:rPr lang="fr-FR" dirty="0" smtClean="0"/>
+              <a:t>anglais </a:t>
+            </a:r>
+            <a:r>
+              <a:rPr lang="fr-FR" dirty="0" smtClean="0"/>
+              <a:t>et </a:t>
+            </a:r>
+            <a:r>
+              <a:rPr lang="fr-FR" dirty="0" smtClean="0"/>
+              <a:t>français</a:t>
+            </a:r>
+            <a:endParaRPr lang="fr-FR" dirty="0" smtClean="0"/>
           </a:p>
           <a:p>
             <a:r>
@@ -16308,7 +16663,7 @@
       </p:sp>
       <p:pic>
         <p:nvPicPr>
-          <p:cNvPr id="1026" name="Picture 2"/>
+          <p:cNvPr id="4" name="Picture 2" descr="C:\Documents and Settings\James\Bureau\Nouveau dossier (3)\trunk\Annexes\linux.png"/>
           <p:cNvPicPr>
             <a:picLocks noChangeAspect="1" noChangeArrowheads="1"/>
           </p:cNvPicPr>
@@ -16323,25 +16678,27 @@
         </p:blipFill>
         <p:spPr bwMode="auto">
           <a:xfrm>
-            <a:off x="5833312" y="5072074"/>
-            <a:ext cx="810390" cy="579741"/>
+            <a:off x="6715140" y="5143512"/>
+            <a:ext cx="501648" cy="501648"/>
           </a:xfrm>
           <a:prstGeom prst="rect">
             <a:avLst/>
           </a:prstGeom>
-          <a:noFill/>
-          <a:ln w="9525">
+          <a:ln>
             <a:noFill/>
-            <a:miter lim="800000"/>
-            <a:headEnd/>
-            <a:tailEnd/>
           </a:ln>
-          <a:effectLst/>
+          <a:effectLst>
+            <a:outerShdw blurRad="292100" dist="139700" dir="2700000" algn="tl" rotWithShape="0">
+              <a:srgbClr val="333333">
+                <a:alpha val="65000"/>
+              </a:srgbClr>
+            </a:outerShdw>
+          </a:effectLst>
         </p:spPr>
       </p:pic>
       <p:pic>
         <p:nvPicPr>
-          <p:cNvPr id="1028" name="Picture 4"/>
+          <p:cNvPr id="1027" name="Picture 3" descr="C:\Documents and Settings\James\Bureau\Nouveau dossier (3)\trunk\Annexes\mac.png"/>
           <p:cNvPicPr>
             <a:picLocks noChangeAspect="1" noChangeArrowheads="1"/>
           </p:cNvPicPr>
@@ -16356,32 +16713,34 @@
         </p:blipFill>
         <p:spPr bwMode="auto">
           <a:xfrm>
-            <a:off x="7522939" y="5072074"/>
-            <a:ext cx="549523" cy="571504"/>
+            <a:off x="7297410" y="5072074"/>
+            <a:ext cx="560738" cy="579430"/>
           </a:xfrm>
           <a:prstGeom prst="rect">
             <a:avLst/>
           </a:prstGeom>
-          <a:noFill/>
-          <a:ln w="9525">
+          <a:ln>
             <a:noFill/>
-            <a:miter lim="800000"/>
-            <a:headEnd/>
-            <a:tailEnd/>
           </a:ln>
-          <a:effectLst/>
+          <a:effectLst>
+            <a:outerShdw blurRad="292100" dist="139700" dir="2700000" algn="tl" rotWithShape="0">
+              <a:srgbClr val="333333">
+                <a:alpha val="65000"/>
+              </a:srgbClr>
+            </a:outerShdw>
+          </a:effectLst>
         </p:spPr>
       </p:pic>
       <p:pic>
         <p:nvPicPr>
-          <p:cNvPr id="1030" name="Picture 6"/>
+          <p:cNvPr id="5" name="Picture 4" descr="C:\Documents and Settings\James\Bureau\Nouveau dossier (3)\trunk\Annexes\windows.png"/>
           <p:cNvPicPr>
             <a:picLocks noChangeAspect="1" noChangeArrowheads="1"/>
           </p:cNvPicPr>
           <p:nvPr/>
         </p:nvPicPr>
         <p:blipFill>
-          <a:blip r:embed="rId4"/>
+          <a:blip r:embed="rId4" cstate="print"/>
           <a:srcRect/>
           <a:stretch>
             <a:fillRect/>
@@ -16389,20 +16748,22 @@
         </p:blipFill>
         <p:spPr bwMode="auto">
           <a:xfrm>
-            <a:off x="6786578" y="5072074"/>
-            <a:ext cx="571504" cy="571504"/>
+            <a:off x="6000760" y="5143512"/>
+            <a:ext cx="592104" cy="545639"/>
           </a:xfrm>
           <a:prstGeom prst="rect">
             <a:avLst/>
           </a:prstGeom>
-          <a:noFill/>
-          <a:ln w="9525">
+          <a:ln>
             <a:noFill/>
-            <a:miter lim="800000"/>
-            <a:headEnd/>
-            <a:tailEnd/>
           </a:ln>
-          <a:effectLst/>
+          <a:effectLst>
+            <a:outerShdw blurRad="292100" dist="139700" dir="2700000" algn="tl" rotWithShape="0">
+              <a:srgbClr val="333333">
+                <a:alpha val="65000"/>
+              </a:srgbClr>
+            </a:outerShdw>
+          </a:effectLst>
         </p:spPr>
       </p:pic>
     </p:spTree>

</xml_diff>